<commit_message>
Update 6.2 Regresión Logística.pptx
</commit_message>
<xml_diff>
--- a/assets/files/Tema6/reg_log/6.2 Regresión Logística.pptx
+++ b/assets/files/Tema6/reg_log/6.2 Regresión Logística.pptx
@@ -13,21 +13,32 @@
     <p:sldId id="258" r:id="rId8"/>
     <p:sldId id="259" r:id="rId9"/>
     <p:sldId id="260" r:id="rId10"/>
+    <p:sldId id="261" r:id="rId11"/>
+    <p:sldId id="262" r:id="rId12"/>
+    <p:sldId id="263" r:id="rId13"/>
+    <p:sldId id="264" r:id="rId14"/>
+    <p:sldId id="265" r:id="rId15"/>
+    <p:sldId id="266" r:id="rId16"/>
+    <p:sldId id="267" r:id="rId17"/>
+    <p:sldId id="268" r:id="rId18"/>
+    <p:sldId id="269" r:id="rId19"/>
+    <p:sldId id="270" r:id="rId20"/>
+    <p:sldId id="271" r:id="rId21"/>
   </p:sldIdLst>
   <p:sldSz cy="5143500" cx="9144000"/>
   <p:notesSz cx="6858000" cy="9144000"/>
   <p:embeddedFontLst>
     <p:embeddedFont>
       <p:font typeface="Amatic SC"/>
-      <p:regular r:id="rId11"/>
-      <p:bold r:id="rId12"/>
+      <p:regular r:id="rId22"/>
+      <p:bold r:id="rId23"/>
     </p:embeddedFont>
     <p:embeddedFont>
       <p:font typeface="Source Code Pro"/>
-      <p:regular r:id="rId13"/>
-      <p:bold r:id="rId14"/>
-      <p:italic r:id="rId15"/>
-      <p:boldItalic r:id="rId16"/>
+      <p:regular r:id="rId24"/>
+      <p:bold r:id="rId25"/>
+      <p:italic r:id="rId26"/>
+      <p:boldItalic r:id="rId27"/>
     </p:embeddedFont>
   </p:embeddedFontLst>
   <p:defaultTextStyle>
@@ -803,6 +814,699 @@
 </p:notes>
 </file>
 
+<file path=ppt/notesSlides/notesSlide10.xml><?xml version="1.0" encoding="utf-8"?>
+<p:notes xmlns:a="http://schemas.openxmlformats.org/drawingml/2006/main" xmlns:r="http://schemas.openxmlformats.org/officeDocument/2006/relationships" xmlns:mc="http://schemas.openxmlformats.org/markup-compatibility/2006" xmlns:mv="urn:schemas-microsoft-com:mac:vml" xmlns:p="http://schemas.openxmlformats.org/presentationml/2006/main" xmlns:c="http://schemas.openxmlformats.org/drawingml/2006/chart" xmlns:dgm="http://schemas.openxmlformats.org/drawingml/2006/diagram" xmlns:o="urn:schemas-microsoft-com:office:office" xmlns:v="urn:schemas-microsoft-com:vml" xmlns:pvml="urn:schemas-microsoft-com:office:powerpoint" xmlns:com="http://schemas.openxmlformats.org/drawingml/2006/compatibility" xmlns:p14="http://schemas.microsoft.com/office/powerpoint/2010/main" xmlns:p15="http://schemas.microsoft.com/office/powerpoint/2012/main" xmlns:ahyp="http://schemas.microsoft.com/office/drawing/2018/hyperlinkcolor" showMasterPhAnim="0" showMasterSp="0">
+  <p:cSld>
+    <p:spTree>
+      <p:nvGrpSpPr>
+        <p:cNvPr id="120" name="Shape 120"/>
+        <p:cNvGrpSpPr/>
+        <p:nvPr/>
+      </p:nvGrpSpPr>
+      <p:grpSpPr>
+        <a:xfrm>
+          <a:off x="0" y="0"/>
+          <a:ext cx="0" cy="0"/>
+          <a:chOff x="0" y="0"/>
+          <a:chExt cx="0" cy="0"/>
+        </a:xfrm>
+      </p:grpSpPr>
+      <p:sp>
+        <p:nvSpPr>
+          <p:cNvPr id="121" name="Google Shape;121;gaa1b166ed6_0_47:notes"/>
+          <p:cNvSpPr/>
+          <p:nvPr>
+            <p:ph idx="2" type="sldImg"/>
+          </p:nvPr>
+        </p:nvSpPr>
+        <p:spPr>
+          <a:xfrm>
+            <a:off x="381188" y="685800"/>
+            <a:ext cx="6096300" cy="3429000"/>
+          </a:xfrm>
+          <a:custGeom>
+            <a:rect b="b" l="l" r="r" t="t"/>
+            <a:pathLst>
+              <a:path extrusionOk="0" h="120000" w="120000">
+                <a:moveTo>
+                  <a:pt x="0" y="0"/>
+                </a:moveTo>
+                <a:lnTo>
+                  <a:pt x="120000" y="0"/>
+                </a:lnTo>
+                <a:lnTo>
+                  <a:pt x="120000" y="120000"/>
+                </a:lnTo>
+                <a:lnTo>
+                  <a:pt x="0" y="120000"/>
+                </a:lnTo>
+                <a:close/>
+              </a:path>
+            </a:pathLst>
+          </a:custGeom>
+        </p:spPr>
+      </p:sp>
+      <p:sp>
+        <p:nvSpPr>
+          <p:cNvPr id="122" name="Google Shape;122;gaa1b166ed6_0_47:notes"/>
+          <p:cNvSpPr txBox="1"/>
+          <p:nvPr>
+            <p:ph idx="1" type="body"/>
+          </p:nvPr>
+        </p:nvSpPr>
+        <p:spPr>
+          <a:xfrm>
+            <a:off x="685800" y="4343400"/>
+            <a:ext cx="5486400" cy="4114800"/>
+          </a:xfrm>
+          <a:prstGeom prst="rect">
+            <a:avLst/>
+          </a:prstGeom>
+        </p:spPr>
+        <p:txBody>
+          <a:bodyPr anchorCtr="0" anchor="t" bIns="91425" lIns="91425" spcFirstLastPara="1" rIns="91425" wrap="square" tIns="91425">
+            <a:noAutofit/>
+          </a:bodyPr>
+          <a:lstStyle/>
+          <a:p>
+            <a:pPr indent="0" lvl="0" marL="0" rtl="0" algn="l">
+              <a:spcBef>
+                <a:spcPts val="0"/>
+              </a:spcBef>
+              <a:spcAft>
+                <a:spcPts val="0"/>
+              </a:spcAft>
+              <a:buNone/>
+            </a:pPr>
+            <a:r>
+              <a:t/>
+            </a:r>
+            <a:endParaRPr/>
+          </a:p>
+        </p:txBody>
+      </p:sp>
+    </p:spTree>
+  </p:cSld>
+  <p:clrMapOvr>
+    <a:masterClrMapping/>
+  </p:clrMapOvr>
+</p:notes>
+</file>
+
+<file path=ppt/notesSlides/notesSlide11.xml><?xml version="1.0" encoding="utf-8"?>
+<p:notes xmlns:a="http://schemas.openxmlformats.org/drawingml/2006/main" xmlns:r="http://schemas.openxmlformats.org/officeDocument/2006/relationships" xmlns:mc="http://schemas.openxmlformats.org/markup-compatibility/2006" xmlns:mv="urn:schemas-microsoft-com:mac:vml" xmlns:p="http://schemas.openxmlformats.org/presentationml/2006/main" xmlns:c="http://schemas.openxmlformats.org/drawingml/2006/chart" xmlns:dgm="http://schemas.openxmlformats.org/drawingml/2006/diagram" xmlns:o="urn:schemas-microsoft-com:office:office" xmlns:v="urn:schemas-microsoft-com:vml" xmlns:pvml="urn:schemas-microsoft-com:office:powerpoint" xmlns:com="http://schemas.openxmlformats.org/drawingml/2006/compatibility" xmlns:p14="http://schemas.microsoft.com/office/powerpoint/2010/main" xmlns:p15="http://schemas.microsoft.com/office/powerpoint/2012/main" xmlns:ahyp="http://schemas.microsoft.com/office/drawing/2018/hyperlinkcolor" showMasterPhAnim="0" showMasterSp="0">
+  <p:cSld>
+    <p:spTree>
+      <p:nvGrpSpPr>
+        <p:cNvPr id="133" name="Shape 133"/>
+        <p:cNvGrpSpPr/>
+        <p:nvPr/>
+      </p:nvGrpSpPr>
+      <p:grpSpPr>
+        <a:xfrm>
+          <a:off x="0" y="0"/>
+          <a:ext cx="0" cy="0"/>
+          <a:chOff x="0" y="0"/>
+          <a:chExt cx="0" cy="0"/>
+        </a:xfrm>
+      </p:grpSpPr>
+      <p:sp>
+        <p:nvSpPr>
+          <p:cNvPr id="134" name="Google Shape;134;gaa1b166ed6_0_54:notes"/>
+          <p:cNvSpPr/>
+          <p:nvPr>
+            <p:ph idx="2" type="sldImg"/>
+          </p:nvPr>
+        </p:nvSpPr>
+        <p:spPr>
+          <a:xfrm>
+            <a:off x="381188" y="685800"/>
+            <a:ext cx="6096300" cy="3429000"/>
+          </a:xfrm>
+          <a:custGeom>
+            <a:rect b="b" l="l" r="r" t="t"/>
+            <a:pathLst>
+              <a:path extrusionOk="0" h="120000" w="120000">
+                <a:moveTo>
+                  <a:pt x="0" y="0"/>
+                </a:moveTo>
+                <a:lnTo>
+                  <a:pt x="120000" y="0"/>
+                </a:lnTo>
+                <a:lnTo>
+                  <a:pt x="120000" y="120000"/>
+                </a:lnTo>
+                <a:lnTo>
+                  <a:pt x="0" y="120000"/>
+                </a:lnTo>
+                <a:close/>
+              </a:path>
+            </a:pathLst>
+          </a:custGeom>
+        </p:spPr>
+      </p:sp>
+      <p:sp>
+        <p:nvSpPr>
+          <p:cNvPr id="135" name="Google Shape;135;gaa1b166ed6_0_54:notes"/>
+          <p:cNvSpPr txBox="1"/>
+          <p:nvPr>
+            <p:ph idx="1" type="body"/>
+          </p:nvPr>
+        </p:nvSpPr>
+        <p:spPr>
+          <a:xfrm>
+            <a:off x="685800" y="4343400"/>
+            <a:ext cx="5486400" cy="4114800"/>
+          </a:xfrm>
+          <a:prstGeom prst="rect">
+            <a:avLst/>
+          </a:prstGeom>
+        </p:spPr>
+        <p:txBody>
+          <a:bodyPr anchorCtr="0" anchor="t" bIns="91425" lIns="91425" spcFirstLastPara="1" rIns="91425" wrap="square" tIns="91425">
+            <a:noAutofit/>
+          </a:bodyPr>
+          <a:lstStyle/>
+          <a:p>
+            <a:pPr indent="0" lvl="0" marL="0" rtl="0" algn="l">
+              <a:spcBef>
+                <a:spcPts val="0"/>
+              </a:spcBef>
+              <a:spcAft>
+                <a:spcPts val="0"/>
+              </a:spcAft>
+              <a:buNone/>
+            </a:pPr>
+            <a:r>
+              <a:t/>
+            </a:r>
+            <a:endParaRPr/>
+          </a:p>
+        </p:txBody>
+      </p:sp>
+    </p:spTree>
+  </p:cSld>
+  <p:clrMapOvr>
+    <a:masterClrMapping/>
+  </p:clrMapOvr>
+</p:notes>
+</file>
+
+<file path=ppt/notesSlides/notesSlide12.xml><?xml version="1.0" encoding="utf-8"?>
+<p:notes xmlns:a="http://schemas.openxmlformats.org/drawingml/2006/main" xmlns:r="http://schemas.openxmlformats.org/officeDocument/2006/relationships" xmlns:mc="http://schemas.openxmlformats.org/markup-compatibility/2006" xmlns:mv="urn:schemas-microsoft-com:mac:vml" xmlns:p="http://schemas.openxmlformats.org/presentationml/2006/main" xmlns:c="http://schemas.openxmlformats.org/drawingml/2006/chart" xmlns:dgm="http://schemas.openxmlformats.org/drawingml/2006/diagram" xmlns:o="urn:schemas-microsoft-com:office:office" xmlns:v="urn:schemas-microsoft-com:vml" xmlns:pvml="urn:schemas-microsoft-com:office:powerpoint" xmlns:com="http://schemas.openxmlformats.org/drawingml/2006/compatibility" xmlns:p14="http://schemas.microsoft.com/office/powerpoint/2010/main" xmlns:p15="http://schemas.microsoft.com/office/powerpoint/2012/main" xmlns:ahyp="http://schemas.microsoft.com/office/drawing/2018/hyperlinkcolor" showMasterPhAnim="0" showMasterSp="0">
+  <p:cSld>
+    <p:spTree>
+      <p:nvGrpSpPr>
+        <p:cNvPr id="140" name="Shape 140"/>
+        <p:cNvGrpSpPr/>
+        <p:nvPr/>
+      </p:nvGrpSpPr>
+      <p:grpSpPr>
+        <a:xfrm>
+          <a:off x="0" y="0"/>
+          <a:ext cx="0" cy="0"/>
+          <a:chOff x="0" y="0"/>
+          <a:chExt cx="0" cy="0"/>
+        </a:xfrm>
+      </p:grpSpPr>
+      <p:sp>
+        <p:nvSpPr>
+          <p:cNvPr id="141" name="Google Shape;141;gaa1b166ed6_0_68:notes"/>
+          <p:cNvSpPr/>
+          <p:nvPr>
+            <p:ph idx="2" type="sldImg"/>
+          </p:nvPr>
+        </p:nvSpPr>
+        <p:spPr>
+          <a:xfrm>
+            <a:off x="381188" y="685800"/>
+            <a:ext cx="6096300" cy="3429000"/>
+          </a:xfrm>
+          <a:custGeom>
+            <a:rect b="b" l="l" r="r" t="t"/>
+            <a:pathLst>
+              <a:path extrusionOk="0" h="120000" w="120000">
+                <a:moveTo>
+                  <a:pt x="0" y="0"/>
+                </a:moveTo>
+                <a:lnTo>
+                  <a:pt x="120000" y="0"/>
+                </a:lnTo>
+                <a:lnTo>
+                  <a:pt x="120000" y="120000"/>
+                </a:lnTo>
+                <a:lnTo>
+                  <a:pt x="0" y="120000"/>
+                </a:lnTo>
+                <a:close/>
+              </a:path>
+            </a:pathLst>
+          </a:custGeom>
+        </p:spPr>
+      </p:sp>
+      <p:sp>
+        <p:nvSpPr>
+          <p:cNvPr id="142" name="Google Shape;142;gaa1b166ed6_0_68:notes"/>
+          <p:cNvSpPr txBox="1"/>
+          <p:nvPr>
+            <p:ph idx="1" type="body"/>
+          </p:nvPr>
+        </p:nvSpPr>
+        <p:spPr>
+          <a:xfrm>
+            <a:off x="685800" y="4343400"/>
+            <a:ext cx="5486400" cy="4114800"/>
+          </a:xfrm>
+          <a:prstGeom prst="rect">
+            <a:avLst/>
+          </a:prstGeom>
+        </p:spPr>
+        <p:txBody>
+          <a:bodyPr anchorCtr="0" anchor="t" bIns="91425" lIns="91425" spcFirstLastPara="1" rIns="91425" wrap="square" tIns="91425">
+            <a:noAutofit/>
+          </a:bodyPr>
+          <a:lstStyle/>
+          <a:p>
+            <a:pPr indent="0" lvl="0" marL="0" rtl="0" algn="l">
+              <a:spcBef>
+                <a:spcPts val="0"/>
+              </a:spcBef>
+              <a:spcAft>
+                <a:spcPts val="0"/>
+              </a:spcAft>
+              <a:buNone/>
+            </a:pPr>
+            <a:r>
+              <a:t/>
+            </a:r>
+            <a:endParaRPr/>
+          </a:p>
+        </p:txBody>
+      </p:sp>
+    </p:spTree>
+  </p:cSld>
+  <p:clrMapOvr>
+    <a:masterClrMapping/>
+  </p:clrMapOvr>
+</p:notes>
+</file>
+
+<file path=ppt/notesSlides/notesSlide13.xml><?xml version="1.0" encoding="utf-8"?>
+<p:notes xmlns:a="http://schemas.openxmlformats.org/drawingml/2006/main" xmlns:r="http://schemas.openxmlformats.org/officeDocument/2006/relationships" xmlns:mc="http://schemas.openxmlformats.org/markup-compatibility/2006" xmlns:mv="urn:schemas-microsoft-com:mac:vml" xmlns:p="http://schemas.openxmlformats.org/presentationml/2006/main" xmlns:c="http://schemas.openxmlformats.org/drawingml/2006/chart" xmlns:dgm="http://schemas.openxmlformats.org/drawingml/2006/diagram" xmlns:o="urn:schemas-microsoft-com:office:office" xmlns:v="urn:schemas-microsoft-com:vml" xmlns:pvml="urn:schemas-microsoft-com:office:powerpoint" xmlns:com="http://schemas.openxmlformats.org/drawingml/2006/compatibility" xmlns:p14="http://schemas.microsoft.com/office/powerpoint/2010/main" xmlns:p15="http://schemas.microsoft.com/office/powerpoint/2012/main" xmlns:ahyp="http://schemas.microsoft.com/office/drawing/2018/hyperlinkcolor" showMasterPhAnim="0" showMasterSp="0">
+  <p:cSld>
+    <p:spTree>
+      <p:nvGrpSpPr>
+        <p:cNvPr id="148" name="Shape 148"/>
+        <p:cNvGrpSpPr/>
+        <p:nvPr/>
+      </p:nvGrpSpPr>
+      <p:grpSpPr>
+        <a:xfrm>
+          <a:off x="0" y="0"/>
+          <a:ext cx="0" cy="0"/>
+          <a:chOff x="0" y="0"/>
+          <a:chExt cx="0" cy="0"/>
+        </a:xfrm>
+      </p:grpSpPr>
+      <p:sp>
+        <p:nvSpPr>
+          <p:cNvPr id="149" name="Google Shape;149;gaa1b166ed6_0_76:notes"/>
+          <p:cNvSpPr/>
+          <p:nvPr>
+            <p:ph idx="2" type="sldImg"/>
+          </p:nvPr>
+        </p:nvSpPr>
+        <p:spPr>
+          <a:xfrm>
+            <a:off x="381188" y="685800"/>
+            <a:ext cx="6096300" cy="3429000"/>
+          </a:xfrm>
+          <a:custGeom>
+            <a:rect b="b" l="l" r="r" t="t"/>
+            <a:pathLst>
+              <a:path extrusionOk="0" h="120000" w="120000">
+                <a:moveTo>
+                  <a:pt x="0" y="0"/>
+                </a:moveTo>
+                <a:lnTo>
+                  <a:pt x="120000" y="0"/>
+                </a:lnTo>
+                <a:lnTo>
+                  <a:pt x="120000" y="120000"/>
+                </a:lnTo>
+                <a:lnTo>
+                  <a:pt x="0" y="120000"/>
+                </a:lnTo>
+                <a:close/>
+              </a:path>
+            </a:pathLst>
+          </a:custGeom>
+        </p:spPr>
+      </p:sp>
+      <p:sp>
+        <p:nvSpPr>
+          <p:cNvPr id="150" name="Google Shape;150;gaa1b166ed6_0_76:notes"/>
+          <p:cNvSpPr txBox="1"/>
+          <p:nvPr>
+            <p:ph idx="1" type="body"/>
+          </p:nvPr>
+        </p:nvSpPr>
+        <p:spPr>
+          <a:xfrm>
+            <a:off x="685800" y="4343400"/>
+            <a:ext cx="5486400" cy="4114800"/>
+          </a:xfrm>
+          <a:prstGeom prst="rect">
+            <a:avLst/>
+          </a:prstGeom>
+        </p:spPr>
+        <p:txBody>
+          <a:bodyPr anchorCtr="0" anchor="t" bIns="91425" lIns="91425" spcFirstLastPara="1" rIns="91425" wrap="square" tIns="91425">
+            <a:noAutofit/>
+          </a:bodyPr>
+          <a:lstStyle/>
+          <a:p>
+            <a:pPr indent="0" lvl="0" marL="0" rtl="0" algn="l">
+              <a:spcBef>
+                <a:spcPts val="0"/>
+              </a:spcBef>
+              <a:spcAft>
+                <a:spcPts val="0"/>
+              </a:spcAft>
+              <a:buNone/>
+            </a:pPr>
+            <a:r>
+              <a:t/>
+            </a:r>
+            <a:endParaRPr/>
+          </a:p>
+        </p:txBody>
+      </p:sp>
+    </p:spTree>
+  </p:cSld>
+  <p:clrMapOvr>
+    <a:masterClrMapping/>
+  </p:clrMapOvr>
+</p:notes>
+</file>
+
+<file path=ppt/notesSlides/notesSlide14.xml><?xml version="1.0" encoding="utf-8"?>
+<p:notes xmlns:a="http://schemas.openxmlformats.org/drawingml/2006/main" xmlns:r="http://schemas.openxmlformats.org/officeDocument/2006/relationships" xmlns:mc="http://schemas.openxmlformats.org/markup-compatibility/2006" xmlns:mv="urn:schemas-microsoft-com:mac:vml" xmlns:p="http://schemas.openxmlformats.org/presentationml/2006/main" xmlns:c="http://schemas.openxmlformats.org/drawingml/2006/chart" xmlns:dgm="http://schemas.openxmlformats.org/drawingml/2006/diagram" xmlns:o="urn:schemas-microsoft-com:office:office" xmlns:v="urn:schemas-microsoft-com:vml" xmlns:pvml="urn:schemas-microsoft-com:office:powerpoint" xmlns:com="http://schemas.openxmlformats.org/drawingml/2006/compatibility" xmlns:p14="http://schemas.microsoft.com/office/powerpoint/2010/main" xmlns:p15="http://schemas.microsoft.com/office/powerpoint/2012/main" xmlns:ahyp="http://schemas.microsoft.com/office/drawing/2018/hyperlinkcolor" showMasterPhAnim="0" showMasterSp="0">
+  <p:cSld>
+    <p:spTree>
+      <p:nvGrpSpPr>
+        <p:cNvPr id="156" name="Shape 156"/>
+        <p:cNvGrpSpPr/>
+        <p:nvPr/>
+      </p:nvGrpSpPr>
+      <p:grpSpPr>
+        <a:xfrm>
+          <a:off x="0" y="0"/>
+          <a:ext cx="0" cy="0"/>
+          <a:chOff x="0" y="0"/>
+          <a:chExt cx="0" cy="0"/>
+        </a:xfrm>
+      </p:grpSpPr>
+      <p:sp>
+        <p:nvSpPr>
+          <p:cNvPr id="157" name="Google Shape;157;gaa1b166ed6_0_86:notes"/>
+          <p:cNvSpPr/>
+          <p:nvPr>
+            <p:ph idx="2" type="sldImg"/>
+          </p:nvPr>
+        </p:nvSpPr>
+        <p:spPr>
+          <a:xfrm>
+            <a:off x="381188" y="685800"/>
+            <a:ext cx="6096300" cy="3429000"/>
+          </a:xfrm>
+          <a:custGeom>
+            <a:rect b="b" l="l" r="r" t="t"/>
+            <a:pathLst>
+              <a:path extrusionOk="0" h="120000" w="120000">
+                <a:moveTo>
+                  <a:pt x="0" y="0"/>
+                </a:moveTo>
+                <a:lnTo>
+                  <a:pt x="120000" y="0"/>
+                </a:lnTo>
+                <a:lnTo>
+                  <a:pt x="120000" y="120000"/>
+                </a:lnTo>
+                <a:lnTo>
+                  <a:pt x="0" y="120000"/>
+                </a:lnTo>
+                <a:close/>
+              </a:path>
+            </a:pathLst>
+          </a:custGeom>
+        </p:spPr>
+      </p:sp>
+      <p:sp>
+        <p:nvSpPr>
+          <p:cNvPr id="158" name="Google Shape;158;gaa1b166ed6_0_86:notes"/>
+          <p:cNvSpPr txBox="1"/>
+          <p:nvPr>
+            <p:ph idx="1" type="body"/>
+          </p:nvPr>
+        </p:nvSpPr>
+        <p:spPr>
+          <a:xfrm>
+            <a:off x="685800" y="4343400"/>
+            <a:ext cx="5486400" cy="4114800"/>
+          </a:xfrm>
+          <a:prstGeom prst="rect">
+            <a:avLst/>
+          </a:prstGeom>
+        </p:spPr>
+        <p:txBody>
+          <a:bodyPr anchorCtr="0" anchor="t" bIns="91425" lIns="91425" spcFirstLastPara="1" rIns="91425" wrap="square" tIns="91425">
+            <a:noAutofit/>
+          </a:bodyPr>
+          <a:lstStyle/>
+          <a:p>
+            <a:pPr indent="0" lvl="0" marL="0" rtl="0" algn="l">
+              <a:spcBef>
+                <a:spcPts val="0"/>
+              </a:spcBef>
+              <a:spcAft>
+                <a:spcPts val="0"/>
+              </a:spcAft>
+              <a:buNone/>
+            </a:pPr>
+            <a:r>
+              <a:t/>
+            </a:r>
+            <a:endParaRPr/>
+          </a:p>
+        </p:txBody>
+      </p:sp>
+    </p:spTree>
+  </p:cSld>
+  <p:clrMapOvr>
+    <a:masterClrMapping/>
+  </p:clrMapOvr>
+</p:notes>
+</file>
+
+<file path=ppt/notesSlides/notesSlide15.xml><?xml version="1.0" encoding="utf-8"?>
+<p:notes xmlns:a="http://schemas.openxmlformats.org/drawingml/2006/main" xmlns:r="http://schemas.openxmlformats.org/officeDocument/2006/relationships" xmlns:mc="http://schemas.openxmlformats.org/markup-compatibility/2006" xmlns:mv="urn:schemas-microsoft-com:mac:vml" xmlns:p="http://schemas.openxmlformats.org/presentationml/2006/main" xmlns:c="http://schemas.openxmlformats.org/drawingml/2006/chart" xmlns:dgm="http://schemas.openxmlformats.org/drawingml/2006/diagram" xmlns:o="urn:schemas-microsoft-com:office:office" xmlns:v="urn:schemas-microsoft-com:vml" xmlns:pvml="urn:schemas-microsoft-com:office:powerpoint" xmlns:com="http://schemas.openxmlformats.org/drawingml/2006/compatibility" xmlns:p14="http://schemas.microsoft.com/office/powerpoint/2010/main" xmlns:p15="http://schemas.microsoft.com/office/powerpoint/2012/main" xmlns:ahyp="http://schemas.microsoft.com/office/drawing/2018/hyperlinkcolor" showMasterPhAnim="0" showMasterSp="0">
+  <p:cSld>
+    <p:spTree>
+      <p:nvGrpSpPr>
+        <p:cNvPr id="162" name="Shape 162"/>
+        <p:cNvGrpSpPr/>
+        <p:nvPr/>
+      </p:nvGrpSpPr>
+      <p:grpSpPr>
+        <a:xfrm>
+          <a:off x="0" y="0"/>
+          <a:ext cx="0" cy="0"/>
+          <a:chOff x="0" y="0"/>
+          <a:chExt cx="0" cy="0"/>
+        </a:xfrm>
+      </p:grpSpPr>
+      <p:sp>
+        <p:nvSpPr>
+          <p:cNvPr id="163" name="Google Shape;163;gaa1b166ed6_0_93:notes"/>
+          <p:cNvSpPr/>
+          <p:nvPr>
+            <p:ph idx="2" type="sldImg"/>
+          </p:nvPr>
+        </p:nvSpPr>
+        <p:spPr>
+          <a:xfrm>
+            <a:off x="381188" y="685800"/>
+            <a:ext cx="6096300" cy="3429000"/>
+          </a:xfrm>
+          <a:custGeom>
+            <a:rect b="b" l="l" r="r" t="t"/>
+            <a:pathLst>
+              <a:path extrusionOk="0" h="120000" w="120000">
+                <a:moveTo>
+                  <a:pt x="0" y="0"/>
+                </a:moveTo>
+                <a:lnTo>
+                  <a:pt x="120000" y="0"/>
+                </a:lnTo>
+                <a:lnTo>
+                  <a:pt x="120000" y="120000"/>
+                </a:lnTo>
+                <a:lnTo>
+                  <a:pt x="0" y="120000"/>
+                </a:lnTo>
+                <a:close/>
+              </a:path>
+            </a:pathLst>
+          </a:custGeom>
+        </p:spPr>
+      </p:sp>
+      <p:sp>
+        <p:nvSpPr>
+          <p:cNvPr id="164" name="Google Shape;164;gaa1b166ed6_0_93:notes"/>
+          <p:cNvSpPr txBox="1"/>
+          <p:nvPr>
+            <p:ph idx="1" type="body"/>
+          </p:nvPr>
+        </p:nvSpPr>
+        <p:spPr>
+          <a:xfrm>
+            <a:off x="685800" y="4343400"/>
+            <a:ext cx="5486400" cy="4114800"/>
+          </a:xfrm>
+          <a:prstGeom prst="rect">
+            <a:avLst/>
+          </a:prstGeom>
+        </p:spPr>
+        <p:txBody>
+          <a:bodyPr anchorCtr="0" anchor="t" bIns="91425" lIns="91425" spcFirstLastPara="1" rIns="91425" wrap="square" tIns="91425">
+            <a:noAutofit/>
+          </a:bodyPr>
+          <a:lstStyle/>
+          <a:p>
+            <a:pPr indent="0" lvl="0" marL="0" rtl="0" algn="l">
+              <a:spcBef>
+                <a:spcPts val="0"/>
+              </a:spcBef>
+              <a:spcAft>
+                <a:spcPts val="0"/>
+              </a:spcAft>
+              <a:buNone/>
+            </a:pPr>
+            <a:r>
+              <a:t/>
+            </a:r>
+            <a:endParaRPr/>
+          </a:p>
+        </p:txBody>
+      </p:sp>
+    </p:spTree>
+  </p:cSld>
+  <p:clrMapOvr>
+    <a:masterClrMapping/>
+  </p:clrMapOvr>
+</p:notes>
+</file>
+
+<file path=ppt/notesSlides/notesSlide16.xml><?xml version="1.0" encoding="utf-8"?>
+<p:notes xmlns:a="http://schemas.openxmlformats.org/drawingml/2006/main" xmlns:r="http://schemas.openxmlformats.org/officeDocument/2006/relationships" xmlns:mc="http://schemas.openxmlformats.org/markup-compatibility/2006" xmlns:mv="urn:schemas-microsoft-com:mac:vml" xmlns:p="http://schemas.openxmlformats.org/presentationml/2006/main" xmlns:c="http://schemas.openxmlformats.org/drawingml/2006/chart" xmlns:dgm="http://schemas.openxmlformats.org/drawingml/2006/diagram" xmlns:o="urn:schemas-microsoft-com:office:office" xmlns:v="urn:schemas-microsoft-com:vml" xmlns:pvml="urn:schemas-microsoft-com:office:powerpoint" xmlns:com="http://schemas.openxmlformats.org/drawingml/2006/compatibility" xmlns:p14="http://schemas.microsoft.com/office/powerpoint/2010/main" xmlns:p15="http://schemas.microsoft.com/office/powerpoint/2012/main" xmlns:ahyp="http://schemas.microsoft.com/office/drawing/2018/hyperlinkcolor" showMasterPhAnim="0" showMasterSp="0">
+  <p:cSld>
+    <p:spTree>
+      <p:nvGrpSpPr>
+        <p:cNvPr id="169" name="Shape 169"/>
+        <p:cNvGrpSpPr/>
+        <p:nvPr/>
+      </p:nvGrpSpPr>
+      <p:grpSpPr>
+        <a:xfrm>
+          <a:off x="0" y="0"/>
+          <a:ext cx="0" cy="0"/>
+          <a:chOff x="0" y="0"/>
+          <a:chExt cx="0" cy="0"/>
+        </a:xfrm>
+      </p:grpSpPr>
+      <p:sp>
+        <p:nvSpPr>
+          <p:cNvPr id="170" name="Google Shape;170;gb2b8be0720_0_20:notes"/>
+          <p:cNvSpPr/>
+          <p:nvPr>
+            <p:ph idx="2" type="sldImg"/>
+          </p:nvPr>
+        </p:nvSpPr>
+        <p:spPr>
+          <a:xfrm>
+            <a:off x="381188" y="685800"/>
+            <a:ext cx="6096300" cy="3429000"/>
+          </a:xfrm>
+          <a:custGeom>
+            <a:rect b="b" l="l" r="r" t="t"/>
+            <a:pathLst>
+              <a:path extrusionOk="0" h="120000" w="120000">
+                <a:moveTo>
+                  <a:pt x="0" y="0"/>
+                </a:moveTo>
+                <a:lnTo>
+                  <a:pt x="120000" y="0"/>
+                </a:lnTo>
+                <a:lnTo>
+                  <a:pt x="120000" y="120000"/>
+                </a:lnTo>
+                <a:lnTo>
+                  <a:pt x="0" y="120000"/>
+                </a:lnTo>
+                <a:close/>
+              </a:path>
+            </a:pathLst>
+          </a:custGeom>
+        </p:spPr>
+      </p:sp>
+      <p:sp>
+        <p:nvSpPr>
+          <p:cNvPr id="171" name="Google Shape;171;gb2b8be0720_0_20:notes"/>
+          <p:cNvSpPr txBox="1"/>
+          <p:nvPr>
+            <p:ph idx="1" type="body"/>
+          </p:nvPr>
+        </p:nvSpPr>
+        <p:spPr>
+          <a:xfrm>
+            <a:off x="685800" y="4343400"/>
+            <a:ext cx="5486400" cy="4114800"/>
+          </a:xfrm>
+          <a:prstGeom prst="rect">
+            <a:avLst/>
+          </a:prstGeom>
+        </p:spPr>
+        <p:txBody>
+          <a:bodyPr anchorCtr="0" anchor="t" bIns="91425" lIns="91425" spcFirstLastPara="1" rIns="91425" wrap="square" tIns="91425">
+            <a:noAutofit/>
+          </a:bodyPr>
+          <a:lstStyle/>
+          <a:p>
+            <a:pPr indent="0" lvl="0" marL="0" rtl="0" algn="l">
+              <a:spcBef>
+                <a:spcPts val="0"/>
+              </a:spcBef>
+              <a:spcAft>
+                <a:spcPts val="0"/>
+              </a:spcAft>
+              <a:buNone/>
+            </a:pPr>
+            <a:r>
+              <a:t/>
+            </a:r>
+            <a:endParaRPr/>
+          </a:p>
+        </p:txBody>
+      </p:sp>
+    </p:spTree>
+  </p:cSld>
+  <p:clrMapOvr>
+    <a:masterClrMapping/>
+  </p:clrMapOvr>
+</p:notes>
+</file>
+
 <file path=ppt/notesSlides/notesSlide2.xml><?xml version="1.0" encoding="utf-8"?>
 <p:notes xmlns:a="http://schemas.openxmlformats.org/drawingml/2006/main" xmlns:r="http://schemas.openxmlformats.org/officeDocument/2006/relationships" xmlns:mc="http://schemas.openxmlformats.org/markup-compatibility/2006" xmlns:mv="urn:schemas-microsoft-com:mac:vml" xmlns:p="http://schemas.openxmlformats.org/presentationml/2006/main" xmlns:c="http://schemas.openxmlformats.org/drawingml/2006/chart" xmlns:dgm="http://schemas.openxmlformats.org/drawingml/2006/diagram" xmlns:o="urn:schemas-microsoft-com:office:office" xmlns:v="urn:schemas-microsoft-com:vml" xmlns:pvml="urn:schemas-microsoft-com:office:powerpoint" xmlns:com="http://schemas.openxmlformats.org/drawingml/2006/compatibility" xmlns:p14="http://schemas.microsoft.com/office/powerpoint/2010/main" xmlns:p15="http://schemas.microsoft.com/office/powerpoint/2012/main" xmlns:ahyp="http://schemas.microsoft.com/office/drawing/2018/hyperlinkcolor" showMasterPhAnim="0" showMasterSp="0">
   <p:cSld>
@@ -921,7 +1625,7 @@
       </p:grpSpPr>
       <p:sp>
         <p:nvSpPr>
-          <p:cNvPr id="66" name="Google Shape;66;gb2b8be0720_0_1:notes"/>
+          <p:cNvPr id="66" name="Google Shape;66;gaa1b166ed6_0_1:notes"/>
           <p:cNvSpPr/>
           <p:nvPr>
             <p:ph idx="2" type="sldImg"/>
@@ -956,7 +1660,7 @@
       </p:sp>
       <p:sp>
         <p:nvSpPr>
-          <p:cNvPr id="67" name="Google Shape;67;gb2b8be0720_0_1:notes"/>
+          <p:cNvPr id="67" name="Google Shape;67;gaa1b166ed6_0_1:notes"/>
           <p:cNvSpPr txBox="1"/>
           <p:nvPr>
             <p:ph idx="1" type="body"/>
@@ -1006,7 +1710,7 @@
   <p:cSld>
     <p:spTree>
       <p:nvGrpSpPr>
-        <p:cNvPr id="73" name="Shape 73"/>
+        <p:cNvPr id="72" name="Shape 72"/>
         <p:cNvGrpSpPr/>
         <p:nvPr/>
       </p:nvGrpSpPr>
@@ -1020,7 +1724,7 @@
       </p:grpSpPr>
       <p:sp>
         <p:nvSpPr>
-          <p:cNvPr id="74" name="Google Shape;74;gb2b8be0720_0_8:notes"/>
+          <p:cNvPr id="73" name="Google Shape;73;gb2b8be0720_0_1:notes"/>
           <p:cNvSpPr/>
           <p:nvPr>
             <p:ph idx="2" type="sldImg"/>
@@ -1055,7 +1759,7 @@
       </p:sp>
       <p:sp>
         <p:nvSpPr>
-          <p:cNvPr id="75" name="Google Shape;75;gb2b8be0720_0_8:notes"/>
+          <p:cNvPr id="74" name="Google Shape;74;gb2b8be0720_0_1:notes"/>
           <p:cNvSpPr txBox="1"/>
           <p:nvPr>
             <p:ph idx="1" type="body"/>
@@ -1105,7 +1809,7 @@
   <p:cSld>
     <p:spTree>
       <p:nvGrpSpPr>
-        <p:cNvPr id="81" name="Shape 81"/>
+        <p:cNvPr id="80" name="Shape 80"/>
         <p:cNvGrpSpPr/>
         <p:nvPr/>
       </p:nvGrpSpPr>
@@ -1119,7 +1823,7 @@
       </p:grpSpPr>
       <p:sp>
         <p:nvSpPr>
-          <p:cNvPr id="82" name="Google Shape;82;gb2b8be0720_0_20:notes"/>
+          <p:cNvPr id="81" name="Google Shape;81;gb2b8be0720_0_8:notes"/>
           <p:cNvSpPr/>
           <p:nvPr>
             <p:ph idx="2" type="sldImg"/>
@@ -1154,7 +1858,403 @@
       </p:sp>
       <p:sp>
         <p:nvSpPr>
-          <p:cNvPr id="83" name="Google Shape;83;gb2b8be0720_0_20:notes"/>
+          <p:cNvPr id="82" name="Google Shape;82;gb2b8be0720_0_8:notes"/>
+          <p:cNvSpPr txBox="1"/>
+          <p:nvPr>
+            <p:ph idx="1" type="body"/>
+          </p:nvPr>
+        </p:nvSpPr>
+        <p:spPr>
+          <a:xfrm>
+            <a:off x="685800" y="4343400"/>
+            <a:ext cx="5486400" cy="4114800"/>
+          </a:xfrm>
+          <a:prstGeom prst="rect">
+            <a:avLst/>
+          </a:prstGeom>
+        </p:spPr>
+        <p:txBody>
+          <a:bodyPr anchorCtr="0" anchor="t" bIns="91425" lIns="91425" spcFirstLastPara="1" rIns="91425" wrap="square" tIns="91425">
+            <a:noAutofit/>
+          </a:bodyPr>
+          <a:lstStyle/>
+          <a:p>
+            <a:pPr indent="0" lvl="0" marL="0" rtl="0" algn="l">
+              <a:spcBef>
+                <a:spcPts val="0"/>
+              </a:spcBef>
+              <a:spcAft>
+                <a:spcPts val="0"/>
+              </a:spcAft>
+              <a:buNone/>
+            </a:pPr>
+            <a:r>
+              <a:t/>
+            </a:r>
+            <a:endParaRPr/>
+          </a:p>
+        </p:txBody>
+      </p:sp>
+    </p:spTree>
+  </p:cSld>
+  <p:clrMapOvr>
+    <a:masterClrMapping/>
+  </p:clrMapOvr>
+</p:notes>
+</file>
+
+<file path=ppt/notesSlides/notesSlide6.xml><?xml version="1.0" encoding="utf-8"?>
+<p:notes xmlns:a="http://schemas.openxmlformats.org/drawingml/2006/main" xmlns:r="http://schemas.openxmlformats.org/officeDocument/2006/relationships" xmlns:mc="http://schemas.openxmlformats.org/markup-compatibility/2006" xmlns:mv="urn:schemas-microsoft-com:mac:vml" xmlns:p="http://schemas.openxmlformats.org/presentationml/2006/main" xmlns:c="http://schemas.openxmlformats.org/drawingml/2006/chart" xmlns:dgm="http://schemas.openxmlformats.org/drawingml/2006/diagram" xmlns:o="urn:schemas-microsoft-com:office:office" xmlns:v="urn:schemas-microsoft-com:vml" xmlns:pvml="urn:schemas-microsoft-com:office:powerpoint" xmlns:com="http://schemas.openxmlformats.org/drawingml/2006/compatibility" xmlns:p14="http://schemas.microsoft.com/office/powerpoint/2010/main" xmlns:p15="http://schemas.microsoft.com/office/powerpoint/2012/main" xmlns:ahyp="http://schemas.microsoft.com/office/drawing/2018/hyperlinkcolor" showMasterPhAnim="0" showMasterSp="0">
+  <p:cSld>
+    <p:spTree>
+      <p:nvGrpSpPr>
+        <p:cNvPr id="88" name="Shape 88"/>
+        <p:cNvGrpSpPr/>
+        <p:nvPr/>
+      </p:nvGrpSpPr>
+      <p:grpSpPr>
+        <a:xfrm>
+          <a:off x="0" y="0"/>
+          <a:ext cx="0" cy="0"/>
+          <a:chOff x="0" y="0"/>
+          <a:chExt cx="0" cy="0"/>
+        </a:xfrm>
+      </p:grpSpPr>
+      <p:sp>
+        <p:nvSpPr>
+          <p:cNvPr id="89" name="Google Shape;89;gaa1b166ed6_0_8:notes"/>
+          <p:cNvSpPr/>
+          <p:nvPr>
+            <p:ph idx="2" type="sldImg"/>
+          </p:nvPr>
+        </p:nvSpPr>
+        <p:spPr>
+          <a:xfrm>
+            <a:off x="381188" y="685800"/>
+            <a:ext cx="6096300" cy="3429000"/>
+          </a:xfrm>
+          <a:custGeom>
+            <a:rect b="b" l="l" r="r" t="t"/>
+            <a:pathLst>
+              <a:path extrusionOk="0" h="120000" w="120000">
+                <a:moveTo>
+                  <a:pt x="0" y="0"/>
+                </a:moveTo>
+                <a:lnTo>
+                  <a:pt x="120000" y="0"/>
+                </a:lnTo>
+                <a:lnTo>
+                  <a:pt x="120000" y="120000"/>
+                </a:lnTo>
+                <a:lnTo>
+                  <a:pt x="0" y="120000"/>
+                </a:lnTo>
+                <a:close/>
+              </a:path>
+            </a:pathLst>
+          </a:custGeom>
+        </p:spPr>
+      </p:sp>
+      <p:sp>
+        <p:nvSpPr>
+          <p:cNvPr id="90" name="Google Shape;90;gaa1b166ed6_0_8:notes"/>
+          <p:cNvSpPr txBox="1"/>
+          <p:nvPr>
+            <p:ph idx="1" type="body"/>
+          </p:nvPr>
+        </p:nvSpPr>
+        <p:spPr>
+          <a:xfrm>
+            <a:off x="685800" y="4343400"/>
+            <a:ext cx="5486400" cy="4114800"/>
+          </a:xfrm>
+          <a:prstGeom prst="rect">
+            <a:avLst/>
+          </a:prstGeom>
+        </p:spPr>
+        <p:txBody>
+          <a:bodyPr anchorCtr="0" anchor="t" bIns="91425" lIns="91425" spcFirstLastPara="1" rIns="91425" wrap="square" tIns="91425">
+            <a:noAutofit/>
+          </a:bodyPr>
+          <a:lstStyle/>
+          <a:p>
+            <a:pPr indent="0" lvl="0" marL="0" rtl="0" algn="l">
+              <a:spcBef>
+                <a:spcPts val="0"/>
+              </a:spcBef>
+              <a:spcAft>
+                <a:spcPts val="0"/>
+              </a:spcAft>
+              <a:buNone/>
+            </a:pPr>
+            <a:r>
+              <a:t/>
+            </a:r>
+            <a:endParaRPr/>
+          </a:p>
+        </p:txBody>
+      </p:sp>
+    </p:spTree>
+  </p:cSld>
+  <p:clrMapOvr>
+    <a:masterClrMapping/>
+  </p:clrMapOvr>
+</p:notes>
+</file>
+
+<file path=ppt/notesSlides/notesSlide7.xml><?xml version="1.0" encoding="utf-8"?>
+<p:notes xmlns:a="http://schemas.openxmlformats.org/drawingml/2006/main" xmlns:r="http://schemas.openxmlformats.org/officeDocument/2006/relationships" xmlns:mc="http://schemas.openxmlformats.org/markup-compatibility/2006" xmlns:mv="urn:schemas-microsoft-com:mac:vml" xmlns:p="http://schemas.openxmlformats.org/presentationml/2006/main" xmlns:c="http://schemas.openxmlformats.org/drawingml/2006/chart" xmlns:dgm="http://schemas.openxmlformats.org/drawingml/2006/diagram" xmlns:o="urn:schemas-microsoft-com:office:office" xmlns:v="urn:schemas-microsoft-com:vml" xmlns:pvml="urn:schemas-microsoft-com:office:powerpoint" xmlns:com="http://schemas.openxmlformats.org/drawingml/2006/compatibility" xmlns:p14="http://schemas.microsoft.com/office/powerpoint/2010/main" xmlns:p15="http://schemas.microsoft.com/office/powerpoint/2012/main" xmlns:ahyp="http://schemas.microsoft.com/office/drawing/2018/hyperlinkcolor" showMasterPhAnim="0" showMasterSp="0">
+  <p:cSld>
+    <p:spTree>
+      <p:nvGrpSpPr>
+        <p:cNvPr id="94" name="Shape 94"/>
+        <p:cNvGrpSpPr/>
+        <p:nvPr/>
+      </p:nvGrpSpPr>
+      <p:grpSpPr>
+        <a:xfrm>
+          <a:off x="0" y="0"/>
+          <a:ext cx="0" cy="0"/>
+          <a:chOff x="0" y="0"/>
+          <a:chExt cx="0" cy="0"/>
+        </a:xfrm>
+      </p:grpSpPr>
+      <p:sp>
+        <p:nvSpPr>
+          <p:cNvPr id="95" name="Google Shape;95;gaa1b166ed6_0_14:notes"/>
+          <p:cNvSpPr/>
+          <p:nvPr>
+            <p:ph idx="2" type="sldImg"/>
+          </p:nvPr>
+        </p:nvSpPr>
+        <p:spPr>
+          <a:xfrm>
+            <a:off x="381188" y="685800"/>
+            <a:ext cx="6096300" cy="3429000"/>
+          </a:xfrm>
+          <a:custGeom>
+            <a:rect b="b" l="l" r="r" t="t"/>
+            <a:pathLst>
+              <a:path extrusionOk="0" h="120000" w="120000">
+                <a:moveTo>
+                  <a:pt x="0" y="0"/>
+                </a:moveTo>
+                <a:lnTo>
+                  <a:pt x="120000" y="0"/>
+                </a:lnTo>
+                <a:lnTo>
+                  <a:pt x="120000" y="120000"/>
+                </a:lnTo>
+                <a:lnTo>
+                  <a:pt x="0" y="120000"/>
+                </a:lnTo>
+                <a:close/>
+              </a:path>
+            </a:pathLst>
+          </a:custGeom>
+        </p:spPr>
+      </p:sp>
+      <p:sp>
+        <p:nvSpPr>
+          <p:cNvPr id="96" name="Google Shape;96;gaa1b166ed6_0_14:notes"/>
+          <p:cNvSpPr txBox="1"/>
+          <p:nvPr>
+            <p:ph idx="1" type="body"/>
+          </p:nvPr>
+        </p:nvSpPr>
+        <p:spPr>
+          <a:xfrm>
+            <a:off x="685800" y="4343400"/>
+            <a:ext cx="5486400" cy="4114800"/>
+          </a:xfrm>
+          <a:prstGeom prst="rect">
+            <a:avLst/>
+          </a:prstGeom>
+        </p:spPr>
+        <p:txBody>
+          <a:bodyPr anchorCtr="0" anchor="t" bIns="91425" lIns="91425" spcFirstLastPara="1" rIns="91425" wrap="square" tIns="91425">
+            <a:noAutofit/>
+          </a:bodyPr>
+          <a:lstStyle/>
+          <a:p>
+            <a:pPr indent="0" lvl="0" marL="0" rtl="0" algn="l">
+              <a:spcBef>
+                <a:spcPts val="0"/>
+              </a:spcBef>
+              <a:spcAft>
+                <a:spcPts val="0"/>
+              </a:spcAft>
+              <a:buNone/>
+            </a:pPr>
+            <a:r>
+              <a:t/>
+            </a:r>
+            <a:endParaRPr/>
+          </a:p>
+        </p:txBody>
+      </p:sp>
+    </p:spTree>
+  </p:cSld>
+  <p:clrMapOvr>
+    <a:masterClrMapping/>
+  </p:clrMapOvr>
+</p:notes>
+</file>
+
+<file path=ppt/notesSlides/notesSlide8.xml><?xml version="1.0" encoding="utf-8"?>
+<p:notes xmlns:a="http://schemas.openxmlformats.org/drawingml/2006/main" xmlns:r="http://schemas.openxmlformats.org/officeDocument/2006/relationships" xmlns:mc="http://schemas.openxmlformats.org/markup-compatibility/2006" xmlns:mv="urn:schemas-microsoft-com:mac:vml" xmlns:p="http://schemas.openxmlformats.org/presentationml/2006/main" xmlns:c="http://schemas.openxmlformats.org/drawingml/2006/chart" xmlns:dgm="http://schemas.openxmlformats.org/drawingml/2006/diagram" xmlns:o="urn:schemas-microsoft-com:office:office" xmlns:v="urn:schemas-microsoft-com:vml" xmlns:pvml="urn:schemas-microsoft-com:office:powerpoint" xmlns:com="http://schemas.openxmlformats.org/drawingml/2006/compatibility" xmlns:p14="http://schemas.microsoft.com/office/powerpoint/2010/main" xmlns:p15="http://schemas.microsoft.com/office/powerpoint/2012/main" xmlns:ahyp="http://schemas.microsoft.com/office/drawing/2018/hyperlinkcolor" showMasterPhAnim="0" showMasterSp="0">
+  <p:cSld>
+    <p:spTree>
+      <p:nvGrpSpPr>
+        <p:cNvPr id="108" name="Shape 108"/>
+        <p:cNvGrpSpPr/>
+        <p:nvPr/>
+      </p:nvGrpSpPr>
+      <p:grpSpPr>
+        <a:xfrm>
+          <a:off x="0" y="0"/>
+          <a:ext cx="0" cy="0"/>
+          <a:chOff x="0" y="0"/>
+          <a:chExt cx="0" cy="0"/>
+        </a:xfrm>
+      </p:grpSpPr>
+      <p:sp>
+        <p:nvSpPr>
+          <p:cNvPr id="109" name="Google Shape;109;gaa1b166ed6_0_28:notes"/>
+          <p:cNvSpPr/>
+          <p:nvPr>
+            <p:ph idx="2" type="sldImg"/>
+          </p:nvPr>
+        </p:nvSpPr>
+        <p:spPr>
+          <a:xfrm>
+            <a:off x="381188" y="685800"/>
+            <a:ext cx="6096300" cy="3429000"/>
+          </a:xfrm>
+          <a:custGeom>
+            <a:rect b="b" l="l" r="r" t="t"/>
+            <a:pathLst>
+              <a:path extrusionOk="0" h="120000" w="120000">
+                <a:moveTo>
+                  <a:pt x="0" y="0"/>
+                </a:moveTo>
+                <a:lnTo>
+                  <a:pt x="120000" y="0"/>
+                </a:lnTo>
+                <a:lnTo>
+                  <a:pt x="120000" y="120000"/>
+                </a:lnTo>
+                <a:lnTo>
+                  <a:pt x="0" y="120000"/>
+                </a:lnTo>
+                <a:close/>
+              </a:path>
+            </a:pathLst>
+          </a:custGeom>
+        </p:spPr>
+      </p:sp>
+      <p:sp>
+        <p:nvSpPr>
+          <p:cNvPr id="110" name="Google Shape;110;gaa1b166ed6_0_28:notes"/>
+          <p:cNvSpPr txBox="1"/>
+          <p:nvPr>
+            <p:ph idx="1" type="body"/>
+          </p:nvPr>
+        </p:nvSpPr>
+        <p:spPr>
+          <a:xfrm>
+            <a:off x="685800" y="4343400"/>
+            <a:ext cx="5486400" cy="4114800"/>
+          </a:xfrm>
+          <a:prstGeom prst="rect">
+            <a:avLst/>
+          </a:prstGeom>
+        </p:spPr>
+        <p:txBody>
+          <a:bodyPr anchorCtr="0" anchor="t" bIns="91425" lIns="91425" spcFirstLastPara="1" rIns="91425" wrap="square" tIns="91425">
+            <a:noAutofit/>
+          </a:bodyPr>
+          <a:lstStyle/>
+          <a:p>
+            <a:pPr indent="0" lvl="0" marL="0" rtl="0" algn="l">
+              <a:spcBef>
+                <a:spcPts val="0"/>
+              </a:spcBef>
+              <a:spcAft>
+                <a:spcPts val="0"/>
+              </a:spcAft>
+              <a:buNone/>
+            </a:pPr>
+            <a:r>
+              <a:t/>
+            </a:r>
+            <a:endParaRPr/>
+          </a:p>
+        </p:txBody>
+      </p:sp>
+    </p:spTree>
+  </p:cSld>
+  <p:clrMapOvr>
+    <a:masterClrMapping/>
+  </p:clrMapOvr>
+</p:notes>
+</file>
+
+<file path=ppt/notesSlides/notesSlide9.xml><?xml version="1.0" encoding="utf-8"?>
+<p:notes xmlns:a="http://schemas.openxmlformats.org/drawingml/2006/main" xmlns:r="http://schemas.openxmlformats.org/officeDocument/2006/relationships" xmlns:mc="http://schemas.openxmlformats.org/markup-compatibility/2006" xmlns:mv="urn:schemas-microsoft-com:mac:vml" xmlns:p="http://schemas.openxmlformats.org/presentationml/2006/main" xmlns:c="http://schemas.openxmlformats.org/drawingml/2006/chart" xmlns:dgm="http://schemas.openxmlformats.org/drawingml/2006/diagram" xmlns:o="urn:schemas-microsoft-com:office:office" xmlns:v="urn:schemas-microsoft-com:vml" xmlns:pvml="urn:schemas-microsoft-com:office:powerpoint" xmlns:com="http://schemas.openxmlformats.org/drawingml/2006/compatibility" xmlns:p14="http://schemas.microsoft.com/office/powerpoint/2010/main" xmlns:p15="http://schemas.microsoft.com/office/powerpoint/2012/main" xmlns:ahyp="http://schemas.microsoft.com/office/drawing/2018/hyperlinkcolor" showMasterPhAnim="0" showMasterSp="0">
+  <p:cSld>
+    <p:spTree>
+      <p:nvGrpSpPr>
+        <p:cNvPr id="114" name="Shape 114"/>
+        <p:cNvGrpSpPr/>
+        <p:nvPr/>
+      </p:nvGrpSpPr>
+      <p:grpSpPr>
+        <a:xfrm>
+          <a:off x="0" y="0"/>
+          <a:ext cx="0" cy="0"/>
+          <a:chOff x="0" y="0"/>
+          <a:chExt cx="0" cy="0"/>
+        </a:xfrm>
+      </p:grpSpPr>
+      <p:sp>
+        <p:nvSpPr>
+          <p:cNvPr id="115" name="Google Shape;115;gaa1b166ed6_0_42:notes"/>
+          <p:cNvSpPr/>
+          <p:nvPr>
+            <p:ph idx="2" type="sldImg"/>
+          </p:nvPr>
+        </p:nvSpPr>
+        <p:spPr>
+          <a:xfrm>
+            <a:off x="381188" y="685800"/>
+            <a:ext cx="6096300" cy="3429000"/>
+          </a:xfrm>
+          <a:custGeom>
+            <a:rect b="b" l="l" r="r" t="t"/>
+            <a:pathLst>
+              <a:path extrusionOk="0" h="120000" w="120000">
+                <a:moveTo>
+                  <a:pt x="0" y="0"/>
+                </a:moveTo>
+                <a:lnTo>
+                  <a:pt x="120000" y="0"/>
+                </a:lnTo>
+                <a:lnTo>
+                  <a:pt x="120000" y="120000"/>
+                </a:lnTo>
+                <a:lnTo>
+                  <a:pt x="0" y="120000"/>
+                </a:lnTo>
+                <a:close/>
+              </a:path>
+            </a:pathLst>
+          </a:custGeom>
+        </p:spPr>
+      </p:sp>
+      <p:sp>
+        <p:nvSpPr>
+          <p:cNvPr id="116" name="Google Shape;116;gaa1b166ed6_0_42:notes"/>
           <p:cNvSpPr txBox="1"/>
           <p:nvPr>
             <p:ph idx="1" type="body"/>
@@ -6652,6 +7752,1440 @@
 </p:sld>
 </file>
 
+<file path=ppt/slides/slide10.xml><?xml version="1.0" encoding="utf-8"?>
+<p:sld xmlns:a="http://schemas.openxmlformats.org/drawingml/2006/main" xmlns:r="http://schemas.openxmlformats.org/officeDocument/2006/relationships" xmlns:mc="http://schemas.openxmlformats.org/markup-compatibility/2006" xmlns:mv="urn:schemas-microsoft-com:mac:vml" xmlns:p="http://schemas.openxmlformats.org/presentationml/2006/main" xmlns:c="http://schemas.openxmlformats.org/drawingml/2006/chart" xmlns:dgm="http://schemas.openxmlformats.org/drawingml/2006/diagram" xmlns:o="urn:schemas-microsoft-com:office:office" xmlns:v="urn:schemas-microsoft-com:vml" xmlns:pvml="urn:schemas-microsoft-com:office:powerpoint" xmlns:com="http://schemas.openxmlformats.org/drawingml/2006/compatibility" xmlns:p14="http://schemas.microsoft.com/office/powerpoint/2010/main" xmlns:p15="http://schemas.microsoft.com/office/powerpoint/2012/main" xmlns:ahyp="http://schemas.microsoft.com/office/drawing/2018/hyperlinkcolor">
+  <p:cSld>
+    <p:spTree>
+      <p:nvGrpSpPr>
+        <p:cNvPr id="123" name="Shape 123"/>
+        <p:cNvGrpSpPr/>
+        <p:nvPr/>
+      </p:nvGrpSpPr>
+      <p:grpSpPr>
+        <a:xfrm>
+          <a:off x="0" y="0"/>
+          <a:ext cx="0" cy="0"/>
+          <a:chOff x="0" y="0"/>
+          <a:chExt cx="0" cy="0"/>
+        </a:xfrm>
+      </p:grpSpPr>
+      <p:sp>
+        <p:nvSpPr>
+          <p:cNvPr id="124" name="Google Shape;124;p22"/>
+          <p:cNvSpPr txBox="1"/>
+          <p:nvPr>
+            <p:ph type="title"/>
+          </p:nvPr>
+        </p:nvSpPr>
+        <p:spPr>
+          <a:xfrm>
+            <a:off x="311700" y="292850"/>
+            <a:ext cx="8520600" cy="801000"/>
+          </a:xfrm>
+          <a:prstGeom prst="rect">
+            <a:avLst/>
+          </a:prstGeom>
+        </p:spPr>
+        <p:txBody>
+          <a:bodyPr anchorCtr="0" anchor="t" bIns="91425" lIns="91425" spcFirstLastPara="1" rIns="91425" wrap="square" tIns="91425">
+            <a:noAutofit/>
+          </a:bodyPr>
+          <a:lstStyle/>
+          <a:p>
+            <a:pPr indent="0" lvl="0" marL="0" rtl="0" algn="l">
+              <a:spcBef>
+                <a:spcPts val="0"/>
+              </a:spcBef>
+              <a:spcAft>
+                <a:spcPts val="0"/>
+              </a:spcAft>
+              <a:buNone/>
+            </a:pPr>
+            <a:r>
+              <a:rPr lang="es"/>
+              <a:t>repaso de probabilidad</a:t>
+            </a:r>
+            <a:endParaRPr/>
+          </a:p>
+        </p:txBody>
+      </p:sp>
+      <p:pic>
+        <p:nvPicPr>
+          <p:cNvPr descr="&lt;math xmlns=&quot;http://www.w3.org/1998/Math/MathML&quot;&gt;&lt;msub&gt;&lt;mi&gt;P&lt;/mi&gt;&lt;mrow&gt;&lt;mi&gt;c&lt;/mi&gt;&lt;mi&gt;a&lt;/mi&gt;&lt;mi&gt;r&lt;/mi&gt;&lt;mi&gt;a&lt;/mi&gt;&lt;mo&gt;&amp;#xA0;&lt;/mo&gt;&lt;/mrow&gt;&lt;/msub&gt;&lt;mo&gt;=&lt;/mo&gt;&lt;mo&gt;&amp;#xA0;&lt;/mo&gt;&lt;mfrac&gt;&lt;mn&gt;1&lt;/mn&gt;&lt;mn&gt;2&lt;/mn&gt;&lt;/mfrac&gt;&lt;mo&gt;=&lt;/mo&gt;&lt;mn&gt;0&lt;/mn&gt;&lt;mo&gt;.&lt;/mo&gt;&lt;mn&gt;5&lt;/mn&gt;&lt;mspace linebreak=&quot;newline&quot;/&gt;&lt;/math&gt;" id="125" name="Google Shape;125;p22" title="P subscript c a r a space end subscript equals space 1 half equals 0.5&#10;"/>
+          <p:cNvPicPr preferRelativeResize="0"/>
+          <p:nvPr/>
+        </p:nvPicPr>
+        <p:blipFill>
+          <a:blip r:embed="rId3">
+            <a:alphaModFix/>
+          </a:blip>
+          <a:stretch>
+            <a:fillRect/>
+          </a:stretch>
+        </p:blipFill>
+        <p:spPr>
+          <a:xfrm>
+            <a:off x="1437671" y="1562100"/>
+            <a:ext cx="1752007" cy="583150"/>
+          </a:xfrm>
+          <a:prstGeom prst="rect">
+            <a:avLst/>
+          </a:prstGeom>
+          <a:noFill/>
+          <a:ln>
+            <a:noFill/>
+          </a:ln>
+        </p:spPr>
+      </p:pic>
+      <p:sp>
+        <p:nvSpPr>
+          <p:cNvPr id="126" name="Google Shape;126;p22"/>
+          <p:cNvSpPr txBox="1"/>
+          <p:nvPr>
+            <p:ph idx="1" type="body"/>
+          </p:nvPr>
+        </p:nvSpPr>
+        <p:spPr>
+          <a:xfrm>
+            <a:off x="254850" y="2685425"/>
+            <a:ext cx="3167100" cy="2110500"/>
+          </a:xfrm>
+          <a:prstGeom prst="rect">
+            <a:avLst/>
+          </a:prstGeom>
+        </p:spPr>
+        <p:txBody>
+          <a:bodyPr anchorCtr="0" anchor="t" bIns="91425" lIns="91425" spcFirstLastPara="1" rIns="91425" wrap="square" tIns="91425">
+            <a:noAutofit/>
+          </a:bodyPr>
+          <a:lstStyle/>
+          <a:p>
+            <a:pPr indent="0" lvl="0" marL="0" rtl="0" algn="just">
+              <a:spcBef>
+                <a:spcPts val="0"/>
+              </a:spcBef>
+              <a:spcAft>
+                <a:spcPts val="0"/>
+              </a:spcAft>
+              <a:buNone/>
+            </a:pPr>
+            <a:r>
+              <a:t/>
+            </a:r>
+            <a:endParaRPr sz="1500">
+              <a:solidFill>
+                <a:srgbClr val="1D2129"/>
+              </a:solidFill>
+              <a:highlight>
+                <a:srgbClr val="FFFFFF"/>
+              </a:highlight>
+            </a:endParaRPr>
+          </a:p>
+          <a:p>
+            <a:pPr indent="0" lvl="0" marL="0" rtl="0" algn="just">
+              <a:spcBef>
+                <a:spcPts val="1600"/>
+              </a:spcBef>
+              <a:spcAft>
+                <a:spcPts val="0"/>
+              </a:spcAft>
+              <a:buNone/>
+            </a:pPr>
+            <a:r>
+              <a:t/>
+            </a:r>
+            <a:endParaRPr sz="1500">
+              <a:solidFill>
+                <a:srgbClr val="1D2129"/>
+              </a:solidFill>
+              <a:highlight>
+                <a:srgbClr val="FFFFFF"/>
+              </a:highlight>
+            </a:endParaRPr>
+          </a:p>
+          <a:p>
+            <a:pPr indent="0" lvl="0" marL="0" rtl="0" algn="just">
+              <a:spcBef>
+                <a:spcPts val="1600"/>
+              </a:spcBef>
+              <a:spcAft>
+                <a:spcPts val="1600"/>
+              </a:spcAft>
+              <a:buNone/>
+            </a:pPr>
+            <a:r>
+              <a:t/>
+            </a:r>
+            <a:endParaRPr sz="1500">
+              <a:solidFill>
+                <a:srgbClr val="1D2129"/>
+              </a:solidFill>
+              <a:highlight>
+                <a:srgbClr val="FFFFFF"/>
+              </a:highlight>
+            </a:endParaRPr>
+          </a:p>
+        </p:txBody>
+      </p:sp>
+      <p:pic>
+        <p:nvPicPr>
+          <p:cNvPr descr="&lt;math xmlns=&quot;http://www.w3.org/1998/Math/MathML&quot;&gt;&lt;msub&gt;&lt;mi&gt;P&lt;/mi&gt;&lt;mrow&gt;&lt;mn&gt;2&lt;/mn&gt;&lt;mo&gt;,&lt;/mo&gt;&lt;mn&gt;4&lt;/mn&gt;&lt;mo&gt;&amp;#xA0;&lt;/mo&gt;&lt;/mrow&gt;&lt;/msub&gt;&lt;mo&gt;=&lt;/mo&gt;&lt;mfrac&gt;&lt;mn&gt;2&lt;/mn&gt;&lt;mn&gt;6&lt;/mn&gt;&lt;/mfrac&gt;&lt;mo&gt;=&lt;/mo&gt;&lt;mn&gt;0&lt;/mn&gt;&lt;mo&gt;.&lt;/mo&gt;&lt;mn&gt;333&lt;/mn&gt;&lt;mo&gt;.&lt;/mo&gt;&lt;mo&gt;.&lt;/mo&gt;&lt;mo&gt;.&lt;/mo&gt;&lt;/math&gt;" id="127" name="Google Shape;127;p22" title="P subscript 2 comma 4 space end subscript equals 2 over 6 equals 0.333..."/>
+          <p:cNvPicPr preferRelativeResize="0"/>
+          <p:nvPr/>
+        </p:nvPicPr>
+        <p:blipFill>
+          <a:blip r:embed="rId4">
+            <a:alphaModFix/>
+          </a:blip>
+          <a:stretch>
+            <a:fillRect/>
+          </a:stretch>
+        </p:blipFill>
+        <p:spPr>
+          <a:xfrm>
+            <a:off x="5008560" y="1559550"/>
+            <a:ext cx="2450166" cy="661900"/>
+          </a:xfrm>
+          <a:prstGeom prst="rect">
+            <a:avLst/>
+          </a:prstGeom>
+          <a:noFill/>
+          <a:ln>
+            <a:noFill/>
+          </a:ln>
+        </p:spPr>
+      </p:pic>
+      <p:sp>
+        <p:nvSpPr>
+          <p:cNvPr id="128" name="Google Shape;128;p22"/>
+          <p:cNvSpPr txBox="1"/>
+          <p:nvPr>
+            <p:ph type="title"/>
+          </p:nvPr>
+        </p:nvSpPr>
+        <p:spPr>
+          <a:xfrm>
+            <a:off x="387900" y="2731250"/>
+            <a:ext cx="8520600" cy="801000"/>
+          </a:xfrm>
+          <a:prstGeom prst="rect">
+            <a:avLst/>
+          </a:prstGeom>
+        </p:spPr>
+        <p:txBody>
+          <a:bodyPr anchorCtr="0" anchor="t" bIns="91425" lIns="91425" spcFirstLastPara="1" rIns="91425" wrap="square" tIns="91425">
+            <a:noAutofit/>
+          </a:bodyPr>
+          <a:lstStyle/>
+          <a:p>
+            <a:pPr indent="0" lvl="0" marL="0" rtl="0" algn="l">
+              <a:spcBef>
+                <a:spcPts val="0"/>
+              </a:spcBef>
+              <a:spcAft>
+                <a:spcPts val="0"/>
+              </a:spcAft>
+              <a:buNone/>
+            </a:pPr>
+            <a:r>
+              <a:rPr lang="es"/>
+              <a:t>odds</a:t>
+            </a:r>
+            <a:endParaRPr/>
+          </a:p>
+        </p:txBody>
+      </p:sp>
+      <p:pic>
+        <p:nvPicPr>
+          <p:cNvPr descr="&lt;math xmlns=&quot;http://www.w3.org/1998/Math/MathML&quot;&gt;&lt;mi&gt;o&lt;/mi&gt;&lt;mi&gt;d&lt;/mi&gt;&lt;mi&gt;d&lt;/mi&gt;&lt;mi&gt;s&lt;/mi&gt;&lt;mo&gt;&amp;#xA0;&lt;/mo&gt;&lt;mo&gt;=&lt;/mo&gt;&lt;mfrac&gt;&lt;mrow&gt;&lt;mi&gt;P&lt;/mi&gt;&lt;mfenced&gt;&lt;mrow&gt;&lt;mi&gt;e&lt;/mi&gt;&lt;mi&gt;v&lt;/mi&gt;&lt;mi&gt;e&lt;/mi&gt;&lt;mi&gt;n&lt;/mi&gt;&lt;mi&gt;t&lt;/mi&gt;&lt;mi&gt;o&lt;/mi&gt;&lt;mo&gt;&amp;#xA0;&lt;/mo&gt;&lt;mi&gt;o&lt;/mi&gt;&lt;mi&gt;c&lt;/mi&gt;&lt;mi&gt;u&lt;/mi&gt;&lt;mi&gt;r&lt;/mi&gt;&lt;mi&gt;r&lt;/mi&gt;&lt;mi&gt;e&lt;/mi&gt;&lt;/mrow&gt;&lt;/mfenced&gt;&lt;/mrow&gt;&lt;mrow&gt;&lt;mi&gt;P&lt;/mi&gt;&lt;mfenced&gt;&lt;mrow&gt;&lt;mi&gt;e&lt;/mi&gt;&lt;mi&gt;v&lt;/mi&gt;&lt;mi&gt;e&lt;/mi&gt;&lt;mi&gt;n&lt;/mi&gt;&lt;mi&gt;t&lt;/mi&gt;&lt;mi&gt;o&lt;/mi&gt;&lt;mo&gt;&amp;#xA0;&lt;/mo&gt;&lt;mi&gt;n&lt;/mi&gt;&lt;mi&gt;o&lt;/mi&gt;&lt;mo&gt;&amp;#xA0;&lt;/mo&gt;&lt;mi&gt;o&lt;/mi&gt;&lt;mi&gt;c&lt;/mi&gt;&lt;mi&gt;u&lt;/mi&gt;&lt;mi&gt;r&lt;/mi&gt;&lt;mi&gt;r&lt;/mi&gt;&lt;mi&gt;e&lt;/mi&gt;&lt;/mrow&gt;&lt;/mfenced&gt;&lt;/mrow&gt;&lt;/mfrac&gt;&lt;mo&gt;=&lt;/mo&gt;&lt;mo&gt;&amp;#xA0;&lt;/mo&gt;&lt;mfrac&gt;&lt;mrow&gt;&lt;mi&gt;P&lt;/mi&gt;&lt;mfenced&gt;&lt;mrow&gt;&lt;mi&gt;e&lt;/mi&gt;&lt;mi&gt;v&lt;/mi&gt;&lt;mi&gt;e&lt;/mi&gt;&lt;mi&gt;n&lt;/mi&gt;&lt;mi&gt;t&lt;/mi&gt;&lt;mi&gt;o&lt;/mi&gt;&lt;mo&gt;&amp;#xA0;&lt;/mo&gt;&lt;mi&gt;o&lt;/mi&gt;&lt;mi&gt;c&lt;/mi&gt;&lt;mi&gt;u&lt;/mi&gt;&lt;mi&gt;r&lt;/mi&gt;&lt;mi&gt;r&lt;/mi&gt;&lt;mi&gt;e&lt;/mi&gt;&lt;/mrow&gt;&lt;/mfenced&gt;&lt;/mrow&gt;&lt;mrow&gt;&lt;mn&gt;1&lt;/mn&gt;&lt;mo&gt;-&lt;/mo&gt;&lt;mi&gt;P&lt;/mi&gt;&lt;mfenced&gt;&lt;mrow&gt;&lt;mi&gt;e&lt;/mi&gt;&lt;mi&gt;v&lt;/mi&gt;&lt;mi&gt;e&lt;/mi&gt;&lt;mi&gt;n&lt;/mi&gt;&lt;mi&gt;t&lt;/mi&gt;&lt;mi&gt;o&lt;/mi&gt;&lt;mo&gt;&amp;#xA0;&lt;/mo&gt;&lt;mi&gt;o&lt;/mi&gt;&lt;mi&gt;c&lt;/mi&gt;&lt;mi&gt;u&lt;/mi&gt;&lt;mi&gt;r&lt;/mi&gt;&lt;mi&gt;r&lt;/mi&gt;&lt;mi&gt;e&lt;/mi&gt;&lt;/mrow&gt;&lt;/mfenced&gt;&lt;/mrow&gt;&lt;/mfrac&gt;&lt;/math&gt;" id="129" name="Google Shape;129;p22" title="o d d s space equals fraction numerator P open parentheses e v e n t o space o c u r r e close parentheses over denominator P open parentheses e v e n t o space n o space o c u r r e close parentheses end fraction equals space fraction numerator P open parentheses e v e n t o space o c u r r e close parentheses over denominator 1 minus P open parentheses e v e n t o space o c u r r e close parentheses end fraction"/>
+          <p:cNvPicPr preferRelativeResize="0"/>
+          <p:nvPr/>
+        </p:nvPicPr>
+        <p:blipFill>
+          <a:blip r:embed="rId5">
+            <a:alphaModFix/>
+          </a:blip>
+          <a:stretch>
+            <a:fillRect/>
+          </a:stretch>
+        </p:blipFill>
+        <p:spPr>
+          <a:xfrm>
+            <a:off x="2819400" y="2762522"/>
+            <a:ext cx="6113224" cy="661900"/>
+          </a:xfrm>
+          <a:prstGeom prst="rect">
+            <a:avLst/>
+          </a:prstGeom>
+          <a:noFill/>
+          <a:ln>
+            <a:noFill/>
+          </a:ln>
+        </p:spPr>
+      </p:pic>
+      <p:pic>
+        <p:nvPicPr>
+          <p:cNvPr descr="&lt;math xmlns=&quot;http://www.w3.org/1998/Math/MathML&quot;&gt;&lt;mi&gt;P&lt;/mi&gt;&lt;mfenced&gt;&lt;mrow&gt;&lt;mi&gt;e&lt;/mi&gt;&lt;mi&gt;v&lt;/mi&gt;&lt;mi&gt;e&lt;/mi&gt;&lt;mi&gt;n&lt;/mi&gt;&lt;mi&gt;t&lt;/mi&gt;&lt;mi&gt;o&lt;/mi&gt;&lt;/mrow&gt;&lt;/mfenced&gt;&lt;mo&gt;=&lt;/mo&gt;&lt;mfrac&gt;&lt;mrow&gt;&lt;mi&gt;s&lt;/mi&gt;&lt;mi&gt;a&lt;/mi&gt;&lt;mi&gt;l&lt;/mi&gt;&lt;mi&gt;i&lt;/mi&gt;&lt;mi&gt;d&lt;/mi&gt;&lt;mi&gt;a&lt;/mi&gt;&lt;mi&gt;s&lt;/mi&gt;&lt;mo&gt;&amp;#xA0;&lt;/mo&gt;&lt;mi&gt;i&lt;/mi&gt;&lt;mi&gt;g&lt;/mi&gt;&lt;mi&gt;u&lt;/mi&gt;&lt;mi&gt;a&lt;/mi&gt;&lt;mi&gt;l&lt;/mi&gt;&lt;mi&gt;e&lt;/mi&gt;&lt;mi&gt;s&lt;/mi&gt;&lt;mo&gt;&amp;#xA0;&lt;/mo&gt;&lt;mi&gt;a&lt;/mi&gt;&lt;mi&gt;l&lt;/mi&gt;&lt;mo&gt;&amp;#xA0;&lt;/mo&gt;&lt;mi&gt;e&lt;/mi&gt;&lt;mi&gt;v&lt;/mi&gt;&lt;mi&gt;e&lt;/mi&gt;&lt;mi&gt;n&lt;/mi&gt;&lt;mi&gt;t&lt;/mi&gt;&lt;mi&gt;o&lt;/mi&gt;&lt;/mrow&gt;&lt;mrow&gt;&lt;mi&gt;t&lt;/mi&gt;&lt;mi&gt;o&lt;/mi&gt;&lt;mi&gt;d&lt;/mi&gt;&lt;mi&gt;a&lt;/mi&gt;&lt;mi&gt;s&lt;/mi&gt;&lt;mo&gt;&amp;#xA0;&lt;/mo&gt;&lt;mi&gt;l&lt;/mi&gt;&lt;mi&gt;a&lt;/mi&gt;&lt;mi&gt;s&lt;/mi&gt;&lt;mo&gt;&amp;#xA0;&lt;/mo&gt;&lt;mi&gt;s&lt;/mi&gt;&lt;mi&gt;a&lt;/mi&gt;&lt;mi&gt;l&lt;/mi&gt;&lt;mi&gt;i&lt;/mi&gt;&lt;mi&gt;d&lt;/mi&gt;&lt;mi&gt;a&lt;/mi&gt;&lt;mi&gt;s&lt;/mi&gt;&lt;mo&gt;&amp;#xA0;&lt;/mo&gt;&lt;mi&gt;p&lt;/mi&gt;&lt;mi&gt;o&lt;/mi&gt;&lt;mi&gt;s&lt;/mi&gt;&lt;mi&gt;i&lt;/mi&gt;&lt;mi&gt;b&lt;/mi&gt;&lt;mi&gt;l&lt;/mi&gt;&lt;mi&gt;e&lt;/mi&gt;&lt;mi&gt;s&lt;/mi&gt;&lt;/mrow&gt;&lt;/mfrac&gt;&lt;/math&gt;" id="130" name="Google Shape;130;p22" title="P open parentheses e v e n t o close parentheses equals fraction numerator s a l i d a s space i g u a l e s space a l space e v e n t o over denominator t o d a s space l a s space s a l i d a s space p o s i b l e s end fraction"/>
+          <p:cNvPicPr preferRelativeResize="0"/>
+          <p:nvPr/>
+        </p:nvPicPr>
+        <p:blipFill>
+          <a:blip r:embed="rId6">
+            <a:alphaModFix/>
+          </a:blip>
+          <a:stretch>
+            <a:fillRect/>
+          </a:stretch>
+        </p:blipFill>
+        <p:spPr>
+          <a:xfrm>
+            <a:off x="4267201" y="429469"/>
+            <a:ext cx="4343399" cy="659757"/>
+          </a:xfrm>
+          <a:prstGeom prst="rect">
+            <a:avLst/>
+          </a:prstGeom>
+          <a:noFill/>
+          <a:ln>
+            <a:noFill/>
+          </a:ln>
+        </p:spPr>
+      </p:pic>
+      <p:pic>
+        <p:nvPicPr>
+          <p:cNvPr descr="&lt;math xmlns=&quot;http://www.w3.org/1998/Math/MathML&quot;&gt;&lt;mi&gt;O&lt;/mi&gt;&lt;mi&gt;d&lt;/mi&gt;&lt;msub&gt;&lt;mi&gt;d&lt;/mi&gt;&lt;mrow&gt;&lt;mi&gt;c&lt;/mi&gt;&lt;mi&gt;a&lt;/mi&gt;&lt;mi&gt;r&lt;/mi&gt;&lt;mi&gt;a&lt;/mi&gt;&lt;/mrow&gt;&lt;/msub&gt;&lt;mo&gt;=&lt;/mo&gt;&lt;mfrac&gt;&lt;mrow&gt;&lt;mn&gt;0&lt;/mn&gt;&lt;mo&gt;.&lt;/mo&gt;&lt;mn&gt;5&lt;/mn&gt;&lt;/mrow&gt;&lt;mrow&gt;&lt;mn&gt;0&lt;/mn&gt;&lt;mo&gt;.&lt;/mo&gt;&lt;mn&gt;5&lt;/mn&gt;&lt;/mrow&gt;&lt;/mfrac&gt;&lt;mo&gt;=&lt;/mo&gt;&lt;mn&gt;1&lt;/mn&gt;&lt;/math&gt;" id="131" name="Google Shape;131;p22" title="O d d subscript c a r a end subscript equals fraction numerator 0.5 over denominator 0.5 end fraction equals 1"/>
+          <p:cNvPicPr preferRelativeResize="0"/>
+          <p:nvPr/>
+        </p:nvPicPr>
+        <p:blipFill>
+          <a:blip r:embed="rId7">
+            <a:alphaModFix/>
+          </a:blip>
+          <a:stretch>
+            <a:fillRect/>
+          </a:stretch>
+        </p:blipFill>
+        <p:spPr>
+          <a:xfrm>
+            <a:off x="1335310" y="3907725"/>
+            <a:ext cx="2169891" cy="661900"/>
+          </a:xfrm>
+          <a:prstGeom prst="rect">
+            <a:avLst/>
+          </a:prstGeom>
+          <a:noFill/>
+          <a:ln>
+            <a:noFill/>
+          </a:ln>
+        </p:spPr>
+      </p:pic>
+      <p:pic>
+        <p:nvPicPr>
+          <p:cNvPr descr="&lt;math xmlns=&quot;http://www.w3.org/1998/Math/MathML&quot;&gt;&lt;mi&gt;O&lt;/mi&gt;&lt;mi&gt;d&lt;/mi&gt;&lt;msub&gt;&lt;mi&gt;d&lt;/mi&gt;&lt;mrow&gt;&lt;mn&gt;2&lt;/mn&gt;&lt;mo&gt;,&lt;/mo&gt;&lt;mn&gt;4&lt;/mn&gt;&lt;/mrow&gt;&lt;/msub&gt;&lt;mo&gt;=&lt;/mo&gt;&lt;mfrac&gt;&lt;mrow&gt;&lt;mn&gt;0&lt;/mn&gt;&lt;mo&gt;.&lt;/mo&gt;&lt;mn&gt;333&lt;/mn&gt;&lt;/mrow&gt;&lt;mrow&gt;&lt;mn&gt;0&lt;/mn&gt;&lt;mo&gt;.&lt;/mo&gt;&lt;mn&gt;666&lt;/mn&gt;&lt;/mrow&gt;&lt;/mfrac&gt;&lt;mo&gt;=&lt;/mo&gt;&lt;mn&gt;0&lt;/mn&gt;&lt;mo&gt;.&lt;/mo&gt;&lt;mn&gt;5&lt;/mn&gt;&lt;/math&gt;" id="132" name="Google Shape;132;p22" title="O d d subscript 2 comma 4 end subscript equals fraction numerator 0.333 over denominator 0.666 end fraction equals 0.5"/>
+          <p:cNvPicPr preferRelativeResize="0"/>
+          <p:nvPr/>
+        </p:nvPicPr>
+        <p:blipFill>
+          <a:blip r:embed="rId8">
+            <a:alphaModFix/>
+          </a:blip>
+          <a:stretch>
+            <a:fillRect/>
+          </a:stretch>
+        </p:blipFill>
+        <p:spPr>
+          <a:xfrm>
+            <a:off x="4831268" y="3954300"/>
+            <a:ext cx="2641810" cy="661900"/>
+          </a:xfrm>
+          <a:prstGeom prst="rect">
+            <a:avLst/>
+          </a:prstGeom>
+          <a:noFill/>
+          <a:ln>
+            <a:noFill/>
+          </a:ln>
+        </p:spPr>
+      </p:pic>
+    </p:spTree>
+  </p:cSld>
+  <p:clrMapOvr>
+    <a:masterClrMapping/>
+  </p:clrMapOvr>
+</p:sld>
+</file>
+
+<file path=ppt/slides/slide11.xml><?xml version="1.0" encoding="utf-8"?>
+<p:sld xmlns:a="http://schemas.openxmlformats.org/drawingml/2006/main" xmlns:r="http://schemas.openxmlformats.org/officeDocument/2006/relationships" xmlns:mc="http://schemas.openxmlformats.org/markup-compatibility/2006" xmlns:mv="urn:schemas-microsoft-com:mac:vml" xmlns:p="http://schemas.openxmlformats.org/presentationml/2006/main" xmlns:c="http://schemas.openxmlformats.org/drawingml/2006/chart" xmlns:dgm="http://schemas.openxmlformats.org/drawingml/2006/diagram" xmlns:o="urn:schemas-microsoft-com:office:office" xmlns:v="urn:schemas-microsoft-com:vml" xmlns:pvml="urn:schemas-microsoft-com:office:powerpoint" xmlns:com="http://schemas.openxmlformats.org/drawingml/2006/compatibility" xmlns:p14="http://schemas.microsoft.com/office/powerpoint/2010/main" xmlns:p15="http://schemas.microsoft.com/office/powerpoint/2012/main" xmlns:ahyp="http://schemas.microsoft.com/office/drawing/2018/hyperlinkcolor">
+  <p:cSld>
+    <p:spTree>
+      <p:nvGrpSpPr>
+        <p:cNvPr id="136" name="Shape 136"/>
+        <p:cNvGrpSpPr/>
+        <p:nvPr/>
+      </p:nvGrpSpPr>
+      <p:grpSpPr>
+        <a:xfrm>
+          <a:off x="0" y="0"/>
+          <a:ext cx="0" cy="0"/>
+          <a:chOff x="0" y="0"/>
+          <a:chExt cx="0" cy="0"/>
+        </a:xfrm>
+      </p:grpSpPr>
+      <p:sp>
+        <p:nvSpPr>
+          <p:cNvPr id="137" name="Google Shape;137;p23"/>
+          <p:cNvSpPr txBox="1"/>
+          <p:nvPr>
+            <p:ph type="title"/>
+          </p:nvPr>
+        </p:nvSpPr>
+        <p:spPr>
+          <a:xfrm>
+            <a:off x="311700" y="292850"/>
+            <a:ext cx="8520600" cy="801000"/>
+          </a:xfrm>
+          <a:prstGeom prst="rect">
+            <a:avLst/>
+          </a:prstGeom>
+        </p:spPr>
+        <p:txBody>
+          <a:bodyPr anchorCtr="0" anchor="t" bIns="91425" lIns="91425" spcFirstLastPara="1" rIns="91425" wrap="square" tIns="91425">
+            <a:noAutofit/>
+          </a:bodyPr>
+          <a:lstStyle/>
+          <a:p>
+            <a:pPr indent="0" lvl="0" marL="0" rtl="0" algn="l">
+              <a:spcBef>
+                <a:spcPts val="0"/>
+              </a:spcBef>
+              <a:spcAft>
+                <a:spcPts val="0"/>
+              </a:spcAft>
+              <a:buNone/>
+            </a:pPr>
+            <a:r>
+              <a:rPr lang="es"/>
+              <a:t>distribución de bernoulli</a:t>
+            </a:r>
+            <a:endParaRPr/>
+          </a:p>
+        </p:txBody>
+      </p:sp>
+      <p:sp>
+        <p:nvSpPr>
+          <p:cNvPr id="138" name="Google Shape;138;p23"/>
+          <p:cNvSpPr txBox="1"/>
+          <p:nvPr>
+            <p:ph idx="1" type="body"/>
+          </p:nvPr>
+        </p:nvSpPr>
+        <p:spPr>
+          <a:xfrm>
+            <a:off x="254850" y="1290675"/>
+            <a:ext cx="8520600" cy="3581400"/>
+          </a:xfrm>
+          <a:prstGeom prst="rect">
+            <a:avLst/>
+          </a:prstGeom>
+        </p:spPr>
+        <p:txBody>
+          <a:bodyPr anchorCtr="0" anchor="t" bIns="91425" lIns="91425" spcFirstLastPara="1" rIns="91425" wrap="square" tIns="91425">
+            <a:noAutofit/>
+          </a:bodyPr>
+          <a:lstStyle/>
+          <a:p>
+            <a:pPr indent="0" lvl="0" marL="0" rtl="0" algn="just">
+              <a:spcBef>
+                <a:spcPts val="0"/>
+              </a:spcBef>
+              <a:spcAft>
+                <a:spcPts val="0"/>
+              </a:spcAft>
+              <a:buNone/>
+            </a:pPr>
+            <a:r>
+              <a:rPr lang="es" sz="1700">
+                <a:solidFill>
+                  <a:srgbClr val="1D2129"/>
+                </a:solidFill>
+                <a:highlight>
+                  <a:srgbClr val="FFFFFF"/>
+                </a:highlight>
+              </a:rPr>
+              <a:t>Recordemos que la variable dependiente es 0 o 1 (binaria). ¿Cómo ligamos nuestra probabilidad (que varía entre 0 y 1) con nuestras variables independientes? </a:t>
+            </a:r>
+            <a:endParaRPr sz="1700">
+              <a:solidFill>
+                <a:srgbClr val="1D2129"/>
+              </a:solidFill>
+              <a:highlight>
+                <a:srgbClr val="FFFFFF"/>
+              </a:highlight>
+            </a:endParaRPr>
+          </a:p>
+          <a:p>
+            <a:pPr indent="0" lvl="0" marL="0" rtl="0" algn="just">
+              <a:spcBef>
+                <a:spcPts val="1600"/>
+              </a:spcBef>
+              <a:spcAft>
+                <a:spcPts val="0"/>
+              </a:spcAft>
+              <a:buNone/>
+            </a:pPr>
+            <a:r>
+              <a:rPr lang="es" sz="1500">
+                <a:solidFill>
+                  <a:srgbClr val="1D2129"/>
+                </a:solidFill>
+                <a:highlight>
+                  <a:srgbClr val="FFFFFF"/>
+                </a:highlight>
+              </a:rPr>
+              <a:t>La variable dependiente sigue una distribución de Bernoulli (caso especial de la distribución binomial con n=1, i.e. un solo ensayo),</a:t>
+            </a:r>
+            <a:endParaRPr sz="1500">
+              <a:solidFill>
+                <a:srgbClr val="1D2129"/>
+              </a:solidFill>
+              <a:highlight>
+                <a:srgbClr val="FFFFFF"/>
+              </a:highlight>
+            </a:endParaRPr>
+          </a:p>
+          <a:p>
+            <a:pPr indent="0" lvl="0" marL="0" rtl="0" algn="just">
+              <a:spcBef>
+                <a:spcPts val="1600"/>
+              </a:spcBef>
+              <a:spcAft>
+                <a:spcPts val="0"/>
+              </a:spcAft>
+              <a:buNone/>
+            </a:pPr>
+            <a:r>
+              <a:rPr lang="es" sz="1500">
+                <a:solidFill>
+                  <a:srgbClr val="1D2129"/>
+                </a:solidFill>
+                <a:highlight>
+                  <a:srgbClr val="FFFFFF"/>
+                </a:highlight>
+              </a:rPr>
+              <a:t>En la regresión logística estimamos una p desconocida para una combinación lineal de variables independientes dada.</a:t>
+            </a:r>
+            <a:endParaRPr sz="1500">
+              <a:solidFill>
+                <a:srgbClr val="1D2129"/>
+              </a:solidFill>
+              <a:highlight>
+                <a:srgbClr val="FFFFFF"/>
+              </a:highlight>
+            </a:endParaRPr>
+          </a:p>
+          <a:p>
+            <a:pPr indent="0" lvl="0" marL="0" rtl="0" algn="just">
+              <a:spcBef>
+                <a:spcPts val="1600"/>
+              </a:spcBef>
+              <a:spcAft>
+                <a:spcPts val="0"/>
+              </a:spcAft>
+              <a:buNone/>
+            </a:pPr>
+            <a:r>
+              <a:rPr lang="es" sz="1500">
+                <a:solidFill>
+                  <a:srgbClr val="1D2129"/>
+                </a:solidFill>
+                <a:highlight>
+                  <a:srgbClr val="FFFFFF"/>
+                </a:highlight>
+              </a:rPr>
+              <a:t>El enlace entre las variables independientes </a:t>
+            </a:r>
+            <a:endParaRPr sz="1500">
+              <a:solidFill>
+                <a:srgbClr val="1D2129"/>
+              </a:solidFill>
+              <a:highlight>
+                <a:srgbClr val="FFFFFF"/>
+              </a:highlight>
+            </a:endParaRPr>
+          </a:p>
+          <a:p>
+            <a:pPr indent="0" lvl="0" marL="0" rtl="0" algn="just">
+              <a:spcBef>
+                <a:spcPts val="1600"/>
+              </a:spcBef>
+              <a:spcAft>
+                <a:spcPts val="1600"/>
+              </a:spcAft>
+              <a:buNone/>
+            </a:pPr>
+            <a:r>
+              <a:rPr lang="es" sz="1500">
+                <a:solidFill>
+                  <a:srgbClr val="1D2129"/>
+                </a:solidFill>
+                <a:highlight>
+                  <a:srgbClr val="FFFFFF"/>
+                </a:highlight>
+              </a:rPr>
+              <a:t>y la distribución de Bernoulli es la </a:t>
+            </a:r>
+            <a:r>
+              <a:rPr b="1" lang="es" sz="1500" u="sng">
+                <a:solidFill>
+                  <a:srgbClr val="1D2129"/>
+                </a:solidFill>
+                <a:highlight>
+                  <a:srgbClr val="FFFFFF"/>
+                </a:highlight>
+              </a:rPr>
+              <a:t>logit</a:t>
+            </a:r>
+            <a:endParaRPr b="1" sz="1500" u="sng">
+              <a:solidFill>
+                <a:srgbClr val="1D2129"/>
+              </a:solidFill>
+              <a:highlight>
+                <a:srgbClr val="FFFFFF"/>
+              </a:highlight>
+            </a:endParaRPr>
+          </a:p>
+        </p:txBody>
+      </p:sp>
+      <p:pic>
+        <p:nvPicPr>
+          <p:cNvPr descr="&lt;math xmlns=&quot;http://www.w3.org/1998/Math/MathML&quot;&gt;&lt;mi&gt;&amp;#xC9;&lt;/mi&gt;&lt;mi&gt;x&lt;/mi&gt;&lt;mi&gt;i&lt;/mi&gt;&lt;mi&gt;t&lt;/mi&gt;&lt;mi&gt;o&lt;/mi&gt;&lt;mo&gt;&amp;#xA0;&lt;/mo&gt;&lt;mo&gt;=&lt;/mo&gt;&lt;mo&gt;&amp;#xA0;&lt;/mo&gt;&lt;mi&gt;p&lt;/mi&gt;&lt;mo&gt;&amp;#xA0;&lt;/mo&gt;&lt;mspace linebreak=&quot;newline&quot;/&gt;&lt;mi&gt;F&lt;/mi&gt;&lt;mi&gt;r&lt;/mi&gt;&lt;mi&gt;a&lt;/mi&gt;&lt;mi&gt;c&lt;/mi&gt;&lt;mi&gt;a&lt;/mi&gt;&lt;mi&gt;s&lt;/mi&gt;&lt;mi&gt;o&lt;/mi&gt;&lt;mo&gt;&amp;#xA0;&lt;/mo&gt;&lt;mo&gt;=&lt;/mo&gt;&lt;mo&gt;&amp;#x2009;&lt;/mo&gt;&lt;mi&gt;q&lt;/mi&gt;&lt;mo&gt;&amp;#xA0;&lt;/mo&gt;&lt;mo&gt;=&lt;/mo&gt;&lt;mo&gt;&amp;#xA0;&lt;/mo&gt;&lt;mn&gt;1&lt;/mn&gt;&lt;mo&gt;-&lt;/mo&gt;&lt;mi&gt;p&lt;/mi&gt;&lt;/math&gt;" id="139" name="Google Shape;139;p23" title="É x i t o space equals space p space&#10;F r a c a s o space equals thin space q space equals space 1 minus p"/>
+          <p:cNvPicPr preferRelativeResize="0"/>
+          <p:nvPr/>
+        </p:nvPicPr>
+        <p:blipFill>
+          <a:blip r:embed="rId3">
+            <a:alphaModFix/>
+          </a:blip>
+          <a:stretch>
+            <a:fillRect/>
+          </a:stretch>
+        </p:blipFill>
+        <p:spPr>
+          <a:xfrm>
+            <a:off x="5834072" y="3900497"/>
+            <a:ext cx="2942199" cy="932075"/>
+          </a:xfrm>
+          <a:prstGeom prst="rect">
+            <a:avLst/>
+          </a:prstGeom>
+          <a:noFill/>
+          <a:ln>
+            <a:noFill/>
+          </a:ln>
+        </p:spPr>
+      </p:pic>
+    </p:spTree>
+  </p:cSld>
+  <p:clrMapOvr>
+    <a:masterClrMapping/>
+  </p:clrMapOvr>
+</p:sld>
+</file>
+
+<file path=ppt/slides/slide12.xml><?xml version="1.0" encoding="utf-8"?>
+<p:sld xmlns:a="http://schemas.openxmlformats.org/drawingml/2006/main" xmlns:r="http://schemas.openxmlformats.org/officeDocument/2006/relationships" xmlns:mc="http://schemas.openxmlformats.org/markup-compatibility/2006" xmlns:mv="urn:schemas-microsoft-com:mac:vml" xmlns:p="http://schemas.openxmlformats.org/presentationml/2006/main" xmlns:c="http://schemas.openxmlformats.org/drawingml/2006/chart" xmlns:dgm="http://schemas.openxmlformats.org/drawingml/2006/diagram" xmlns:o="urn:schemas-microsoft-com:office:office" xmlns:v="urn:schemas-microsoft-com:vml" xmlns:pvml="urn:schemas-microsoft-com:office:powerpoint" xmlns:com="http://schemas.openxmlformats.org/drawingml/2006/compatibility" xmlns:p14="http://schemas.microsoft.com/office/powerpoint/2010/main" xmlns:p15="http://schemas.microsoft.com/office/powerpoint/2012/main" xmlns:ahyp="http://schemas.microsoft.com/office/drawing/2018/hyperlinkcolor">
+  <p:cSld>
+    <p:spTree>
+      <p:nvGrpSpPr>
+        <p:cNvPr id="143" name="Shape 143"/>
+        <p:cNvGrpSpPr/>
+        <p:nvPr/>
+      </p:nvGrpSpPr>
+      <p:grpSpPr>
+        <a:xfrm>
+          <a:off x="0" y="0"/>
+          <a:ext cx="0" cy="0"/>
+          <a:chOff x="0" y="0"/>
+          <a:chExt cx="0" cy="0"/>
+        </a:xfrm>
+      </p:grpSpPr>
+      <p:sp>
+        <p:nvSpPr>
+          <p:cNvPr id="144" name="Google Shape;144;p24"/>
+          <p:cNvSpPr txBox="1"/>
+          <p:nvPr>
+            <p:ph type="title"/>
+          </p:nvPr>
+        </p:nvSpPr>
+        <p:spPr>
+          <a:xfrm>
+            <a:off x="311700" y="292850"/>
+            <a:ext cx="8520600" cy="801000"/>
+          </a:xfrm>
+          <a:prstGeom prst="rect">
+            <a:avLst/>
+          </a:prstGeom>
+        </p:spPr>
+        <p:txBody>
+          <a:bodyPr anchorCtr="0" anchor="t" bIns="91425" lIns="91425" spcFirstLastPara="1" rIns="91425" wrap="square" tIns="91425">
+            <a:noAutofit/>
+          </a:bodyPr>
+          <a:lstStyle/>
+          <a:p>
+            <a:pPr indent="0" lvl="0" marL="0" rtl="0" algn="l">
+              <a:spcBef>
+                <a:spcPts val="0"/>
+              </a:spcBef>
+              <a:spcAft>
+                <a:spcPts val="0"/>
+              </a:spcAft>
+              <a:buNone/>
+            </a:pPr>
+            <a:r>
+              <a:rPr lang="es"/>
+              <a:t>función logit</a:t>
+            </a:r>
+            <a:endParaRPr/>
+          </a:p>
+        </p:txBody>
+      </p:sp>
+      <p:pic>
+        <p:nvPicPr>
+          <p:cNvPr id="145" name="Google Shape;145;p24"/>
+          <p:cNvPicPr preferRelativeResize="0"/>
+          <p:nvPr/>
+        </p:nvPicPr>
+        <p:blipFill>
+          <a:blip r:embed="rId3">
+            <a:alphaModFix/>
+          </a:blip>
+          <a:stretch>
+            <a:fillRect/>
+          </a:stretch>
+        </p:blipFill>
+        <p:spPr>
+          <a:xfrm>
+            <a:off x="4231971" y="1547326"/>
+            <a:ext cx="4405303" cy="3324750"/>
+          </a:xfrm>
+          <a:prstGeom prst="rect">
+            <a:avLst/>
+          </a:prstGeom>
+          <a:noFill/>
+          <a:ln>
+            <a:noFill/>
+          </a:ln>
+        </p:spPr>
+      </p:pic>
+      <p:pic>
+        <p:nvPicPr>
+          <p:cNvPr descr="&lt;math xmlns=&quot;http://www.w3.org/1998/Math/MathML&quot;&gt;&lt;mi&gt;log&lt;/mi&gt;&lt;mi&gt;i&lt;/mi&gt;&lt;mi&gt;t&lt;/mi&gt;&lt;mfenced&gt;&lt;mi&gt;p&lt;/mi&gt;&lt;/mfenced&gt;&lt;mo&gt;&amp;#xA0;&lt;/mo&gt;&lt;mo&gt;=&lt;/mo&gt;&lt;mi&gt;ln&lt;/mi&gt;&lt;mfenced&gt;&lt;mfrac&gt;&lt;mi&gt;p&lt;/mi&gt;&lt;mrow&gt;&lt;mn&gt;1&lt;/mn&gt;&lt;mo&gt;-&lt;/mo&gt;&lt;mi&gt;p&lt;/mi&gt;&lt;/mrow&gt;&lt;/mfrac&gt;&lt;/mfenced&gt;&lt;mo&gt;&amp;#x2009;&lt;/mo&gt;&lt;/math&gt;" id="146" name="Google Shape;146;p24" title="log i t open parentheses p close parentheses space equals ln open parentheses fraction numerator p over denominator 1 minus p end fraction close parentheses thin space"/>
+          <p:cNvPicPr preferRelativeResize="0"/>
+          <p:nvPr/>
+        </p:nvPicPr>
+        <p:blipFill>
+          <a:blip r:embed="rId4">
+            <a:alphaModFix/>
+          </a:blip>
+          <a:stretch>
+            <a:fillRect/>
+          </a:stretch>
+        </p:blipFill>
+        <p:spPr>
+          <a:xfrm>
+            <a:off x="5238563" y="426322"/>
+            <a:ext cx="2732152" cy="801000"/>
+          </a:xfrm>
+          <a:prstGeom prst="rect">
+            <a:avLst/>
+          </a:prstGeom>
+          <a:noFill/>
+          <a:ln>
+            <a:noFill/>
+          </a:ln>
+        </p:spPr>
+      </p:pic>
+      <p:sp>
+        <p:nvSpPr>
+          <p:cNvPr id="147" name="Google Shape;147;p24"/>
+          <p:cNvSpPr txBox="1"/>
+          <p:nvPr>
+            <p:ph idx="1" type="body"/>
+          </p:nvPr>
+        </p:nvSpPr>
+        <p:spPr>
+          <a:xfrm>
+            <a:off x="254850" y="1824075"/>
+            <a:ext cx="3600300" cy="2789700"/>
+          </a:xfrm>
+          <a:prstGeom prst="rect">
+            <a:avLst/>
+          </a:prstGeom>
+        </p:spPr>
+        <p:txBody>
+          <a:bodyPr anchorCtr="0" anchor="t" bIns="91425" lIns="91425" spcFirstLastPara="1" rIns="91425" wrap="square" tIns="91425">
+            <a:noAutofit/>
+          </a:bodyPr>
+          <a:lstStyle/>
+          <a:p>
+            <a:pPr indent="0" lvl="0" marL="0" rtl="0" algn="just">
+              <a:spcBef>
+                <a:spcPts val="0"/>
+              </a:spcBef>
+              <a:spcAft>
+                <a:spcPts val="0"/>
+              </a:spcAft>
+              <a:buNone/>
+            </a:pPr>
+            <a:r>
+              <a:rPr lang="es" sz="1700">
+                <a:solidFill>
+                  <a:srgbClr val="1D2129"/>
+                </a:solidFill>
+                <a:highlight>
+                  <a:srgbClr val="FFFFFF"/>
+                </a:highlight>
+              </a:rPr>
+              <a:t>Esta función mapea la combinación lineal de variables independientes para que entre en un dominio de 0 a 1. El logaritmo natural de la tasa de odds es la función logit.</a:t>
+            </a:r>
+            <a:endParaRPr sz="1700">
+              <a:solidFill>
+                <a:srgbClr val="1D2129"/>
+              </a:solidFill>
+              <a:highlight>
+                <a:srgbClr val="FFFFFF"/>
+              </a:highlight>
+            </a:endParaRPr>
+          </a:p>
+          <a:p>
+            <a:pPr indent="0" lvl="0" marL="0" rtl="0" algn="just">
+              <a:spcBef>
+                <a:spcPts val="1600"/>
+              </a:spcBef>
+              <a:spcAft>
+                <a:spcPts val="1600"/>
+              </a:spcAft>
+              <a:buNone/>
+            </a:pPr>
+            <a:r>
+              <a:t/>
+            </a:r>
+            <a:endParaRPr sz="1700">
+              <a:solidFill>
+                <a:srgbClr val="1D2129"/>
+              </a:solidFill>
+              <a:highlight>
+                <a:srgbClr val="FFFFFF"/>
+              </a:highlight>
+            </a:endParaRPr>
+          </a:p>
+        </p:txBody>
+      </p:sp>
+    </p:spTree>
+  </p:cSld>
+  <p:clrMapOvr>
+    <a:masterClrMapping/>
+  </p:clrMapOvr>
+</p:sld>
+</file>
+
+<file path=ppt/slides/slide13.xml><?xml version="1.0" encoding="utf-8"?>
+<p:sld xmlns:a="http://schemas.openxmlformats.org/drawingml/2006/main" xmlns:r="http://schemas.openxmlformats.org/officeDocument/2006/relationships" xmlns:mc="http://schemas.openxmlformats.org/markup-compatibility/2006" xmlns:mv="urn:schemas-microsoft-com:mac:vml" xmlns:p="http://schemas.openxmlformats.org/presentationml/2006/main" xmlns:c="http://schemas.openxmlformats.org/drawingml/2006/chart" xmlns:dgm="http://schemas.openxmlformats.org/drawingml/2006/diagram" xmlns:o="urn:schemas-microsoft-com:office:office" xmlns:v="urn:schemas-microsoft-com:vml" xmlns:pvml="urn:schemas-microsoft-com:office:powerpoint" xmlns:com="http://schemas.openxmlformats.org/drawingml/2006/compatibility" xmlns:p14="http://schemas.microsoft.com/office/powerpoint/2010/main" xmlns:p15="http://schemas.microsoft.com/office/powerpoint/2012/main" xmlns:ahyp="http://schemas.microsoft.com/office/drawing/2018/hyperlinkcolor">
+  <p:cSld>
+    <p:spTree>
+      <p:nvGrpSpPr>
+        <p:cNvPr id="151" name="Shape 151"/>
+        <p:cNvGrpSpPr/>
+        <p:nvPr/>
+      </p:nvGrpSpPr>
+      <p:grpSpPr>
+        <a:xfrm>
+          <a:off x="0" y="0"/>
+          <a:ext cx="0" cy="0"/>
+          <a:chOff x="0" y="0"/>
+          <a:chExt cx="0" cy="0"/>
+        </a:xfrm>
+      </p:grpSpPr>
+      <p:sp>
+        <p:nvSpPr>
+          <p:cNvPr id="152" name="Google Shape;152;p25"/>
+          <p:cNvSpPr txBox="1"/>
+          <p:nvPr>
+            <p:ph type="title"/>
+          </p:nvPr>
+        </p:nvSpPr>
+        <p:spPr>
+          <a:xfrm>
+            <a:off x="311700" y="292850"/>
+            <a:ext cx="8520600" cy="801000"/>
+          </a:xfrm>
+          <a:prstGeom prst="rect">
+            <a:avLst/>
+          </a:prstGeom>
+        </p:spPr>
+        <p:txBody>
+          <a:bodyPr anchorCtr="0" anchor="t" bIns="91425" lIns="91425" spcFirstLastPara="1" rIns="91425" wrap="square" tIns="91425">
+            <a:noAutofit/>
+          </a:bodyPr>
+          <a:lstStyle/>
+          <a:p>
+            <a:pPr indent="0" lvl="0" marL="0" rtl="0" algn="l">
+              <a:spcBef>
+                <a:spcPts val="0"/>
+              </a:spcBef>
+              <a:spcAft>
+                <a:spcPts val="0"/>
+              </a:spcAft>
+              <a:buNone/>
+            </a:pPr>
+            <a:r>
+              <a:rPr lang="es"/>
+              <a:t>función sigmoide</a:t>
+            </a:r>
+            <a:endParaRPr/>
+          </a:p>
+        </p:txBody>
+      </p:sp>
+      <p:pic>
+        <p:nvPicPr>
+          <p:cNvPr id="153" name="Google Shape;153;p25"/>
+          <p:cNvPicPr preferRelativeResize="0"/>
+          <p:nvPr/>
+        </p:nvPicPr>
+        <p:blipFill>
+          <a:blip r:embed="rId3">
+            <a:alphaModFix/>
+          </a:blip>
+          <a:stretch>
+            <a:fillRect/>
+          </a:stretch>
+        </p:blipFill>
+        <p:spPr>
+          <a:xfrm>
+            <a:off x="4006650" y="1246250"/>
+            <a:ext cx="4961926" cy="3744850"/>
+          </a:xfrm>
+          <a:prstGeom prst="rect">
+            <a:avLst/>
+          </a:prstGeom>
+          <a:noFill/>
+          <a:ln>
+            <a:noFill/>
+          </a:ln>
+        </p:spPr>
+      </p:pic>
+      <p:pic>
+        <p:nvPicPr>
+          <p:cNvPr descr="&lt;math xmlns=&quot;http://www.w3.org/1998/Math/MathML&quot;&gt;&lt;mi&gt;log&lt;/mi&gt;&lt;mi&gt;i&lt;/mi&gt;&lt;msup&gt;&lt;mi&gt;t&lt;/mi&gt;&lt;mrow&gt;&lt;mo&gt;-&lt;/mo&gt;&lt;mn&gt;1&lt;/mn&gt;&lt;/mrow&gt;&lt;/msup&gt;&lt;mfenced&gt;&lt;mi&gt;&amp;#x3B1;&lt;/mi&gt;&lt;/mfenced&gt;&lt;mo&gt;&amp;#xA0;&lt;/mo&gt;&lt;mo&gt;=&lt;/mo&gt;&lt;mfrac&gt;&lt;mrow&gt;&lt;mn&gt;1&lt;/mn&gt;&lt;mo&gt;&amp;#xA0;&lt;/mo&gt;&lt;/mrow&gt;&lt;mrow&gt;&lt;mn&gt;1&lt;/mn&gt;&lt;mo&gt;+&lt;/mo&gt;&lt;msup&gt;&lt;mi&gt;e&lt;/mi&gt;&lt;mrow&gt;&lt;mo&gt;-&lt;/mo&gt;&lt;mi&gt;&amp;#x3B1;&lt;/mi&gt;&lt;/mrow&gt;&lt;/msup&gt;&lt;/mrow&gt;&lt;/mfrac&gt;&lt;/math&gt;" id="154" name="Google Shape;154;p25" title="log i t to the power of negative 1 end exponent open parentheses alpha close parentheses space equals fraction numerator 1 space over denominator 1 plus e to the power of negative alpha end exponent end fraction"/>
+          <p:cNvPicPr preferRelativeResize="0"/>
+          <p:nvPr/>
+        </p:nvPicPr>
+        <p:blipFill>
+          <a:blip r:embed="rId4">
+            <a:alphaModFix/>
+          </a:blip>
+          <a:stretch>
+            <a:fillRect/>
+          </a:stretch>
+        </p:blipFill>
+        <p:spPr>
+          <a:xfrm>
+            <a:off x="4648200" y="320673"/>
+            <a:ext cx="3304975" cy="801000"/>
+          </a:xfrm>
+          <a:prstGeom prst="rect">
+            <a:avLst/>
+          </a:prstGeom>
+          <a:noFill/>
+          <a:ln>
+            <a:noFill/>
+          </a:ln>
+        </p:spPr>
+      </p:pic>
+      <p:sp>
+        <p:nvSpPr>
+          <p:cNvPr id="155" name="Google Shape;155;p25"/>
+          <p:cNvSpPr txBox="1"/>
+          <p:nvPr>
+            <p:ph idx="1" type="body"/>
+          </p:nvPr>
+        </p:nvSpPr>
+        <p:spPr>
+          <a:xfrm>
+            <a:off x="254850" y="1824075"/>
+            <a:ext cx="3600300" cy="2789700"/>
+          </a:xfrm>
+          <a:prstGeom prst="rect">
+            <a:avLst/>
+          </a:prstGeom>
+        </p:spPr>
+        <p:txBody>
+          <a:bodyPr anchorCtr="0" anchor="t" bIns="91425" lIns="91425" spcFirstLastPara="1" rIns="91425" wrap="square" tIns="91425">
+            <a:noAutofit/>
+          </a:bodyPr>
+          <a:lstStyle/>
+          <a:p>
+            <a:pPr indent="0" lvl="0" marL="0" rtl="0" algn="just">
+              <a:spcBef>
+                <a:spcPts val="0"/>
+              </a:spcBef>
+              <a:spcAft>
+                <a:spcPts val="0"/>
+              </a:spcAft>
+              <a:buNone/>
+            </a:pPr>
+            <a:r>
+              <a:rPr lang="es" sz="1700">
+                <a:solidFill>
+                  <a:srgbClr val="1D2129"/>
+                </a:solidFill>
+                <a:highlight>
+                  <a:srgbClr val="FFFFFF"/>
+                </a:highlight>
+              </a:rPr>
+              <a:t>es la función inversa de logit. Alfa es la combinación lineal de las variables independientes. En y=0.5 existe un punto de inflexión, esto definirá si es más cercana la probabilidad a 0 ó 1.</a:t>
+            </a:r>
+            <a:endParaRPr sz="1700">
+              <a:solidFill>
+                <a:srgbClr val="1D2129"/>
+              </a:solidFill>
+              <a:highlight>
+                <a:srgbClr val="FFFFFF"/>
+              </a:highlight>
+            </a:endParaRPr>
+          </a:p>
+          <a:p>
+            <a:pPr indent="0" lvl="0" marL="0" rtl="0" algn="just">
+              <a:spcBef>
+                <a:spcPts val="1600"/>
+              </a:spcBef>
+              <a:spcAft>
+                <a:spcPts val="1600"/>
+              </a:spcAft>
+              <a:buNone/>
+            </a:pPr>
+            <a:r>
+              <a:t/>
+            </a:r>
+            <a:endParaRPr sz="1700">
+              <a:solidFill>
+                <a:srgbClr val="1D2129"/>
+              </a:solidFill>
+              <a:highlight>
+                <a:srgbClr val="FFFFFF"/>
+              </a:highlight>
+            </a:endParaRPr>
+          </a:p>
+        </p:txBody>
+      </p:sp>
+    </p:spTree>
+  </p:cSld>
+  <p:clrMapOvr>
+    <a:masterClrMapping/>
+  </p:clrMapOvr>
+</p:sld>
+</file>
+
+<file path=ppt/slides/slide14.xml><?xml version="1.0" encoding="utf-8"?>
+<p:sld xmlns:a="http://schemas.openxmlformats.org/drawingml/2006/main" xmlns:r="http://schemas.openxmlformats.org/officeDocument/2006/relationships" xmlns:mc="http://schemas.openxmlformats.org/markup-compatibility/2006" xmlns:mv="urn:schemas-microsoft-com:mac:vml" xmlns:p="http://schemas.openxmlformats.org/presentationml/2006/main" xmlns:c="http://schemas.openxmlformats.org/drawingml/2006/chart" xmlns:dgm="http://schemas.openxmlformats.org/drawingml/2006/diagram" xmlns:o="urn:schemas-microsoft-com:office:office" xmlns:v="urn:schemas-microsoft-com:vml" xmlns:pvml="urn:schemas-microsoft-com:office:powerpoint" xmlns:com="http://schemas.openxmlformats.org/drawingml/2006/compatibility" xmlns:p14="http://schemas.microsoft.com/office/powerpoint/2010/main" xmlns:p15="http://schemas.microsoft.com/office/powerpoint/2012/main" xmlns:ahyp="http://schemas.microsoft.com/office/drawing/2018/hyperlinkcolor">
+  <p:cSld>
+    <p:spTree>
+      <p:nvGrpSpPr>
+        <p:cNvPr id="159" name="Shape 159"/>
+        <p:cNvGrpSpPr/>
+        <p:nvPr/>
+      </p:nvGrpSpPr>
+      <p:grpSpPr>
+        <a:xfrm>
+          <a:off x="0" y="0"/>
+          <a:ext cx="0" cy="0"/>
+          <a:chOff x="0" y="0"/>
+          <a:chExt cx="0" cy="0"/>
+        </a:xfrm>
+      </p:grpSpPr>
+      <p:sp>
+        <p:nvSpPr>
+          <p:cNvPr id="160" name="Google Shape;160;p26"/>
+          <p:cNvSpPr txBox="1"/>
+          <p:nvPr>
+            <p:ph type="title"/>
+          </p:nvPr>
+        </p:nvSpPr>
+        <p:spPr>
+          <a:xfrm>
+            <a:off x="311700" y="292850"/>
+            <a:ext cx="8520600" cy="801000"/>
+          </a:xfrm>
+          <a:prstGeom prst="rect">
+            <a:avLst/>
+          </a:prstGeom>
+        </p:spPr>
+        <p:txBody>
+          <a:bodyPr anchorCtr="0" anchor="t" bIns="91425" lIns="91425" spcFirstLastPara="1" rIns="91425" wrap="square" tIns="91425">
+            <a:noAutofit/>
+          </a:bodyPr>
+          <a:lstStyle/>
+          <a:p>
+            <a:pPr indent="0" lvl="0" marL="0" rtl="0" algn="l">
+              <a:spcBef>
+                <a:spcPts val="0"/>
+              </a:spcBef>
+              <a:spcAft>
+                <a:spcPts val="0"/>
+              </a:spcAft>
+              <a:buNone/>
+            </a:pPr>
+            <a:r>
+              <a:rPr lang="es"/>
+              <a:t>¿cómo se calculan los coeficientes?</a:t>
+            </a:r>
+            <a:endParaRPr/>
+          </a:p>
+        </p:txBody>
+      </p:sp>
+      <p:sp>
+        <p:nvSpPr>
+          <p:cNvPr id="161" name="Google Shape;161;p26"/>
+          <p:cNvSpPr txBox="1"/>
+          <p:nvPr>
+            <p:ph idx="1" type="body"/>
+          </p:nvPr>
+        </p:nvSpPr>
+        <p:spPr>
+          <a:xfrm>
+            <a:off x="407250" y="1290675"/>
+            <a:ext cx="7902000" cy="2789700"/>
+          </a:xfrm>
+          <a:prstGeom prst="rect">
+            <a:avLst/>
+          </a:prstGeom>
+        </p:spPr>
+        <p:txBody>
+          <a:bodyPr anchorCtr="0" anchor="t" bIns="91425" lIns="91425" spcFirstLastPara="1" rIns="91425" wrap="square" tIns="91425">
+            <a:noAutofit/>
+          </a:bodyPr>
+          <a:lstStyle/>
+          <a:p>
+            <a:pPr indent="0" lvl="0" marL="0" rtl="0" algn="just">
+              <a:spcBef>
+                <a:spcPts val="0"/>
+              </a:spcBef>
+              <a:spcAft>
+                <a:spcPts val="1600"/>
+              </a:spcAft>
+              <a:buNone/>
+            </a:pPr>
+            <a:r>
+              <a:rPr lang="es" sz="1700">
+                <a:solidFill>
+                  <a:srgbClr val="1D2129"/>
+                </a:solidFill>
+                <a:highlight>
+                  <a:srgbClr val="FFFFFF"/>
+                </a:highlight>
+              </a:rPr>
+              <a:t>Alfa es una combinación líneal entre las variables independientes (x_i) y sus respectivos coeficientes. Estos coeficientes se calculan usando estimación de máxima similitud. Recordemos que para la regresión lineal los coeficientes se calculan con mínimos cuadrados.</a:t>
+            </a:r>
+            <a:endParaRPr sz="1700">
+              <a:solidFill>
+                <a:srgbClr val="1D2129"/>
+              </a:solidFill>
+              <a:highlight>
+                <a:srgbClr val="FFFFFF"/>
+              </a:highlight>
+            </a:endParaRPr>
+          </a:p>
+        </p:txBody>
+      </p:sp>
+    </p:spTree>
+  </p:cSld>
+  <p:clrMapOvr>
+    <a:masterClrMapping/>
+  </p:clrMapOvr>
+</p:sld>
+</file>
+
+<file path=ppt/slides/slide15.xml><?xml version="1.0" encoding="utf-8"?>
+<p:sld xmlns:a="http://schemas.openxmlformats.org/drawingml/2006/main" xmlns:r="http://schemas.openxmlformats.org/officeDocument/2006/relationships" xmlns:mc="http://schemas.openxmlformats.org/markup-compatibility/2006" xmlns:mv="urn:schemas-microsoft-com:mac:vml" xmlns:p="http://schemas.openxmlformats.org/presentationml/2006/main" xmlns:c="http://schemas.openxmlformats.org/drawingml/2006/chart" xmlns:dgm="http://schemas.openxmlformats.org/drawingml/2006/diagram" xmlns:o="urn:schemas-microsoft-com:office:office" xmlns:v="urn:schemas-microsoft-com:vml" xmlns:pvml="urn:schemas-microsoft-com:office:powerpoint" xmlns:com="http://schemas.openxmlformats.org/drawingml/2006/compatibility" xmlns:p14="http://schemas.microsoft.com/office/powerpoint/2010/main" xmlns:p15="http://schemas.microsoft.com/office/powerpoint/2012/main" xmlns:ahyp="http://schemas.microsoft.com/office/drawing/2018/hyperlinkcolor">
+  <p:cSld>
+    <p:spTree>
+      <p:nvGrpSpPr>
+        <p:cNvPr id="165" name="Shape 165"/>
+        <p:cNvGrpSpPr/>
+        <p:nvPr/>
+      </p:nvGrpSpPr>
+      <p:grpSpPr>
+        <a:xfrm>
+          <a:off x="0" y="0"/>
+          <a:ext cx="0" cy="0"/>
+          <a:chOff x="0" y="0"/>
+          <a:chExt cx="0" cy="0"/>
+        </a:xfrm>
+      </p:grpSpPr>
+      <p:sp>
+        <p:nvSpPr>
+          <p:cNvPr id="166" name="Google Shape;166;p27"/>
+          <p:cNvSpPr txBox="1"/>
+          <p:nvPr>
+            <p:ph type="title"/>
+          </p:nvPr>
+        </p:nvSpPr>
+        <p:spPr>
+          <a:xfrm>
+            <a:off x="311700" y="292850"/>
+            <a:ext cx="8520600" cy="801000"/>
+          </a:xfrm>
+          <a:prstGeom prst="rect">
+            <a:avLst/>
+          </a:prstGeom>
+        </p:spPr>
+        <p:txBody>
+          <a:bodyPr anchorCtr="0" anchor="t" bIns="91425" lIns="91425" spcFirstLastPara="1" rIns="91425" wrap="square" tIns="91425">
+            <a:noAutofit/>
+          </a:bodyPr>
+          <a:lstStyle/>
+          <a:p>
+            <a:pPr indent="0" lvl="0" marL="0" rtl="0" algn="l">
+              <a:spcBef>
+                <a:spcPts val="0"/>
+              </a:spcBef>
+              <a:spcAft>
+                <a:spcPts val="0"/>
+              </a:spcAft>
+              <a:buNone/>
+            </a:pPr>
+            <a:r>
+              <a:rPr lang="es"/>
+              <a:t>ecuación estimada</a:t>
+            </a:r>
+            <a:endParaRPr/>
+          </a:p>
+        </p:txBody>
+      </p:sp>
+      <p:pic>
+        <p:nvPicPr>
+          <p:cNvPr descr="&lt;math xmlns=&quot;http://www.w3.org/1998/Math/MathML&quot;&gt;&lt;mi&gt;e&lt;/mi&gt;&lt;mi&gt;s&lt;/mi&gt;&lt;mi&gt;t&lt;/mi&gt;&lt;mi&gt;i&lt;/mi&gt;&lt;mi&gt;m&lt;/mi&gt;&lt;mi&gt;a&lt;/mi&gt;&lt;mi&gt;n&lt;/mi&gt;&lt;mi&gt;d&lt;/mi&gt;&lt;mi&gt;o&lt;/mi&gt;&lt;mo&gt;&amp;#xA0;&lt;/mo&gt;&lt;mi&gt;p&lt;/mi&gt;&lt;mo&gt;.&lt;/mo&gt;&lt;mo&gt;.&lt;/mo&gt;&lt;mo&gt;.&lt;/mo&gt;&lt;mo&gt;.&lt;/mo&gt;&lt;mspace linebreak=&quot;newline&quot;/&gt;&lt;mfrac&gt;&lt;mi&gt;p&lt;/mi&gt;&lt;mrow&gt;&lt;mn&gt;1&lt;/mn&gt;&lt;mo&gt;-&lt;/mo&gt;&lt;mi&gt;p&lt;/mi&gt;&lt;/mrow&gt;&lt;/mfrac&gt;&lt;mo&gt;=&lt;/mo&gt;&lt;msup&gt;&lt;mi&gt;e&lt;/mi&gt;&lt;mrow&gt;&lt;msub&gt;&lt;mi&gt;&amp;#x3B2;&lt;/mi&gt;&lt;mn&gt;0&lt;/mn&gt;&lt;/msub&gt;&lt;mo&gt;+&lt;/mo&gt;&lt;msub&gt;&lt;mi&gt;&amp;#x3B2;&lt;/mi&gt;&lt;mn&gt;1&lt;/mn&gt;&lt;/msub&gt;&lt;msub&gt;&lt;mi&gt;x&lt;/mi&gt;&lt;mn&gt;1&lt;/mn&gt;&lt;/msub&gt;&lt;mo&gt;+&lt;/mo&gt;&lt;mo&gt;.&lt;/mo&gt;&lt;mo&gt;.&lt;/mo&gt;&lt;mo&gt;+&lt;/mo&gt;&lt;msub&gt;&lt;mi&gt;&amp;#x3B2;&lt;/mi&gt;&lt;mi&gt;n&lt;/mi&gt;&lt;/msub&gt;&lt;msub&gt;&lt;mi&gt;x&lt;/mi&gt;&lt;mi&gt;n&lt;/mi&gt;&lt;/msub&gt;&lt;/mrow&gt;&lt;/msup&gt;&lt;mspace linebreak=&quot;newline&quot;/&gt;&lt;mi&gt;p&lt;/mi&gt;&lt;mo&gt;&amp;#xA0;&lt;/mo&gt;&lt;mo&gt;=&lt;/mo&gt;&lt;mo&gt;&amp;#xA0;&lt;/mo&gt;&lt;msup&gt;&lt;mi&gt;e&lt;/mi&gt;&lt;mrow&gt;&lt;msub&gt;&lt;mi&gt;&amp;#x3B2;&lt;/mi&gt;&lt;mn&gt;0&lt;/mn&gt;&lt;/msub&gt;&lt;mo&gt;+&lt;/mo&gt;&lt;msub&gt;&lt;mi&gt;&amp;#x3B2;&lt;/mi&gt;&lt;mn&gt;1&lt;/mn&gt;&lt;/msub&gt;&lt;msub&gt;&lt;mi&gt;x&lt;/mi&gt;&lt;mn&gt;1&lt;/mn&gt;&lt;/msub&gt;&lt;mo&gt;+&lt;/mo&gt;&lt;mo&gt;.&lt;/mo&gt;&lt;mo&gt;.&lt;/mo&gt;&lt;mo&gt;+&lt;/mo&gt;&lt;msub&gt;&lt;mi&gt;&amp;#x3B2;&lt;/mi&gt;&lt;mi&gt;n&lt;/mi&gt;&lt;/msub&gt;&lt;msub&gt;&lt;mi&gt;x&lt;/mi&gt;&lt;mi&gt;n&lt;/mi&gt;&lt;/msub&gt;&lt;/mrow&gt;&lt;/msup&gt;&lt;mo&gt;&amp;#xA0;&lt;/mo&gt;&lt;mo&gt;-&lt;/mo&gt;&lt;mo&gt;&amp;#xA0;&lt;/mo&gt;&lt;msup&gt;&lt;mi&gt;e&lt;/mi&gt;&lt;mrow&gt;&lt;msub&gt;&lt;mi&gt;&amp;#x3B2;&lt;/mi&gt;&lt;mn&gt;0&lt;/mn&gt;&lt;/msub&gt;&lt;mo&gt;+&lt;/mo&gt;&lt;msub&gt;&lt;mi&gt;&amp;#x3B2;&lt;/mi&gt;&lt;mn&gt;1&lt;/mn&gt;&lt;/msub&gt;&lt;msub&gt;&lt;mi&gt;x&lt;/mi&gt;&lt;mn&gt;1&lt;/mn&gt;&lt;/msub&gt;&lt;mo&gt;+&lt;/mo&gt;&lt;mo&gt;.&lt;/mo&gt;&lt;mo&gt;.&lt;/mo&gt;&lt;mo&gt;+&lt;/mo&gt;&lt;msub&gt;&lt;mi&gt;&amp;#x3B2;&lt;/mi&gt;&lt;mi&gt;n&lt;/mi&gt;&lt;/msub&gt;&lt;msub&gt;&lt;mi&gt;x&lt;/mi&gt;&lt;mi&gt;n&lt;/mi&gt;&lt;/msub&gt;&lt;/mrow&gt;&lt;/msup&gt;&lt;mi&gt;p&lt;/mi&gt;&lt;mspace linebreak=&quot;newline&quot;/&gt;&lt;mi&gt;p&lt;/mi&gt;&lt;mo&gt;&amp;#xA0;&lt;/mo&gt;&lt;mo&gt;=&lt;/mo&gt;&lt;mfrac&gt;&lt;mrow&gt;&lt;mo&gt;&amp;#xA0;&lt;/mo&gt;&lt;msup&gt;&lt;mi&gt;e&lt;/mi&gt;&lt;mrow&gt;&lt;msub&gt;&lt;mi&gt;&amp;#x3B2;&lt;/mi&gt;&lt;mn&gt;0&lt;/mn&gt;&lt;/msub&gt;&lt;mo&gt;+&lt;/mo&gt;&lt;msub&gt;&lt;mi&gt;&amp;#x3B2;&lt;/mi&gt;&lt;mn&gt;1&lt;/mn&gt;&lt;/msub&gt;&lt;msub&gt;&lt;mi&gt;x&lt;/mi&gt;&lt;mn&gt;1&lt;/mn&gt;&lt;/msub&gt;&lt;mo&gt;+&lt;/mo&gt;&lt;mo&gt;.&lt;/mo&gt;&lt;mo&gt;.&lt;/mo&gt;&lt;mo&gt;+&lt;/mo&gt;&lt;msub&gt;&lt;mi&gt;&amp;#x3B2;&lt;/mi&gt;&lt;mi&gt;n&lt;/mi&gt;&lt;/msub&gt;&lt;msub&gt;&lt;mi&gt;x&lt;/mi&gt;&lt;mi&gt;n&lt;/mi&gt;&lt;/msub&gt;&lt;/mrow&gt;&lt;/msup&gt;&lt;mo&gt;&amp;#xA0;&lt;/mo&gt;&lt;/mrow&gt;&lt;mrow&gt;&lt;mn&gt;1&lt;/mn&gt;&lt;mo&gt;+&lt;/mo&gt;&lt;mo&gt;&amp;#xA0;&lt;/mo&gt;&lt;msup&gt;&lt;mi&gt;e&lt;/mi&gt;&lt;mrow&gt;&lt;msub&gt;&lt;mi&gt;&amp;#x3B2;&lt;/mi&gt;&lt;mn&gt;0&lt;/mn&gt;&lt;/msub&gt;&lt;mo&gt;+&lt;/mo&gt;&lt;msub&gt;&lt;mi&gt;&amp;#x3B2;&lt;/mi&gt;&lt;mn&gt;1&lt;/mn&gt;&lt;/msub&gt;&lt;msub&gt;&lt;mi&gt;x&lt;/mi&gt;&lt;mn&gt;1&lt;/mn&gt;&lt;/msub&gt;&lt;mo&gt;+&lt;/mo&gt;&lt;mo&gt;.&lt;/mo&gt;&lt;mo&gt;.&lt;/mo&gt;&lt;mo&gt;+&lt;/mo&gt;&lt;msub&gt;&lt;mi&gt;&amp;#x3B2;&lt;/mi&gt;&lt;mi&gt;n&lt;/mi&gt;&lt;/msub&gt;&lt;msub&gt;&lt;mi&gt;x&lt;/mi&gt;&lt;mi&gt;n&lt;/mi&gt;&lt;/msub&gt;&lt;/mrow&gt;&lt;/msup&gt;&lt;/mrow&gt;&lt;/mfrac&gt;&lt;/math&gt;" id="167" name="Google Shape;167;p27" title="e s t i m a n d o space p....&#10;fraction numerator p over denominator 1 minus p end fraction equals e to the power of beta subscript 0 plus beta subscript 1 x subscript 1 plus.. plus beta subscript n x subscript n end exponent&#10;p space equals space e to the power of beta subscript 0 plus beta subscript 1 x subscript 1 plus.. plus beta subscript n x subscript n end exponent space minus space e to the power of beta subscript 0 plus beta subscript 1 x subscript 1 plus.. plus beta subscript n x subscript n end exponent p&#10;p space equals fraction numerator space e to the power of beta subscript 0 plus beta subscript 1 x subscript 1 plus.. plus beta subscript n x subscript n end exponent space over denominator 1 plus space e to the power of beta subscript 0 plus beta subscript 1 x subscript 1 plus.. plus beta subscript n x subscript n end exponent end fraction"/>
+          <p:cNvPicPr preferRelativeResize="0"/>
+          <p:nvPr/>
+        </p:nvPicPr>
+        <p:blipFill>
+          <a:blip r:embed="rId3">
+            <a:alphaModFix/>
+          </a:blip>
+          <a:stretch>
+            <a:fillRect/>
+          </a:stretch>
+        </p:blipFill>
+        <p:spPr>
+          <a:xfrm>
+            <a:off x="1364225" y="1322445"/>
+            <a:ext cx="6452625" cy="3330675"/>
+          </a:xfrm>
+          <a:prstGeom prst="rect">
+            <a:avLst/>
+          </a:prstGeom>
+          <a:noFill/>
+          <a:ln>
+            <a:noFill/>
+          </a:ln>
+        </p:spPr>
+      </p:pic>
+      <p:sp>
+        <p:nvSpPr>
+          <p:cNvPr id="168" name="Google Shape;168;p27"/>
+          <p:cNvSpPr/>
+          <p:nvPr/>
+        </p:nvSpPr>
+        <p:spPr>
+          <a:xfrm>
+            <a:off x="1200525" y="3510125"/>
+            <a:ext cx="4203300" cy="1204500"/>
+          </a:xfrm>
+          <a:prstGeom prst="rect">
+            <a:avLst/>
+          </a:prstGeom>
+          <a:noFill/>
+          <a:ln cap="flat" cmpd="sng" w="19050">
+            <a:solidFill>
+              <a:srgbClr val="FF0000"/>
+            </a:solidFill>
+            <a:prstDash val="solid"/>
+            <a:round/>
+            <a:headEnd len="sm" w="sm" type="none"/>
+            <a:tailEnd len="sm" w="sm" type="none"/>
+          </a:ln>
+        </p:spPr>
+        <p:txBody>
+          <a:bodyPr anchorCtr="0" anchor="ctr" bIns="91425" lIns="91425" spcFirstLastPara="1" rIns="91425" wrap="square" tIns="91425">
+            <a:noAutofit/>
+          </a:bodyPr>
+          <a:lstStyle/>
+          <a:p>
+            <a:pPr indent="0" lvl="0" marL="0" rtl="0" algn="l">
+              <a:spcBef>
+                <a:spcPts val="0"/>
+              </a:spcBef>
+              <a:spcAft>
+                <a:spcPts val="0"/>
+              </a:spcAft>
+              <a:buNone/>
+            </a:pPr>
+            <a:r>
+              <a:t/>
+            </a:r>
+            <a:endParaRPr/>
+          </a:p>
+        </p:txBody>
+      </p:sp>
+    </p:spTree>
+  </p:cSld>
+  <p:clrMapOvr>
+    <a:masterClrMapping/>
+  </p:clrMapOvr>
+</p:sld>
+</file>
+
+<file path=ppt/slides/slide16.xml><?xml version="1.0" encoding="utf-8"?>
+<p:sld xmlns:a="http://schemas.openxmlformats.org/drawingml/2006/main" xmlns:r="http://schemas.openxmlformats.org/officeDocument/2006/relationships" xmlns:mc="http://schemas.openxmlformats.org/markup-compatibility/2006" xmlns:mv="urn:schemas-microsoft-com:mac:vml" xmlns:p="http://schemas.openxmlformats.org/presentationml/2006/main" xmlns:c="http://schemas.openxmlformats.org/drawingml/2006/chart" xmlns:dgm="http://schemas.openxmlformats.org/drawingml/2006/diagram" xmlns:o="urn:schemas-microsoft-com:office:office" xmlns:v="urn:schemas-microsoft-com:vml" xmlns:pvml="urn:schemas-microsoft-com:office:powerpoint" xmlns:com="http://schemas.openxmlformats.org/drawingml/2006/compatibility" xmlns:p14="http://schemas.microsoft.com/office/powerpoint/2010/main" xmlns:p15="http://schemas.microsoft.com/office/powerpoint/2012/main" xmlns:ahyp="http://schemas.microsoft.com/office/drawing/2018/hyperlinkcolor">
+  <p:cSld>
+    <p:spTree>
+      <p:nvGrpSpPr>
+        <p:cNvPr id="172" name="Shape 172"/>
+        <p:cNvGrpSpPr/>
+        <p:nvPr/>
+      </p:nvGrpSpPr>
+      <p:grpSpPr>
+        <a:xfrm>
+          <a:off x="0" y="0"/>
+          <a:ext cx="0" cy="0"/>
+          <a:chOff x="0" y="0"/>
+          <a:chExt cx="0" cy="0"/>
+        </a:xfrm>
+      </p:grpSpPr>
+      <p:sp>
+        <p:nvSpPr>
+          <p:cNvPr id="173" name="Google Shape;173;p28"/>
+          <p:cNvSpPr txBox="1"/>
+          <p:nvPr>
+            <p:ph type="title"/>
+          </p:nvPr>
+        </p:nvSpPr>
+        <p:spPr>
+          <a:xfrm>
+            <a:off x="311700" y="292850"/>
+            <a:ext cx="8520600" cy="801000"/>
+          </a:xfrm>
+          <a:prstGeom prst="rect">
+            <a:avLst/>
+          </a:prstGeom>
+        </p:spPr>
+        <p:txBody>
+          <a:bodyPr anchorCtr="0" anchor="t" bIns="91425" lIns="91425" spcFirstLastPara="1" rIns="91425" wrap="square" tIns="91425">
+            <a:noAutofit/>
+          </a:bodyPr>
+          <a:lstStyle/>
+          <a:p>
+            <a:pPr indent="0" lvl="0" marL="0" rtl="0" algn="l">
+              <a:spcBef>
+                <a:spcPts val="0"/>
+              </a:spcBef>
+              <a:spcAft>
+                <a:spcPts val="0"/>
+              </a:spcAft>
+              <a:buNone/>
+            </a:pPr>
+            <a:r>
+              <a:rPr lang="es"/>
+              <a:t>umbral</a:t>
+            </a:r>
+            <a:endParaRPr/>
+          </a:p>
+        </p:txBody>
+      </p:sp>
+      <p:sp>
+        <p:nvSpPr>
+          <p:cNvPr id="174" name="Google Shape;174;p28"/>
+          <p:cNvSpPr txBox="1"/>
+          <p:nvPr>
+            <p:ph idx="1" type="body"/>
+          </p:nvPr>
+        </p:nvSpPr>
+        <p:spPr>
+          <a:xfrm>
+            <a:off x="254850" y="1214475"/>
+            <a:ext cx="8452800" cy="3340200"/>
+          </a:xfrm>
+          <a:prstGeom prst="rect">
+            <a:avLst/>
+          </a:prstGeom>
+        </p:spPr>
+        <p:txBody>
+          <a:bodyPr anchorCtr="0" anchor="t" bIns="91425" lIns="91425" spcFirstLastPara="1" rIns="91425" wrap="square" tIns="91425">
+            <a:noAutofit/>
+          </a:bodyPr>
+          <a:lstStyle/>
+          <a:p>
+            <a:pPr indent="0" lvl="0" marL="0" rtl="0" algn="just">
+              <a:spcBef>
+                <a:spcPts val="0"/>
+              </a:spcBef>
+              <a:spcAft>
+                <a:spcPts val="1600"/>
+              </a:spcAft>
+              <a:buNone/>
+            </a:pPr>
+            <a:r>
+              <a:rPr lang="es" sz="1500">
+                <a:solidFill>
+                  <a:srgbClr val="1D2129"/>
+                </a:solidFill>
+                <a:highlight>
+                  <a:srgbClr val="FFFFFF"/>
+                </a:highlight>
+              </a:rPr>
+              <a:t>Usualmente se decide en 0.5 pero depende del problema. </a:t>
+            </a:r>
+            <a:endParaRPr sz="2200"/>
+          </a:p>
+        </p:txBody>
+      </p:sp>
+      <p:pic>
+        <p:nvPicPr>
+          <p:cNvPr id="175" name="Google Shape;175;p28"/>
+          <p:cNvPicPr preferRelativeResize="0"/>
+          <p:nvPr/>
+        </p:nvPicPr>
+        <p:blipFill>
+          <a:blip r:embed="rId3">
+            <a:alphaModFix/>
+          </a:blip>
+          <a:stretch>
+            <a:fillRect/>
+          </a:stretch>
+        </p:blipFill>
+        <p:spPr>
+          <a:xfrm>
+            <a:off x="1004901" y="1752600"/>
+            <a:ext cx="6831963" cy="2573475"/>
+          </a:xfrm>
+          <a:prstGeom prst="rect">
+            <a:avLst/>
+          </a:prstGeom>
+          <a:noFill/>
+          <a:ln>
+            <a:noFill/>
+          </a:ln>
+        </p:spPr>
+      </p:pic>
+    </p:spTree>
+  </p:cSld>
+  <p:clrMapOvr>
+    <a:masterClrMapping/>
+  </p:clrMapOvr>
+</p:sld>
+</file>
+
 <file path=ppt/slides/slide2.xml><?xml version="1.0" encoding="utf-8"?>
 <p:sld xmlns:a="http://schemas.openxmlformats.org/drawingml/2006/main" xmlns:r="http://schemas.openxmlformats.org/officeDocument/2006/relationships" xmlns:mc="http://schemas.openxmlformats.org/markup-compatibility/2006" xmlns:mv="urn:schemas-microsoft-com:mac:vml" xmlns:p="http://schemas.openxmlformats.org/presentationml/2006/main" xmlns:c="http://schemas.openxmlformats.org/drawingml/2006/chart" xmlns:dgm="http://schemas.openxmlformats.org/drawingml/2006/diagram" xmlns:o="urn:schemas-microsoft-com:office:office" xmlns:v="urn:schemas-microsoft-com:vml" xmlns:pvml="urn:schemas-microsoft-com:office:powerpoint" xmlns:com="http://schemas.openxmlformats.org/drawingml/2006/compatibility" xmlns:p14="http://schemas.microsoft.com/office/powerpoint/2010/main" xmlns:p15="http://schemas.microsoft.com/office/powerpoint/2012/main" xmlns:ahyp="http://schemas.microsoft.com/office/drawing/2018/hyperlinkcolor">
   <p:cSld>
@@ -6743,7 +9277,15 @@
             </a:pPr>
             <a:r>
               <a:rPr lang="es"/>
-              <a:t>Supongamos que tenemos el tamaño de un tumor y queremos determinar si es maligno o benigno con base en su tamaño.</a:t>
+              <a:t>Supongamos que tenemos en una tabla las características de los tumores de ciertos pacientes (anchura, uniformidad del tamaño de célula, mitosis, adhesión marginal, etc) el doctor quiere determinar si el tumor es benigno o maligno de acuerdo a sus características. ¿Qué </a:t>
+            </a:r>
+            <a:r>
+              <a:rPr lang="es"/>
+              <a:t>estrategia</a:t>
+            </a:r>
+            <a:r>
+              <a:rPr lang="es"/>
+              <a:t> usamos para determinar esto con el menor número de falsos positivos posible?</a:t>
             </a:r>
             <a:endParaRPr/>
           </a:p>
@@ -6765,8 +9307,8 @@
         </p:blipFill>
         <p:spPr>
           <a:xfrm>
-            <a:off x="1243013" y="2185988"/>
-            <a:ext cx="6657975" cy="2295525"/>
+            <a:off x="0" y="3758550"/>
+            <a:ext cx="9144000" cy="979200"/>
           </a:xfrm>
           <a:prstGeom prst="rect">
             <a:avLst/>
@@ -6836,7 +9378,7 @@
             </a:pPr>
             <a:r>
               <a:rPr lang="es"/>
-              <a:t>regresión lineal</a:t>
+              <a:t>¿cómo resolver este problema?</a:t>
             </a:r>
             <a:endParaRPr/>
           </a:p>
@@ -6876,7 +9418,7 @@
             </a:pPr>
             <a:r>
               <a:rPr lang="es"/>
-              <a:t>Intentemos con lo que ya conocemos… ¿Qué pasa?</a:t>
+              <a:t>Visualicemos nuestros datos en un scatter plot para ver como podemos aproximar este comportamiento...</a:t>
             </a:r>
             <a:endParaRPr/>
           </a:p>
@@ -6910,9 +9452,142 @@
           </a:ln>
         </p:spPr>
       </p:pic>
+    </p:spTree>
+  </p:cSld>
+  <p:clrMapOvr>
+    <a:masterClrMapping/>
+  </p:clrMapOvr>
+</p:sld>
+</file>
+
+<file path=ppt/slides/slide4.xml><?xml version="1.0" encoding="utf-8"?>
+<p:sld xmlns:a="http://schemas.openxmlformats.org/drawingml/2006/main" xmlns:r="http://schemas.openxmlformats.org/officeDocument/2006/relationships" xmlns:mc="http://schemas.openxmlformats.org/markup-compatibility/2006" xmlns:mv="urn:schemas-microsoft-com:mac:vml" xmlns:p="http://schemas.openxmlformats.org/presentationml/2006/main" xmlns:c="http://schemas.openxmlformats.org/drawingml/2006/chart" xmlns:dgm="http://schemas.openxmlformats.org/drawingml/2006/diagram" xmlns:o="urn:schemas-microsoft-com:office:office" xmlns:v="urn:schemas-microsoft-com:vml" xmlns:pvml="urn:schemas-microsoft-com:office:powerpoint" xmlns:com="http://schemas.openxmlformats.org/drawingml/2006/compatibility" xmlns:p14="http://schemas.microsoft.com/office/powerpoint/2010/main" xmlns:p15="http://schemas.microsoft.com/office/powerpoint/2012/main" xmlns:ahyp="http://schemas.microsoft.com/office/drawing/2018/hyperlinkcolor">
+  <p:cSld>
+    <p:spTree>
+      <p:nvGrpSpPr>
+        <p:cNvPr id="75" name="Shape 75"/>
+        <p:cNvGrpSpPr/>
+        <p:nvPr/>
+      </p:nvGrpSpPr>
+      <p:grpSpPr>
+        <a:xfrm>
+          <a:off x="0" y="0"/>
+          <a:ext cx="0" cy="0"/>
+          <a:chOff x="0" y="0"/>
+          <a:chExt cx="0" cy="0"/>
+        </a:xfrm>
+      </p:grpSpPr>
+      <p:sp>
+        <p:nvSpPr>
+          <p:cNvPr id="76" name="Google Shape;76;p16"/>
+          <p:cNvSpPr txBox="1"/>
+          <p:nvPr>
+            <p:ph type="title"/>
+          </p:nvPr>
+        </p:nvSpPr>
+        <p:spPr>
+          <a:xfrm>
+            <a:off x="311700" y="292850"/>
+            <a:ext cx="8520600" cy="801000"/>
+          </a:xfrm>
+          <a:prstGeom prst="rect">
+            <a:avLst/>
+          </a:prstGeom>
+        </p:spPr>
+        <p:txBody>
+          <a:bodyPr anchorCtr="0" anchor="t" bIns="91425" lIns="91425" spcFirstLastPara="1" rIns="91425" wrap="square" tIns="91425">
+            <a:noAutofit/>
+          </a:bodyPr>
+          <a:lstStyle/>
+          <a:p>
+            <a:pPr indent="0" lvl="0" marL="0" rtl="0" algn="l">
+              <a:spcBef>
+                <a:spcPts val="0"/>
+              </a:spcBef>
+              <a:spcAft>
+                <a:spcPts val="0"/>
+              </a:spcAft>
+              <a:buNone/>
+            </a:pPr>
+            <a:r>
+              <a:rPr lang="es"/>
+              <a:t>regresión lineal</a:t>
+            </a:r>
+            <a:endParaRPr/>
+          </a:p>
+        </p:txBody>
+      </p:sp>
+      <p:sp>
+        <p:nvSpPr>
+          <p:cNvPr id="77" name="Google Shape;77;p16"/>
+          <p:cNvSpPr txBox="1"/>
+          <p:nvPr>
+            <p:ph idx="1" type="body"/>
+          </p:nvPr>
+        </p:nvSpPr>
+        <p:spPr>
+          <a:xfrm>
+            <a:off x="311700" y="1228675"/>
+            <a:ext cx="8520600" cy="3340200"/>
+          </a:xfrm>
+          <a:prstGeom prst="rect">
+            <a:avLst/>
+          </a:prstGeom>
+        </p:spPr>
+        <p:txBody>
+          <a:bodyPr anchorCtr="0" anchor="t" bIns="91425" lIns="91425" spcFirstLastPara="1" rIns="91425" wrap="square" tIns="91425">
+            <a:noAutofit/>
+          </a:bodyPr>
+          <a:lstStyle/>
+          <a:p>
+            <a:pPr indent="0" lvl="0" marL="0" rtl="0" algn="l">
+              <a:spcBef>
+                <a:spcPts val="0"/>
+              </a:spcBef>
+              <a:spcAft>
+                <a:spcPts val="1600"/>
+              </a:spcAft>
+              <a:buNone/>
+            </a:pPr>
+            <a:r>
+              <a:rPr lang="es"/>
+              <a:t>Intentemos con lo que ya conocemos… ¿Qué pasa?</a:t>
+            </a:r>
+            <a:endParaRPr/>
+          </a:p>
+        </p:txBody>
+      </p:sp>
+      <p:pic>
+        <p:nvPicPr>
+          <p:cNvPr id="78" name="Google Shape;78;p16"/>
+          <p:cNvPicPr preferRelativeResize="0"/>
+          <p:nvPr/>
+        </p:nvPicPr>
+        <p:blipFill>
+          <a:blip r:embed="rId3">
+            <a:alphaModFix/>
+          </a:blip>
+          <a:stretch>
+            <a:fillRect/>
+          </a:stretch>
+        </p:blipFill>
+        <p:spPr>
+          <a:xfrm>
+            <a:off x="1243013" y="2185988"/>
+            <a:ext cx="6657975" cy="2295525"/>
+          </a:xfrm>
+          <a:prstGeom prst="rect">
+            <a:avLst/>
+          </a:prstGeom>
+          <a:noFill/>
+          <a:ln>
+            <a:noFill/>
+          </a:ln>
+        </p:spPr>
+      </p:pic>
       <p:cxnSp>
         <p:nvCxnSpPr>
-          <p:cNvPr id="72" name="Google Shape;72;p15"/>
+          <p:cNvPr id="79" name="Google Shape;79;p16"/>
           <p:cNvCxnSpPr/>
           <p:nvPr/>
         </p:nvCxnSpPr>
@@ -6944,12 +9619,12 @@
 </p:sld>
 </file>
 
-<file path=ppt/slides/slide4.xml><?xml version="1.0" encoding="utf-8"?>
+<file path=ppt/slides/slide5.xml><?xml version="1.0" encoding="utf-8"?>
 <p:sld xmlns:a="http://schemas.openxmlformats.org/drawingml/2006/main" xmlns:r="http://schemas.openxmlformats.org/officeDocument/2006/relationships" xmlns:mc="http://schemas.openxmlformats.org/markup-compatibility/2006" xmlns:mv="urn:schemas-microsoft-com:mac:vml" xmlns:p="http://schemas.openxmlformats.org/presentationml/2006/main" xmlns:c="http://schemas.openxmlformats.org/drawingml/2006/chart" xmlns:dgm="http://schemas.openxmlformats.org/drawingml/2006/diagram" xmlns:o="urn:schemas-microsoft-com:office:office" xmlns:v="urn:schemas-microsoft-com:vml" xmlns:pvml="urn:schemas-microsoft-com:office:powerpoint" xmlns:com="http://schemas.openxmlformats.org/drawingml/2006/compatibility" xmlns:p14="http://schemas.microsoft.com/office/powerpoint/2010/main" xmlns:p15="http://schemas.microsoft.com/office/powerpoint/2012/main" xmlns:ahyp="http://schemas.microsoft.com/office/drawing/2018/hyperlinkcolor">
   <p:cSld>
     <p:spTree>
       <p:nvGrpSpPr>
-        <p:cNvPr id="76" name="Shape 76"/>
+        <p:cNvPr id="83" name="Shape 83"/>
         <p:cNvGrpSpPr/>
         <p:nvPr/>
       </p:nvGrpSpPr>
@@ -6963,7 +9638,7 @@
       </p:grpSpPr>
       <p:sp>
         <p:nvSpPr>
-          <p:cNvPr id="77" name="Google Shape;77;p16"/>
+          <p:cNvPr id="84" name="Google Shape;84;p17"/>
           <p:cNvSpPr txBox="1"/>
           <p:nvPr>
             <p:ph type="title"/>
@@ -7007,7 +9682,7 @@
       </p:sp>
       <p:sp>
         <p:nvSpPr>
-          <p:cNvPr id="78" name="Google Shape;78;p16"/>
+          <p:cNvPr id="85" name="Google Shape;85;p17"/>
           <p:cNvSpPr txBox="1"/>
           <p:nvPr>
             <p:ph idx="1" type="body"/>
@@ -7047,7 +9722,7 @@
       </p:sp>
       <p:pic>
         <p:nvPicPr>
-          <p:cNvPr id="79" name="Google Shape;79;p16"/>
+          <p:cNvPr id="86" name="Google Shape;86;p17"/>
           <p:cNvPicPr preferRelativeResize="0"/>
           <p:nvPr/>
         </p:nvPicPr>
@@ -7073,172 +9748,6 @@
           </a:ln>
         </p:spPr>
       </p:pic>
-      <p:pic>
-        <p:nvPicPr>
-          <p:cNvPr id="80" name="Google Shape;80;p16"/>
-          <p:cNvPicPr preferRelativeResize="0"/>
-          <p:nvPr/>
-        </p:nvPicPr>
-        <p:blipFill>
-          <a:blip r:embed="rId4">
-            <a:alphaModFix/>
-          </a:blip>
-          <a:stretch>
-            <a:fillRect/>
-          </a:stretch>
-        </p:blipFill>
-        <p:spPr>
-          <a:xfrm>
-            <a:off x="2609850" y="2571750"/>
-            <a:ext cx="5448300" cy="1347800"/>
-          </a:xfrm>
-          <a:prstGeom prst="rect">
-            <a:avLst/>
-          </a:prstGeom>
-          <a:noFill/>
-          <a:ln>
-            <a:noFill/>
-          </a:ln>
-        </p:spPr>
-      </p:pic>
-    </p:spTree>
-  </p:cSld>
-  <p:clrMapOvr>
-    <a:masterClrMapping/>
-  </p:clrMapOvr>
-</p:sld>
-</file>
-
-<file path=ppt/slides/slide5.xml><?xml version="1.0" encoding="utf-8"?>
-<p:sld xmlns:a="http://schemas.openxmlformats.org/drawingml/2006/main" xmlns:r="http://schemas.openxmlformats.org/officeDocument/2006/relationships" xmlns:mc="http://schemas.openxmlformats.org/markup-compatibility/2006" xmlns:mv="urn:schemas-microsoft-com:mac:vml" xmlns:p="http://schemas.openxmlformats.org/presentationml/2006/main" xmlns:c="http://schemas.openxmlformats.org/drawingml/2006/chart" xmlns:dgm="http://schemas.openxmlformats.org/drawingml/2006/diagram" xmlns:o="urn:schemas-microsoft-com:office:office" xmlns:v="urn:schemas-microsoft-com:vml" xmlns:pvml="urn:schemas-microsoft-com:office:powerpoint" xmlns:com="http://schemas.openxmlformats.org/drawingml/2006/compatibility" xmlns:p14="http://schemas.microsoft.com/office/powerpoint/2010/main" xmlns:p15="http://schemas.microsoft.com/office/powerpoint/2012/main" xmlns:ahyp="http://schemas.microsoft.com/office/drawing/2018/hyperlinkcolor">
-  <p:cSld>
-    <p:spTree>
-      <p:nvGrpSpPr>
-        <p:cNvPr id="84" name="Shape 84"/>
-        <p:cNvGrpSpPr/>
-        <p:nvPr/>
-      </p:nvGrpSpPr>
-      <p:grpSpPr>
-        <a:xfrm>
-          <a:off x="0" y="0"/>
-          <a:ext cx="0" cy="0"/>
-          <a:chOff x="0" y="0"/>
-          <a:chExt cx="0" cy="0"/>
-        </a:xfrm>
-      </p:grpSpPr>
-      <p:sp>
-        <p:nvSpPr>
-          <p:cNvPr id="85" name="Google Shape;85;p17"/>
-          <p:cNvSpPr txBox="1"/>
-          <p:nvPr>
-            <p:ph type="title"/>
-          </p:nvPr>
-        </p:nvSpPr>
-        <p:spPr>
-          <a:xfrm>
-            <a:off x="311700" y="292850"/>
-            <a:ext cx="8520600" cy="801000"/>
-          </a:xfrm>
-          <a:prstGeom prst="rect">
-            <a:avLst/>
-          </a:prstGeom>
-        </p:spPr>
-        <p:txBody>
-          <a:bodyPr anchorCtr="0" anchor="t" bIns="91425" lIns="91425" spcFirstLastPara="1" rIns="91425" wrap="square" tIns="91425">
-            <a:noAutofit/>
-          </a:bodyPr>
-          <a:lstStyle/>
-          <a:p>
-            <a:pPr indent="0" lvl="0" marL="0" rtl="0" algn="l">
-              <a:spcBef>
-                <a:spcPts val="0"/>
-              </a:spcBef>
-              <a:spcAft>
-                <a:spcPts val="0"/>
-              </a:spcAft>
-              <a:buNone/>
-            </a:pPr>
-            <a:r>
-              <a:rPr lang="es"/>
-              <a:t>función sigmoide</a:t>
-            </a:r>
-            <a:endParaRPr/>
-          </a:p>
-        </p:txBody>
-      </p:sp>
-      <p:sp>
-        <p:nvSpPr>
-          <p:cNvPr id="86" name="Google Shape;86;p17"/>
-          <p:cNvSpPr txBox="1"/>
-          <p:nvPr>
-            <p:ph idx="1" type="body"/>
-          </p:nvPr>
-        </p:nvSpPr>
-        <p:spPr>
-          <a:xfrm>
-            <a:off x="254850" y="1214475"/>
-            <a:ext cx="2684100" cy="3340200"/>
-          </a:xfrm>
-          <a:prstGeom prst="rect">
-            <a:avLst/>
-          </a:prstGeom>
-        </p:spPr>
-        <p:txBody>
-          <a:bodyPr anchorCtr="0" anchor="t" bIns="91425" lIns="91425" spcFirstLastPara="1" rIns="91425" wrap="square" tIns="91425">
-            <a:noAutofit/>
-          </a:bodyPr>
-          <a:lstStyle/>
-          <a:p>
-            <a:pPr indent="0" lvl="0" marL="0" rtl="0" algn="just">
-              <a:spcBef>
-                <a:spcPts val="0"/>
-              </a:spcBef>
-              <a:spcAft>
-                <a:spcPts val="1600"/>
-              </a:spcAft>
-              <a:buNone/>
-            </a:pPr>
-            <a:r>
-              <a:rPr lang="es" sz="1500">
-                <a:solidFill>
-                  <a:srgbClr val="1D2129"/>
-                </a:solidFill>
-                <a:highlight>
-                  <a:srgbClr val="FFFFFF"/>
-                </a:highlight>
-              </a:rPr>
-              <a:t>All sigmoid functions have the property that they map the entire number line into a small range such as between 0 and 1, or -1 and 1, so one use of a sigmoid function is to convert a real value into one that can be interpreted as a </a:t>
-            </a:r>
-            <a:r>
-              <a:rPr lang="es" sz="1500">
-                <a:solidFill>
-                  <a:schemeClr val="hlink"/>
-                </a:solidFill>
-                <a:highlight>
-                  <a:srgbClr val="FFFFFF"/>
-                </a:highlight>
-                <a:uFill>
-                  <a:noFill/>
-                </a:uFill>
-                <a:hlinkClick r:id="rId3"/>
-              </a:rPr>
-              <a:t>probability</a:t>
-            </a:r>
-            <a:r>
-              <a:rPr lang="es" sz="1500">
-                <a:solidFill>
-                  <a:srgbClr val="1D2129"/>
-                </a:solidFill>
-                <a:highlight>
-                  <a:srgbClr val="FFFFFF"/>
-                </a:highlight>
-              </a:rPr>
-              <a:t>.</a:t>
-            </a:r>
-            <a:endParaRPr sz="2200"/>
-          </a:p>
-        </p:txBody>
-      </p:sp>
       <p:pic>
         <p:nvPicPr>
           <p:cNvPr id="87" name="Google Shape;87;p17"/>
@@ -7255,8 +9764,8 @@
         </p:blipFill>
         <p:spPr>
           <a:xfrm>
-            <a:off x="3015912" y="923875"/>
-            <a:ext cx="6097239" cy="4067226"/>
+            <a:off x="2609850" y="2571750"/>
+            <a:ext cx="5448300" cy="1347800"/>
           </a:xfrm>
           <a:prstGeom prst="rect">
             <a:avLst/>
@@ -7267,6 +9776,1128 @@
           </a:ln>
         </p:spPr>
       </p:pic>
+    </p:spTree>
+  </p:cSld>
+  <p:clrMapOvr>
+    <a:masterClrMapping/>
+  </p:clrMapOvr>
+</p:sld>
+</file>
+
+<file path=ppt/slides/slide6.xml><?xml version="1.0" encoding="utf-8"?>
+<p:sld xmlns:a="http://schemas.openxmlformats.org/drawingml/2006/main" xmlns:r="http://schemas.openxmlformats.org/officeDocument/2006/relationships" xmlns:mc="http://schemas.openxmlformats.org/markup-compatibility/2006" xmlns:mv="urn:schemas-microsoft-com:mac:vml" xmlns:p="http://schemas.openxmlformats.org/presentationml/2006/main" xmlns:c="http://schemas.openxmlformats.org/drawingml/2006/chart" xmlns:dgm="http://schemas.openxmlformats.org/drawingml/2006/diagram" xmlns:o="urn:schemas-microsoft-com:office:office" xmlns:v="urn:schemas-microsoft-com:vml" xmlns:pvml="urn:schemas-microsoft-com:office:powerpoint" xmlns:com="http://schemas.openxmlformats.org/drawingml/2006/compatibility" xmlns:p14="http://schemas.microsoft.com/office/powerpoint/2010/main" xmlns:p15="http://schemas.microsoft.com/office/powerpoint/2012/main" xmlns:ahyp="http://schemas.microsoft.com/office/drawing/2018/hyperlinkcolor">
+  <p:cSld>
+    <p:spTree>
+      <p:nvGrpSpPr>
+        <p:cNvPr id="91" name="Shape 91"/>
+        <p:cNvGrpSpPr/>
+        <p:nvPr/>
+      </p:nvGrpSpPr>
+      <p:grpSpPr>
+        <a:xfrm>
+          <a:off x="0" y="0"/>
+          <a:ext cx="0" cy="0"/>
+          <a:chOff x="0" y="0"/>
+          <a:chExt cx="0" cy="0"/>
+        </a:xfrm>
+      </p:grpSpPr>
+      <p:sp>
+        <p:nvSpPr>
+          <p:cNvPr id="92" name="Google Shape;92;p18"/>
+          <p:cNvSpPr txBox="1"/>
+          <p:nvPr>
+            <p:ph type="title"/>
+          </p:nvPr>
+        </p:nvSpPr>
+        <p:spPr>
+          <a:xfrm>
+            <a:off x="311700" y="292850"/>
+            <a:ext cx="8520600" cy="801000"/>
+          </a:xfrm>
+          <a:prstGeom prst="rect">
+            <a:avLst/>
+          </a:prstGeom>
+        </p:spPr>
+        <p:txBody>
+          <a:bodyPr anchorCtr="0" anchor="t" bIns="91425" lIns="91425" spcFirstLastPara="1" rIns="91425" wrap="square" tIns="91425">
+            <a:noAutofit/>
+          </a:bodyPr>
+          <a:lstStyle/>
+          <a:p>
+            <a:pPr indent="0" lvl="0" marL="0" rtl="0" algn="l">
+              <a:spcBef>
+                <a:spcPts val="0"/>
+              </a:spcBef>
+              <a:spcAft>
+                <a:spcPts val="0"/>
+              </a:spcAft>
+              <a:buNone/>
+            </a:pPr>
+            <a:r>
+              <a:rPr lang="es"/>
+              <a:t>¿qué es la regresión logística?</a:t>
+            </a:r>
+            <a:endParaRPr/>
+          </a:p>
+        </p:txBody>
+      </p:sp>
+      <p:sp>
+        <p:nvSpPr>
+          <p:cNvPr id="93" name="Google Shape;93;p18"/>
+          <p:cNvSpPr txBox="1"/>
+          <p:nvPr>
+            <p:ph idx="1" type="body"/>
+          </p:nvPr>
+        </p:nvSpPr>
+        <p:spPr>
+          <a:xfrm>
+            <a:off x="254850" y="1214475"/>
+            <a:ext cx="8520600" cy="3581400"/>
+          </a:xfrm>
+          <a:prstGeom prst="rect">
+            <a:avLst/>
+          </a:prstGeom>
+        </p:spPr>
+        <p:txBody>
+          <a:bodyPr anchorCtr="0" anchor="t" bIns="91425" lIns="91425" spcFirstLastPara="1" rIns="91425" wrap="square" tIns="91425">
+            <a:noAutofit/>
+          </a:bodyPr>
+          <a:lstStyle/>
+          <a:p>
+            <a:pPr indent="0" lvl="0" marL="0" rtl="0" algn="just">
+              <a:spcBef>
+                <a:spcPts val="0"/>
+              </a:spcBef>
+              <a:spcAft>
+                <a:spcPts val="0"/>
+              </a:spcAft>
+              <a:buNone/>
+            </a:pPr>
+            <a:r>
+              <a:rPr lang="es" sz="1500">
+                <a:solidFill>
+                  <a:srgbClr val="1D2129"/>
+                </a:solidFill>
+                <a:highlight>
+                  <a:srgbClr val="FFFFFF"/>
+                </a:highlight>
+              </a:rPr>
+              <a:t>Busca modelar la probabilidad de un evento dependiendo de los valores de sus variables independientes, que pueden ser categóricas o numéricas. </a:t>
+            </a:r>
+            <a:endParaRPr sz="1500">
+              <a:solidFill>
+                <a:srgbClr val="1D2129"/>
+              </a:solidFill>
+              <a:highlight>
+                <a:srgbClr val="FFFFFF"/>
+              </a:highlight>
+            </a:endParaRPr>
+          </a:p>
+          <a:p>
+            <a:pPr indent="0" lvl="0" marL="0" rtl="0" algn="just">
+              <a:spcBef>
+                <a:spcPts val="1600"/>
+              </a:spcBef>
+              <a:spcAft>
+                <a:spcPts val="0"/>
+              </a:spcAft>
+              <a:buNone/>
+            </a:pPr>
+            <a:r>
+              <a:rPr lang="es" sz="1500">
+                <a:solidFill>
+                  <a:srgbClr val="1D2129"/>
+                </a:solidFill>
+                <a:highlight>
+                  <a:srgbClr val="FFFFFF"/>
+                </a:highlight>
+              </a:rPr>
+              <a:t>Estima la probabilidad de que un evento ocurra para una observación aleatoria seleccionada versus la probabilidad  de que el evento no ocurra. </a:t>
+            </a:r>
+            <a:endParaRPr sz="1500">
+              <a:solidFill>
+                <a:srgbClr val="1D2129"/>
+              </a:solidFill>
+              <a:highlight>
+                <a:srgbClr val="FFFFFF"/>
+              </a:highlight>
+            </a:endParaRPr>
+          </a:p>
+          <a:p>
+            <a:pPr indent="0" lvl="0" marL="0" rtl="0" algn="just">
+              <a:spcBef>
+                <a:spcPts val="1600"/>
+              </a:spcBef>
+              <a:spcAft>
+                <a:spcPts val="0"/>
+              </a:spcAft>
+              <a:buNone/>
+            </a:pPr>
+            <a:r>
+              <a:rPr lang="es" sz="1500">
+                <a:solidFill>
+                  <a:srgbClr val="1D2129"/>
+                </a:solidFill>
+                <a:highlight>
+                  <a:srgbClr val="FFFFFF"/>
+                </a:highlight>
+              </a:rPr>
+              <a:t>Predice el efecto de una serie de </a:t>
+            </a:r>
+            <a:r>
+              <a:rPr lang="es" sz="1500">
+                <a:solidFill>
+                  <a:srgbClr val="1D2129"/>
+                </a:solidFill>
+                <a:highlight>
+                  <a:srgbClr val="FFFFFF"/>
+                </a:highlight>
+              </a:rPr>
+              <a:t>características</a:t>
+            </a:r>
+            <a:r>
+              <a:rPr lang="es" sz="1500">
+                <a:solidFill>
+                  <a:srgbClr val="1D2129"/>
+                </a:solidFill>
+                <a:highlight>
+                  <a:srgbClr val="FFFFFF"/>
+                </a:highlight>
+              </a:rPr>
+              <a:t> en una variable de respuesta binaria. Podemos decir que se comporta parecido a una regresión lineal múltiple.</a:t>
+            </a:r>
+            <a:endParaRPr sz="1500">
+              <a:solidFill>
+                <a:srgbClr val="1D2129"/>
+              </a:solidFill>
+              <a:highlight>
+                <a:srgbClr val="FFFFFF"/>
+              </a:highlight>
+            </a:endParaRPr>
+          </a:p>
+          <a:p>
+            <a:pPr indent="0" lvl="0" marL="0" rtl="0" algn="just">
+              <a:spcBef>
+                <a:spcPts val="1600"/>
+              </a:spcBef>
+              <a:spcAft>
+                <a:spcPts val="1600"/>
+              </a:spcAft>
+              <a:buNone/>
+            </a:pPr>
+            <a:r>
+              <a:rPr lang="es" sz="1500">
+                <a:solidFill>
+                  <a:srgbClr val="1D2129"/>
+                </a:solidFill>
+                <a:highlight>
+                  <a:srgbClr val="FFFFFF"/>
+                </a:highlight>
+              </a:rPr>
+              <a:t>Clasifica observaciones estimando la probabilidad de que una observación este en una </a:t>
+            </a:r>
+            <a:r>
+              <a:rPr lang="es" sz="1500">
+                <a:solidFill>
+                  <a:srgbClr val="1D2129"/>
+                </a:solidFill>
+                <a:highlight>
+                  <a:srgbClr val="FFFFFF"/>
+                </a:highlight>
+              </a:rPr>
+              <a:t>categoría</a:t>
+            </a:r>
+            <a:r>
+              <a:rPr lang="es" sz="1500">
+                <a:solidFill>
+                  <a:srgbClr val="1D2129"/>
+                </a:solidFill>
+                <a:highlight>
+                  <a:srgbClr val="FFFFFF"/>
+                </a:highlight>
+              </a:rPr>
+              <a:t> en particular (maligno o benigno).</a:t>
+            </a:r>
+            <a:endParaRPr sz="1500">
+              <a:solidFill>
+                <a:srgbClr val="1D2129"/>
+              </a:solidFill>
+              <a:highlight>
+                <a:srgbClr val="FFFFFF"/>
+              </a:highlight>
+            </a:endParaRPr>
+          </a:p>
+        </p:txBody>
+      </p:sp>
+    </p:spTree>
+  </p:cSld>
+  <p:clrMapOvr>
+    <a:masterClrMapping/>
+  </p:clrMapOvr>
+</p:sld>
+</file>
+
+<file path=ppt/slides/slide7.xml><?xml version="1.0" encoding="utf-8"?>
+<p:sld xmlns:a="http://schemas.openxmlformats.org/drawingml/2006/main" xmlns:r="http://schemas.openxmlformats.org/officeDocument/2006/relationships" xmlns:mc="http://schemas.openxmlformats.org/markup-compatibility/2006" xmlns:mv="urn:schemas-microsoft-com:mac:vml" xmlns:p="http://schemas.openxmlformats.org/presentationml/2006/main" xmlns:c="http://schemas.openxmlformats.org/drawingml/2006/chart" xmlns:dgm="http://schemas.openxmlformats.org/drawingml/2006/diagram" xmlns:o="urn:schemas-microsoft-com:office:office" xmlns:v="urn:schemas-microsoft-com:vml" xmlns:pvml="urn:schemas-microsoft-com:office:powerpoint" xmlns:com="http://schemas.openxmlformats.org/drawingml/2006/compatibility" xmlns:p14="http://schemas.microsoft.com/office/powerpoint/2010/main" xmlns:p15="http://schemas.microsoft.com/office/powerpoint/2012/main" xmlns:ahyp="http://schemas.microsoft.com/office/drawing/2018/hyperlinkcolor">
+  <p:cSld>
+    <p:spTree>
+      <p:nvGrpSpPr>
+        <p:cNvPr id="97" name="Shape 97"/>
+        <p:cNvGrpSpPr/>
+        <p:nvPr/>
+      </p:nvGrpSpPr>
+      <p:grpSpPr>
+        <a:xfrm>
+          <a:off x="0" y="0"/>
+          <a:ext cx="0" cy="0"/>
+          <a:chOff x="0" y="0"/>
+          <a:chExt cx="0" cy="0"/>
+        </a:xfrm>
+      </p:grpSpPr>
+      <p:sp>
+        <p:nvSpPr>
+          <p:cNvPr id="98" name="Google Shape;98;p19"/>
+          <p:cNvSpPr txBox="1"/>
+          <p:nvPr>
+            <p:ph type="title"/>
+          </p:nvPr>
+        </p:nvSpPr>
+        <p:spPr>
+          <a:xfrm>
+            <a:off x="311700" y="292850"/>
+            <a:ext cx="8520600" cy="801000"/>
+          </a:xfrm>
+          <a:prstGeom prst="rect">
+            <a:avLst/>
+          </a:prstGeom>
+        </p:spPr>
+        <p:txBody>
+          <a:bodyPr anchorCtr="0" anchor="t" bIns="91425" lIns="91425" spcFirstLastPara="1" rIns="91425" wrap="square" tIns="91425">
+            <a:noAutofit/>
+          </a:bodyPr>
+          <a:lstStyle/>
+          <a:p>
+            <a:pPr indent="0" lvl="0" marL="0" rtl="0" algn="l">
+              <a:spcBef>
+                <a:spcPts val="0"/>
+              </a:spcBef>
+              <a:spcAft>
+                <a:spcPts val="0"/>
+              </a:spcAft>
+              <a:buNone/>
+            </a:pPr>
+            <a:r>
+              <a:rPr lang="es"/>
+              <a:t>¿qué es la regresión logística?</a:t>
+            </a:r>
+            <a:endParaRPr/>
+          </a:p>
+        </p:txBody>
+      </p:sp>
+      <p:pic>
+        <p:nvPicPr>
+          <p:cNvPr id="99" name="Google Shape;99;p19"/>
+          <p:cNvPicPr preferRelativeResize="0"/>
+          <p:nvPr/>
+        </p:nvPicPr>
+        <p:blipFill>
+          <a:blip r:embed="rId3">
+            <a:alphaModFix/>
+          </a:blip>
+          <a:stretch>
+            <a:fillRect/>
+          </a:stretch>
+        </p:blipFill>
+        <p:spPr>
+          <a:xfrm>
+            <a:off x="1575125" y="1172600"/>
+            <a:ext cx="5993752" cy="641850"/>
+          </a:xfrm>
+          <a:prstGeom prst="rect">
+            <a:avLst/>
+          </a:prstGeom>
+          <a:noFill/>
+          <a:ln>
+            <a:noFill/>
+          </a:ln>
+        </p:spPr>
+      </p:pic>
+      <p:sp>
+        <p:nvSpPr>
+          <p:cNvPr id="100" name="Google Shape;100;p19"/>
+          <p:cNvSpPr/>
+          <p:nvPr/>
+        </p:nvSpPr>
+        <p:spPr>
+          <a:xfrm>
+            <a:off x="3516300" y="2520075"/>
+            <a:ext cx="2173800" cy="1094100"/>
+          </a:xfrm>
+          <a:prstGeom prst="roundRect">
+            <a:avLst>
+              <a:gd fmla="val 16667" name="adj"/>
+            </a:avLst>
+          </a:prstGeom>
+          <a:solidFill>
+            <a:srgbClr val="000000"/>
+          </a:solidFill>
+          <a:ln cap="flat" cmpd="sng" w="9525">
+            <a:solidFill>
+              <a:schemeClr val="dk2"/>
+            </a:solidFill>
+            <a:prstDash val="solid"/>
+            <a:round/>
+            <a:headEnd len="sm" w="sm" type="none"/>
+            <a:tailEnd len="sm" w="sm" type="none"/>
+          </a:ln>
+        </p:spPr>
+        <p:txBody>
+          <a:bodyPr anchorCtr="0" anchor="ctr" bIns="91425" lIns="91425" spcFirstLastPara="1" rIns="91425" wrap="square" tIns="91425">
+            <a:noAutofit/>
+          </a:bodyPr>
+          <a:lstStyle/>
+          <a:p>
+            <a:pPr indent="0" lvl="0" marL="0" rtl="0" algn="l">
+              <a:spcBef>
+                <a:spcPts val="0"/>
+              </a:spcBef>
+              <a:spcAft>
+                <a:spcPts val="0"/>
+              </a:spcAft>
+              <a:buNone/>
+            </a:pPr>
+            <a:r>
+              <a:t/>
+            </a:r>
+            <a:endParaRPr/>
+          </a:p>
+        </p:txBody>
+      </p:sp>
+      <p:sp>
+        <p:nvSpPr>
+          <p:cNvPr id="101" name="Google Shape;101;p19"/>
+          <p:cNvSpPr txBox="1"/>
+          <p:nvPr/>
+        </p:nvSpPr>
+        <p:spPr>
+          <a:xfrm>
+            <a:off x="3624800" y="2713825"/>
+            <a:ext cx="1861200" cy="582600"/>
+          </a:xfrm>
+          <a:prstGeom prst="rect">
+            <a:avLst/>
+          </a:prstGeom>
+          <a:noFill/>
+          <a:ln>
+            <a:noFill/>
+          </a:ln>
+        </p:spPr>
+        <p:txBody>
+          <a:bodyPr anchorCtr="0" anchor="t" bIns="91425" lIns="91425" spcFirstLastPara="1" rIns="91425" wrap="square" tIns="91425">
+            <a:noAutofit/>
+          </a:bodyPr>
+          <a:lstStyle/>
+          <a:p>
+            <a:pPr indent="0" lvl="0" marL="0" rtl="0" algn="ctr">
+              <a:spcBef>
+                <a:spcPts val="0"/>
+              </a:spcBef>
+              <a:spcAft>
+                <a:spcPts val="0"/>
+              </a:spcAft>
+              <a:buNone/>
+            </a:pPr>
+            <a:r>
+              <a:rPr b="1" lang="es">
+                <a:solidFill>
+                  <a:srgbClr val="FFFFFF"/>
+                </a:solidFill>
+                <a:latin typeface="Source Code Pro"/>
+                <a:ea typeface="Source Code Pro"/>
+                <a:cs typeface="Source Code Pro"/>
+                <a:sym typeface="Source Code Pro"/>
+              </a:rPr>
+              <a:t>Modelo de inferencia</a:t>
+            </a:r>
+            <a:endParaRPr b="1">
+              <a:solidFill>
+                <a:srgbClr val="FFFFFF"/>
+              </a:solidFill>
+              <a:latin typeface="Source Code Pro"/>
+              <a:ea typeface="Source Code Pro"/>
+              <a:cs typeface="Source Code Pro"/>
+              <a:sym typeface="Source Code Pro"/>
+            </a:endParaRPr>
+          </a:p>
+        </p:txBody>
+      </p:sp>
+      <p:sp>
+        <p:nvSpPr>
+          <p:cNvPr id="102" name="Google Shape;102;p19"/>
+          <p:cNvSpPr txBox="1"/>
+          <p:nvPr/>
+        </p:nvSpPr>
+        <p:spPr>
+          <a:xfrm>
+            <a:off x="1719800" y="4085425"/>
+            <a:ext cx="1861200" cy="582600"/>
+          </a:xfrm>
+          <a:prstGeom prst="rect">
+            <a:avLst/>
+          </a:prstGeom>
+          <a:noFill/>
+          <a:ln>
+            <a:noFill/>
+          </a:ln>
+        </p:spPr>
+        <p:txBody>
+          <a:bodyPr anchorCtr="0" anchor="t" bIns="91425" lIns="91425" spcFirstLastPara="1" rIns="91425" wrap="square" tIns="91425">
+            <a:noAutofit/>
+          </a:bodyPr>
+          <a:lstStyle/>
+          <a:p>
+            <a:pPr indent="0" lvl="0" marL="0" rtl="0" algn="ctr">
+              <a:spcBef>
+                <a:spcPts val="0"/>
+              </a:spcBef>
+              <a:spcAft>
+                <a:spcPts val="0"/>
+              </a:spcAft>
+              <a:buNone/>
+            </a:pPr>
+            <a:r>
+              <a:rPr b="1" lang="es">
+                <a:latin typeface="Source Code Pro"/>
+                <a:ea typeface="Source Code Pro"/>
+                <a:cs typeface="Source Code Pro"/>
+                <a:sym typeface="Source Code Pro"/>
+              </a:rPr>
+              <a:t>Maligno</a:t>
+            </a:r>
+            <a:endParaRPr b="1">
+              <a:latin typeface="Source Code Pro"/>
+              <a:ea typeface="Source Code Pro"/>
+              <a:cs typeface="Source Code Pro"/>
+              <a:sym typeface="Source Code Pro"/>
+            </a:endParaRPr>
+          </a:p>
+        </p:txBody>
+      </p:sp>
+      <p:sp>
+        <p:nvSpPr>
+          <p:cNvPr id="103" name="Google Shape;103;p19"/>
+          <p:cNvSpPr txBox="1"/>
+          <p:nvPr/>
+        </p:nvSpPr>
+        <p:spPr>
+          <a:xfrm>
+            <a:off x="5758400" y="4085425"/>
+            <a:ext cx="1861200" cy="582600"/>
+          </a:xfrm>
+          <a:prstGeom prst="rect">
+            <a:avLst/>
+          </a:prstGeom>
+          <a:noFill/>
+          <a:ln>
+            <a:noFill/>
+          </a:ln>
+        </p:spPr>
+        <p:txBody>
+          <a:bodyPr anchorCtr="0" anchor="t" bIns="91425" lIns="91425" spcFirstLastPara="1" rIns="91425" wrap="square" tIns="91425">
+            <a:noAutofit/>
+          </a:bodyPr>
+          <a:lstStyle/>
+          <a:p>
+            <a:pPr indent="0" lvl="0" marL="0" rtl="0" algn="ctr">
+              <a:spcBef>
+                <a:spcPts val="0"/>
+              </a:spcBef>
+              <a:spcAft>
+                <a:spcPts val="0"/>
+              </a:spcAft>
+              <a:buNone/>
+            </a:pPr>
+            <a:r>
+              <a:rPr b="1" lang="es">
+                <a:latin typeface="Source Code Pro"/>
+                <a:ea typeface="Source Code Pro"/>
+                <a:cs typeface="Source Code Pro"/>
+                <a:sym typeface="Source Code Pro"/>
+              </a:rPr>
+              <a:t>Benigno</a:t>
+            </a:r>
+            <a:endParaRPr b="1">
+              <a:latin typeface="Source Code Pro"/>
+              <a:ea typeface="Source Code Pro"/>
+              <a:cs typeface="Source Code Pro"/>
+              <a:sym typeface="Source Code Pro"/>
+            </a:endParaRPr>
+          </a:p>
+        </p:txBody>
+      </p:sp>
+      <p:cxnSp>
+        <p:nvCxnSpPr>
+          <p:cNvPr id="104" name="Google Shape;104;p19"/>
+          <p:cNvCxnSpPr>
+            <a:stCxn id="99" idx="2"/>
+            <a:endCxn id="100" idx="0"/>
+          </p:cNvCxnSpPr>
+          <p:nvPr/>
+        </p:nvCxnSpPr>
+        <p:spPr>
+          <a:xfrm>
+            <a:off x="4572001" y="1814450"/>
+            <a:ext cx="31200" cy="705600"/>
+          </a:xfrm>
+          <a:prstGeom prst="straightConnector1">
+            <a:avLst/>
+          </a:prstGeom>
+          <a:noFill/>
+          <a:ln cap="flat" cmpd="sng" w="38100">
+            <a:solidFill>
+              <a:schemeClr val="dk2"/>
+            </a:solidFill>
+            <a:prstDash val="solid"/>
+            <a:round/>
+            <a:headEnd len="med" w="med" type="none"/>
+            <a:tailEnd len="med" w="med" type="triangle"/>
+          </a:ln>
+        </p:spPr>
+      </p:cxnSp>
+      <p:cxnSp>
+        <p:nvCxnSpPr>
+          <p:cNvPr id="105" name="Google Shape;105;p19"/>
+          <p:cNvCxnSpPr>
+            <a:stCxn id="100" idx="2"/>
+            <a:endCxn id="102" idx="0"/>
+          </p:cNvCxnSpPr>
+          <p:nvPr/>
+        </p:nvCxnSpPr>
+        <p:spPr>
+          <a:xfrm flipH="1">
+            <a:off x="2650500" y="3614175"/>
+            <a:ext cx="1952700" cy="471300"/>
+          </a:xfrm>
+          <a:prstGeom prst="straightConnector1">
+            <a:avLst/>
+          </a:prstGeom>
+          <a:noFill/>
+          <a:ln cap="flat" cmpd="sng" w="38100">
+            <a:solidFill>
+              <a:schemeClr val="dk2"/>
+            </a:solidFill>
+            <a:prstDash val="solid"/>
+            <a:round/>
+            <a:headEnd len="med" w="med" type="none"/>
+            <a:tailEnd len="med" w="med" type="triangle"/>
+          </a:ln>
+        </p:spPr>
+      </p:cxnSp>
+      <p:cxnSp>
+        <p:nvCxnSpPr>
+          <p:cNvPr id="106" name="Google Shape;106;p19"/>
+          <p:cNvCxnSpPr>
+            <a:stCxn id="100" idx="2"/>
+            <a:endCxn id="103" idx="0"/>
+          </p:cNvCxnSpPr>
+          <p:nvPr/>
+        </p:nvCxnSpPr>
+        <p:spPr>
+          <a:xfrm>
+            <a:off x="4603200" y="3614175"/>
+            <a:ext cx="2085900" cy="471300"/>
+          </a:xfrm>
+          <a:prstGeom prst="straightConnector1">
+            <a:avLst/>
+          </a:prstGeom>
+          <a:noFill/>
+          <a:ln cap="flat" cmpd="sng" w="38100">
+            <a:solidFill>
+              <a:schemeClr val="dk2"/>
+            </a:solidFill>
+            <a:prstDash val="solid"/>
+            <a:round/>
+            <a:headEnd len="med" w="med" type="none"/>
+            <a:tailEnd len="med" w="med" type="triangle"/>
+          </a:ln>
+        </p:spPr>
+      </p:cxnSp>
+      <p:sp>
+        <p:nvSpPr>
+          <p:cNvPr id="107" name="Google Shape;107;p19"/>
+          <p:cNvSpPr txBox="1"/>
+          <p:nvPr/>
+        </p:nvSpPr>
+        <p:spPr>
+          <a:xfrm>
+            <a:off x="152400" y="2259150"/>
+            <a:ext cx="3194400" cy="1463400"/>
+          </a:xfrm>
+          <a:prstGeom prst="rect">
+            <a:avLst/>
+          </a:prstGeom>
+          <a:noFill/>
+          <a:ln>
+            <a:noFill/>
+          </a:ln>
+        </p:spPr>
+        <p:txBody>
+          <a:bodyPr anchorCtr="0" anchor="t" bIns="91425" lIns="91425" spcFirstLastPara="1" rIns="91425" wrap="square" tIns="91425">
+            <a:noAutofit/>
+          </a:bodyPr>
+          <a:lstStyle/>
+          <a:p>
+            <a:pPr indent="0" lvl="0" marL="0" rtl="0" algn="just">
+              <a:spcBef>
+                <a:spcPts val="0"/>
+              </a:spcBef>
+              <a:spcAft>
+                <a:spcPts val="0"/>
+              </a:spcAft>
+              <a:buNone/>
+            </a:pPr>
+            <a:r>
+              <a:rPr lang="es">
+                <a:latin typeface="Source Code Pro"/>
+                <a:ea typeface="Source Code Pro"/>
+                <a:cs typeface="Source Code Pro"/>
+                <a:sym typeface="Source Code Pro"/>
+              </a:rPr>
+              <a:t>¿Cuál es la probabilidad de que un tumor con clump thickness=3, cell size uniformity=3, ..., mitosis=1 sea maligno?</a:t>
+            </a:r>
+            <a:endParaRPr>
+              <a:latin typeface="Source Code Pro"/>
+              <a:ea typeface="Source Code Pro"/>
+              <a:cs typeface="Source Code Pro"/>
+              <a:sym typeface="Source Code Pro"/>
+            </a:endParaRPr>
+          </a:p>
+        </p:txBody>
+      </p:sp>
+    </p:spTree>
+  </p:cSld>
+  <p:clrMapOvr>
+    <a:masterClrMapping/>
+  </p:clrMapOvr>
+</p:sld>
+</file>
+
+<file path=ppt/slides/slide8.xml><?xml version="1.0" encoding="utf-8"?>
+<p:sld xmlns:a="http://schemas.openxmlformats.org/drawingml/2006/main" xmlns:r="http://schemas.openxmlformats.org/officeDocument/2006/relationships" xmlns:mc="http://schemas.openxmlformats.org/markup-compatibility/2006" xmlns:mv="urn:schemas-microsoft-com:mac:vml" xmlns:p="http://schemas.openxmlformats.org/presentationml/2006/main" xmlns:c="http://schemas.openxmlformats.org/drawingml/2006/chart" xmlns:dgm="http://schemas.openxmlformats.org/drawingml/2006/diagram" xmlns:o="urn:schemas-microsoft-com:office:office" xmlns:v="urn:schemas-microsoft-com:vml" xmlns:pvml="urn:schemas-microsoft-com:office:powerpoint" xmlns:com="http://schemas.openxmlformats.org/drawingml/2006/compatibility" xmlns:p14="http://schemas.microsoft.com/office/powerpoint/2010/main" xmlns:p15="http://schemas.microsoft.com/office/powerpoint/2012/main" xmlns:ahyp="http://schemas.microsoft.com/office/drawing/2018/hyperlinkcolor">
+  <p:cSld>
+    <p:spTree>
+      <p:nvGrpSpPr>
+        <p:cNvPr id="111" name="Shape 111"/>
+        <p:cNvGrpSpPr/>
+        <p:nvPr/>
+      </p:nvGrpSpPr>
+      <p:grpSpPr>
+        <a:xfrm>
+          <a:off x="0" y="0"/>
+          <a:ext cx="0" cy="0"/>
+          <a:chOff x="0" y="0"/>
+          <a:chExt cx="0" cy="0"/>
+        </a:xfrm>
+      </p:grpSpPr>
+      <p:sp>
+        <p:nvSpPr>
+          <p:cNvPr id="112" name="Google Shape;112;p20"/>
+          <p:cNvSpPr txBox="1"/>
+          <p:nvPr>
+            <p:ph type="title"/>
+          </p:nvPr>
+        </p:nvSpPr>
+        <p:spPr>
+          <a:xfrm>
+            <a:off x="311700" y="292850"/>
+            <a:ext cx="8520600" cy="801000"/>
+          </a:xfrm>
+          <a:prstGeom prst="rect">
+            <a:avLst/>
+          </a:prstGeom>
+        </p:spPr>
+        <p:txBody>
+          <a:bodyPr anchorCtr="0" anchor="t" bIns="91425" lIns="91425" spcFirstLastPara="1" rIns="91425" wrap="square" tIns="91425">
+            <a:noAutofit/>
+          </a:bodyPr>
+          <a:lstStyle/>
+          <a:p>
+            <a:pPr indent="0" lvl="0" marL="0" rtl="0" algn="l">
+              <a:spcBef>
+                <a:spcPts val="0"/>
+              </a:spcBef>
+              <a:spcAft>
+                <a:spcPts val="0"/>
+              </a:spcAft>
+              <a:buNone/>
+            </a:pPr>
+            <a:r>
+              <a:rPr lang="es"/>
+              <a:t>¿por qué no usar regresión lineal?</a:t>
+            </a:r>
+            <a:endParaRPr/>
+          </a:p>
+        </p:txBody>
+      </p:sp>
+      <p:sp>
+        <p:nvSpPr>
+          <p:cNvPr id="113" name="Google Shape;113;p20"/>
+          <p:cNvSpPr txBox="1"/>
+          <p:nvPr>
+            <p:ph idx="1" type="body"/>
+          </p:nvPr>
+        </p:nvSpPr>
+        <p:spPr>
+          <a:xfrm>
+            <a:off x="254850" y="1214475"/>
+            <a:ext cx="8520600" cy="3581400"/>
+          </a:xfrm>
+          <a:prstGeom prst="rect">
+            <a:avLst/>
+          </a:prstGeom>
+        </p:spPr>
+        <p:txBody>
+          <a:bodyPr anchorCtr="0" anchor="t" bIns="91425" lIns="91425" spcFirstLastPara="1" rIns="91425" wrap="square" tIns="91425">
+            <a:noAutofit/>
+          </a:bodyPr>
+          <a:lstStyle/>
+          <a:p>
+            <a:pPr indent="0" lvl="0" marL="0" rtl="0" algn="just">
+              <a:spcBef>
+                <a:spcPts val="0"/>
+              </a:spcBef>
+              <a:spcAft>
+                <a:spcPts val="0"/>
+              </a:spcAft>
+              <a:buNone/>
+            </a:pPr>
+            <a:r>
+              <a:rPr lang="es" sz="1700">
+                <a:solidFill>
+                  <a:srgbClr val="1D2129"/>
+                </a:solidFill>
+                <a:highlight>
+                  <a:srgbClr val="FFFFFF"/>
+                </a:highlight>
+              </a:rPr>
+              <a:t>Una regresión lineal univariada es una variable cuantitativa prediciendo otra cuantitativa. Una variable que solo puede tener 2 valores no se considera cuantitativa.</a:t>
+            </a:r>
+            <a:endParaRPr sz="1700">
+              <a:solidFill>
+                <a:srgbClr val="1D2129"/>
+              </a:solidFill>
+              <a:highlight>
+                <a:srgbClr val="FFFFFF"/>
+              </a:highlight>
+            </a:endParaRPr>
+          </a:p>
+          <a:p>
+            <a:pPr indent="0" lvl="0" marL="0" rtl="0" algn="just">
+              <a:spcBef>
+                <a:spcPts val="1600"/>
+              </a:spcBef>
+              <a:spcAft>
+                <a:spcPts val="0"/>
+              </a:spcAft>
+              <a:buNone/>
+            </a:pPr>
+            <a:r>
+              <a:rPr lang="es" sz="1700">
+                <a:solidFill>
+                  <a:srgbClr val="1D2129"/>
+                </a:solidFill>
+                <a:highlight>
+                  <a:srgbClr val="FFFFFF"/>
+                </a:highlight>
+              </a:rPr>
+              <a:t>La regresión multivariada es una regresión lineal simple con más variables independientes que es básicamente el mismo tipo de problema.</a:t>
+            </a:r>
+            <a:endParaRPr sz="1700">
+              <a:solidFill>
+                <a:srgbClr val="1D2129"/>
+              </a:solidFill>
+              <a:highlight>
+                <a:srgbClr val="FFFFFF"/>
+              </a:highlight>
+            </a:endParaRPr>
+          </a:p>
+          <a:p>
+            <a:pPr indent="0" lvl="0" marL="0" rtl="0" algn="just">
+              <a:spcBef>
+                <a:spcPts val="1600"/>
+              </a:spcBef>
+              <a:spcAft>
+                <a:spcPts val="0"/>
+              </a:spcAft>
+              <a:buNone/>
+            </a:pPr>
+            <a:r>
+              <a:rPr lang="es" sz="1700">
+                <a:solidFill>
+                  <a:srgbClr val="1D2129"/>
+                </a:solidFill>
+                <a:highlight>
+                  <a:srgbClr val="FFFFFF"/>
+                </a:highlight>
+              </a:rPr>
+              <a:t>Una regresión no lineal sigue siendo variables cuantitativas pero ahora los datos tienen tendencia de curva.</a:t>
+            </a:r>
+            <a:endParaRPr sz="1700">
+              <a:solidFill>
+                <a:srgbClr val="1D2129"/>
+              </a:solidFill>
+              <a:highlight>
+                <a:srgbClr val="FFFFFF"/>
+              </a:highlight>
+            </a:endParaRPr>
+          </a:p>
+          <a:p>
+            <a:pPr indent="0" lvl="0" marL="0" rtl="0" algn="just">
+              <a:spcBef>
+                <a:spcPts val="1600"/>
+              </a:spcBef>
+              <a:spcAft>
+                <a:spcPts val="1600"/>
+              </a:spcAft>
+              <a:buNone/>
+            </a:pPr>
+            <a:r>
+              <a:t/>
+            </a:r>
+            <a:endParaRPr sz="1500">
+              <a:solidFill>
+                <a:srgbClr val="1D2129"/>
+              </a:solidFill>
+              <a:highlight>
+                <a:srgbClr val="FFFFFF"/>
+              </a:highlight>
+            </a:endParaRPr>
+          </a:p>
+        </p:txBody>
+      </p:sp>
+    </p:spTree>
+  </p:cSld>
+  <p:clrMapOvr>
+    <a:masterClrMapping/>
+  </p:clrMapOvr>
+</p:sld>
+</file>
+
+<file path=ppt/slides/slide9.xml><?xml version="1.0" encoding="utf-8"?>
+<p:sld xmlns:a="http://schemas.openxmlformats.org/drawingml/2006/main" xmlns:r="http://schemas.openxmlformats.org/officeDocument/2006/relationships" xmlns:mc="http://schemas.openxmlformats.org/markup-compatibility/2006" xmlns:mv="urn:schemas-microsoft-com:mac:vml" xmlns:p="http://schemas.openxmlformats.org/presentationml/2006/main" xmlns:c="http://schemas.openxmlformats.org/drawingml/2006/chart" xmlns:dgm="http://schemas.openxmlformats.org/drawingml/2006/diagram" xmlns:o="urn:schemas-microsoft-com:office:office" xmlns:v="urn:schemas-microsoft-com:vml" xmlns:pvml="urn:schemas-microsoft-com:office:powerpoint" xmlns:com="http://schemas.openxmlformats.org/drawingml/2006/compatibility" xmlns:p14="http://schemas.microsoft.com/office/powerpoint/2010/main" xmlns:p15="http://schemas.microsoft.com/office/powerpoint/2012/main" xmlns:ahyp="http://schemas.microsoft.com/office/drawing/2018/hyperlinkcolor">
+  <p:cSld>
+    <p:spTree>
+      <p:nvGrpSpPr>
+        <p:cNvPr id="117" name="Shape 117"/>
+        <p:cNvGrpSpPr/>
+        <p:nvPr/>
+      </p:nvGrpSpPr>
+      <p:grpSpPr>
+        <a:xfrm>
+          <a:off x="0" y="0"/>
+          <a:ext cx="0" cy="0"/>
+          <a:chOff x="0" y="0"/>
+          <a:chExt cx="0" cy="0"/>
+        </a:xfrm>
+      </p:grpSpPr>
+      <p:sp>
+        <p:nvSpPr>
+          <p:cNvPr id="118" name="Google Shape;118;p21"/>
+          <p:cNvSpPr txBox="1"/>
+          <p:nvPr>
+            <p:ph type="title"/>
+          </p:nvPr>
+        </p:nvSpPr>
+        <p:spPr>
+          <a:xfrm>
+            <a:off x="311700" y="292850"/>
+            <a:ext cx="8520600" cy="801000"/>
+          </a:xfrm>
+          <a:prstGeom prst="rect">
+            <a:avLst/>
+          </a:prstGeom>
+        </p:spPr>
+        <p:txBody>
+          <a:bodyPr anchorCtr="0" anchor="t" bIns="91425" lIns="91425" spcFirstLastPara="1" rIns="91425" wrap="square" tIns="91425">
+            <a:noAutofit/>
+          </a:bodyPr>
+          <a:lstStyle/>
+          <a:p>
+            <a:pPr indent="0" lvl="0" marL="0" rtl="0" algn="l">
+              <a:spcBef>
+                <a:spcPts val="0"/>
+              </a:spcBef>
+              <a:spcAft>
+                <a:spcPts val="0"/>
+              </a:spcAft>
+              <a:buNone/>
+            </a:pPr>
+            <a:r>
+              <a:rPr lang="es"/>
+              <a:t>¿qué pasa si usamos una regresión lineal?</a:t>
+            </a:r>
+            <a:endParaRPr/>
+          </a:p>
+        </p:txBody>
+      </p:sp>
+      <p:sp>
+        <p:nvSpPr>
+          <p:cNvPr id="119" name="Google Shape;119;p21"/>
+          <p:cNvSpPr txBox="1"/>
+          <p:nvPr>
+            <p:ph idx="1" type="body"/>
+          </p:nvPr>
+        </p:nvSpPr>
+        <p:spPr>
+          <a:xfrm>
+            <a:off x="254850" y="1290675"/>
+            <a:ext cx="8520600" cy="3581400"/>
+          </a:xfrm>
+          <a:prstGeom prst="rect">
+            <a:avLst/>
+          </a:prstGeom>
+        </p:spPr>
+        <p:txBody>
+          <a:bodyPr anchorCtr="0" anchor="t" bIns="91425" lIns="91425" spcFirstLastPara="1" rIns="91425" wrap="square" tIns="91425">
+            <a:noAutofit/>
+          </a:bodyPr>
+          <a:lstStyle/>
+          <a:p>
+            <a:pPr indent="-336550" lvl="0" marL="457200" rtl="0" algn="just">
+              <a:spcBef>
+                <a:spcPts val="0"/>
+              </a:spcBef>
+              <a:spcAft>
+                <a:spcPts val="0"/>
+              </a:spcAft>
+              <a:buClr>
+                <a:srgbClr val="1D2129"/>
+              </a:buClr>
+              <a:buSzPts val="1700"/>
+              <a:buChar char="●"/>
+            </a:pPr>
+            <a:r>
+              <a:rPr lang="es" sz="1700">
+                <a:solidFill>
+                  <a:srgbClr val="1D2129"/>
+                </a:solidFill>
+                <a:highlight>
+                  <a:srgbClr val="FFFFFF"/>
+                </a:highlight>
+              </a:rPr>
+              <a:t>Los datos binarios NO tienen una distribución normal, que se asume para usar casi cualquier tipo de regresión.</a:t>
+            </a:r>
+            <a:endParaRPr sz="1700">
+              <a:solidFill>
+                <a:srgbClr val="1D2129"/>
+              </a:solidFill>
+              <a:highlight>
+                <a:srgbClr val="FFFFFF"/>
+              </a:highlight>
+            </a:endParaRPr>
+          </a:p>
+          <a:p>
+            <a:pPr indent="0" lvl="0" marL="0" rtl="0" algn="just">
+              <a:spcBef>
+                <a:spcPts val="1600"/>
+              </a:spcBef>
+              <a:spcAft>
+                <a:spcPts val="0"/>
+              </a:spcAft>
+              <a:buNone/>
+            </a:pPr>
+            <a:r>
+              <a:t/>
+            </a:r>
+            <a:endParaRPr sz="1700">
+              <a:solidFill>
+                <a:srgbClr val="1D2129"/>
+              </a:solidFill>
+              <a:highlight>
+                <a:srgbClr val="FFFFFF"/>
+              </a:highlight>
+            </a:endParaRPr>
+          </a:p>
+          <a:p>
+            <a:pPr indent="-336550" lvl="0" marL="457200" rtl="0" algn="just">
+              <a:spcBef>
+                <a:spcPts val="1600"/>
+              </a:spcBef>
+              <a:spcAft>
+                <a:spcPts val="0"/>
+              </a:spcAft>
+              <a:buClr>
+                <a:srgbClr val="1D2129"/>
+              </a:buClr>
+              <a:buSzPts val="1700"/>
+              <a:buChar char="●"/>
+            </a:pPr>
+            <a:r>
+              <a:rPr lang="es" sz="1700">
+                <a:solidFill>
+                  <a:srgbClr val="1D2129"/>
+                </a:solidFill>
+                <a:highlight>
+                  <a:srgbClr val="FFFFFF"/>
+                </a:highlight>
+              </a:rPr>
+              <a:t>Si corremos una regresión lineal los valores predichos pueden ser menores a 0 y mayores a 1, esto viola la definición de probabilidad.</a:t>
+            </a:r>
+            <a:endParaRPr sz="1700">
+              <a:solidFill>
+                <a:srgbClr val="1D2129"/>
+              </a:solidFill>
+              <a:highlight>
+                <a:srgbClr val="FFFFFF"/>
+              </a:highlight>
+            </a:endParaRPr>
+          </a:p>
+          <a:p>
+            <a:pPr indent="0" lvl="0" marL="0" rtl="0" algn="just">
+              <a:spcBef>
+                <a:spcPts val="1600"/>
+              </a:spcBef>
+              <a:spcAft>
+                <a:spcPts val="0"/>
+              </a:spcAft>
+              <a:buNone/>
+            </a:pPr>
+            <a:r>
+              <a:t/>
+            </a:r>
+            <a:endParaRPr sz="1500">
+              <a:solidFill>
+                <a:srgbClr val="1D2129"/>
+              </a:solidFill>
+              <a:highlight>
+                <a:srgbClr val="FFFFFF"/>
+              </a:highlight>
+            </a:endParaRPr>
+          </a:p>
+          <a:p>
+            <a:pPr indent="0" lvl="0" marL="0" rtl="0" algn="just">
+              <a:spcBef>
+                <a:spcPts val="1600"/>
+              </a:spcBef>
+              <a:spcAft>
+                <a:spcPts val="1600"/>
+              </a:spcAft>
+              <a:buNone/>
+            </a:pPr>
+            <a:r>
+              <a:t/>
+            </a:r>
+            <a:endParaRPr sz="1500">
+              <a:solidFill>
+                <a:srgbClr val="1D2129"/>
+              </a:solidFill>
+              <a:highlight>
+                <a:srgbClr val="FFFFFF"/>
+              </a:highlight>
+            </a:endParaRPr>
+          </a:p>
+        </p:txBody>
+      </p:sp>
     </p:spTree>
   </p:cSld>
   <p:clrMapOvr>

</xml_diff>